<commit_message>
Adds slides for IETF86-Orlando
</commit_message>
<xml_diff>
--- a/slides/trickle-ice-iet86-orlando.pptx
+++ b/slides/trickle-ice-iet86-orlando.pptx
@@ -750,9 +750,8 @@
           <a:bodyPr/>
           <a:lstStyle/>
           <a:p>
-            <a:fld id="{4BC0CE3B-544B-EC42-A974-30FC96DC6CB9}" type="datetime1">
+            <a:fld id="{81EFAE5E-B942-7347-9C44-8931FA9851BC}" type="datetime1">
               <a:rPr lang="en-US" smtClean="0"/>
-              <a:pPr/>
               <a:t>11/03/13</a:t>
             </a:fld>
             <a:endParaRPr lang="en-US"/>
@@ -775,35 +774,8 @@
           <a:lstStyle/>
           <a:p>
             <a:r>
-              <a:rPr lang="fr-FR" dirty="0" err="1" smtClean="0"/>
-              <a:t>draft-ivov-mmusic-trickle-ice</a:t>
-            </a:r>
-            <a:r>
-              <a:rPr lang="fr-FR" dirty="0" smtClean="0"/>
-              <a:t/>
-            </a:r>
-            <a:br>
-              <a:rPr lang="fr-FR" dirty="0" smtClean="0"/>
-            </a:br>
-            <a:r>
-              <a:rPr lang="fr-FR" dirty="0" smtClean="0"/>
-              <a:t>E. </a:t>
-            </a:r>
-            <a:r>
-              <a:rPr lang="fr-FR" dirty="0" err="1" smtClean="0"/>
-              <a:t>Rescorla</a:t>
-            </a:r>
-            <a:r>
-              <a:rPr lang="fr-FR" dirty="0" smtClean="0"/>
-              <a:t>, J. </a:t>
-            </a:r>
-            <a:r>
-              <a:rPr lang="fr-FR" dirty="0" err="1" smtClean="0"/>
-              <a:t>Uberti</a:t>
-            </a:r>
-            <a:r>
-              <a:rPr lang="fr-FR" dirty="0" smtClean="0"/>
-              <a:t>, E. Ivov</a:t>
+              <a:rPr lang="fr-FR" smtClean="0"/>
+              <a:t>draft-ivov-mmusic-trickle-ice E. Rescorla, J. Uberti, E. Ivov</a:t>
             </a:r>
             <a:endParaRPr lang="en-US" dirty="0" smtClean="0"/>
           </a:p>
@@ -811,25 +783,47 @@
       </p:sp>
       <p:sp>
         <p:nvSpPr>
-          <p:cNvPr id="6" name="Slide Number Placeholder 5"/>
+          <p:cNvPr id="7" name="Slide Number Placeholder 5"/>
           <p:cNvSpPr>
             <a:spLocks noGrp="1"/>
           </p:cNvSpPr>
           <p:nvPr>
-            <p:ph type="sldNum" sz="quarter" idx="12"/>
+            <p:ph type="sldNum" sz="quarter" idx="4"/>
           </p:nvPr>
         </p:nvSpPr>
-        <p:spPr/>
+        <p:spPr>
+          <a:xfrm>
+            <a:off x="6553200" y="6356350"/>
+            <a:ext cx="2133600" cy="365125"/>
+          </a:xfrm>
+          <a:prstGeom prst="rect">
+            <a:avLst/>
+          </a:prstGeom>
+        </p:spPr>
         <p:txBody>
-          <a:bodyPr/>
-          <a:lstStyle/>
+          <a:bodyPr vert="horz" lIns="91440" tIns="45720" rIns="91440" bIns="45720" rtlCol="0" anchor="ctr"/>
+          <a:lstStyle>
+            <a:lvl1pPr algn="r">
+              <a:defRPr sz="1200">
+                <a:solidFill>
+                  <a:schemeClr val="tx1">
+                    <a:tint val="75000"/>
+                  </a:schemeClr>
+                </a:solidFill>
+              </a:defRPr>
+            </a:lvl1pPr>
+          </a:lstStyle>
           <a:p>
             <a:fld id="{83363BB8-67C3-44C4-A9E3-5652E069104A}" type="slidenum">
               <a:rPr lang="en-US" smtClean="0"/>
               <a:pPr/>
               <a:t>‹#›</a:t>
             </a:fld>
-            <a:endParaRPr lang="en-US"/>
+            <a:r>
+              <a:rPr lang="en-US" dirty="0" smtClean="0"/>
+              <a:t>/18</a:t>
+            </a:r>
+            <a:endParaRPr lang="en-US" dirty="0"/>
           </a:p>
         </p:txBody>
       </p:sp>
@@ -991,9 +985,8 @@
             </a:lvl1pPr>
           </a:lstStyle>
           <a:p>
-            <a:fld id="{060D53B9-4DE2-3547-8D02-BB2E6C4C30F3}" type="datetime1">
+            <a:fld id="{CDD0B8FC-63EE-6D44-8E97-9E3030D544D9}" type="datetime1">
               <a:rPr lang="en-US" smtClean="0"/>
-              <a:pPr/>
               <a:t>11/03/13</a:t>
             </a:fld>
             <a:endParaRPr lang="en-US"/>
@@ -1034,35 +1027,8 @@
           </a:lstStyle>
           <a:p>
             <a:r>
-              <a:rPr lang="fr-FR" dirty="0" err="1" smtClean="0"/>
-              <a:t>draft-ivov-mmusic-trickle-ice</a:t>
-            </a:r>
-            <a:r>
-              <a:rPr lang="fr-FR" dirty="0" smtClean="0"/>
-              <a:t/>
-            </a:r>
-            <a:br>
-              <a:rPr lang="fr-FR" dirty="0" smtClean="0"/>
-            </a:br>
-            <a:r>
-              <a:rPr lang="fr-FR" dirty="0" smtClean="0"/>
-              <a:t>E. </a:t>
-            </a:r>
-            <a:r>
-              <a:rPr lang="fr-FR" dirty="0" err="1" smtClean="0"/>
-              <a:t>Rescorla</a:t>
-            </a:r>
-            <a:r>
-              <a:rPr lang="fr-FR" dirty="0" smtClean="0"/>
-              <a:t>, J. </a:t>
-            </a:r>
-            <a:r>
-              <a:rPr lang="fr-FR" dirty="0" err="1" smtClean="0"/>
-              <a:t>Uberti</a:t>
-            </a:r>
-            <a:r>
-              <a:rPr lang="fr-FR" dirty="0" smtClean="0"/>
-              <a:t>, E. Ivov</a:t>
+              <a:rPr lang="fr-FR" smtClean="0"/>
+              <a:t>draft-ivov-mmusic-trickle-ice E. Rescorla, J. Uberti, E. Ivov</a:t>
             </a:r>
             <a:endParaRPr lang="en-US" dirty="0"/>
           </a:p>
@@ -1106,7 +1072,11 @@
               <a:pPr/>
               <a:t>‹#›</a:t>
             </a:fld>
-            <a:endParaRPr lang="en-US"/>
+            <a:r>
+              <a:rPr lang="en-US" dirty="0" smtClean="0"/>
+              <a:t>/18</a:t>
+            </a:r>
+            <a:endParaRPr lang="en-US" dirty="0"/>
           </a:p>
         </p:txBody>
       </p:sp>
@@ -1512,30 +1482,6 @@
       </p:sp>
       <p:sp>
         <p:nvSpPr>
-          <p:cNvPr id="4" name="Espace réservé du numéro de diapositive 3"/>
-          <p:cNvSpPr>
-            <a:spLocks noGrp="1"/>
-          </p:cNvSpPr>
-          <p:nvPr>
-            <p:ph type="sldNum" sz="quarter" idx="12"/>
-          </p:nvPr>
-        </p:nvSpPr>
-        <p:spPr/>
-        <p:txBody>
-          <a:bodyPr/>
-          <a:lstStyle/>
-          <a:p>
-            <a:fld id="{83363BB8-67C3-44C4-A9E3-5652E069104A}" type="slidenum">
-              <a:rPr lang="en-GB" smtClean="0"/>
-              <a:pPr/>
-              <a:t>1</a:t>
-            </a:fld>
-            <a:endParaRPr lang="en-GB"/>
-          </a:p>
-        </p:txBody>
-      </p:sp>
-      <p:sp>
-        <p:nvSpPr>
           <p:cNvPr id="5" name="Espace réservé du pied de page 4"/>
           <p:cNvSpPr>
             <a:spLocks noGrp="1"/>
@@ -1550,16 +1496,38 @@
           <a:lstStyle/>
           <a:p>
             <a:r>
-              <a:rPr lang="en-GB" smtClean="0"/>
-              <a:t>draft-ivov-mmusic-trickle-ice</a:t>
-            </a:r>
-            <a:br>
-              <a:rPr lang="en-GB" smtClean="0"/>
-            </a:br>
-            <a:r>
-              <a:rPr lang="en-GB" smtClean="0"/>
-              <a:t>E. Rescorla, J. Uberti, E. Ivov</a:t>
-            </a:r>
+              <a:rPr lang="fr-FR" smtClean="0"/>
+              <a:t>draft-ivov-mmusic-trickle-ice E. Rescorla, J. Uberti, E. Ivov</a:t>
+            </a:r>
+            <a:endParaRPr lang="en-GB" smtClean="0"/>
+          </a:p>
+        </p:txBody>
+      </p:sp>
+      <p:sp>
+        <p:nvSpPr>
+          <p:cNvPr id="7" name="Espace réservé du numéro de diapositive 6"/>
+          <p:cNvSpPr>
+            <a:spLocks noGrp="1"/>
+          </p:cNvSpPr>
+          <p:nvPr>
+            <p:ph type="sldNum" sz="quarter" idx="4"/>
+          </p:nvPr>
+        </p:nvSpPr>
+        <p:spPr/>
+        <p:txBody>
+          <a:bodyPr/>
+          <a:lstStyle/>
+          <a:p>
+            <a:fld id="{83363BB8-67C3-44C4-A9E3-5652E069104A}" type="slidenum">
+              <a:rPr lang="en-US" smtClean="0"/>
+              <a:pPr/>
+              <a:t>1</a:t>
+            </a:fld>
+            <a:r>
+              <a:rPr lang="en-US" smtClean="0"/>
+              <a:t>/18</a:t>
+            </a:r>
+            <a:endParaRPr lang="en-US" dirty="0"/>
           </a:p>
         </p:txBody>
       </p:sp>
@@ -1657,40 +1625,9 @@
           <a:p>
             <a:r>
               <a:rPr lang="fr-FR" smtClean="0"/>
-              <a:t>draft-ivov-mmusic-trickle-ice</a:t>
-            </a:r>
-            <a:br>
-              <a:rPr lang="fr-FR" smtClean="0"/>
-            </a:br>
-            <a:r>
-              <a:rPr lang="fr-FR" smtClean="0"/>
-              <a:t>E. Rescorla, J. Uberti, E. Ivov</a:t>
+              <a:t>draft-ivov-mmusic-trickle-ice E. Rescorla, J. Uberti, E. Ivov</a:t>
             </a:r>
             <a:endParaRPr lang="en-US" dirty="0" smtClean="0"/>
-          </a:p>
-        </p:txBody>
-      </p:sp>
-      <p:sp>
-        <p:nvSpPr>
-          <p:cNvPr id="5" name="Espace réservé du numéro de diapositive 4"/>
-          <p:cNvSpPr>
-            <a:spLocks noGrp="1"/>
-          </p:cNvSpPr>
-          <p:nvPr>
-            <p:ph type="sldNum" sz="quarter" idx="12"/>
-          </p:nvPr>
-        </p:nvSpPr>
-        <p:spPr/>
-        <p:txBody>
-          <a:bodyPr/>
-          <a:lstStyle/>
-          <a:p>
-            <a:fld id="{83363BB8-67C3-44C4-A9E3-5652E069104A}" type="slidenum">
-              <a:rPr lang="en-US" smtClean="0"/>
-              <a:pPr/>
-              <a:t>10</a:t>
-            </a:fld>
-            <a:endParaRPr lang="en-US"/>
           </a:p>
         </p:txBody>
       </p:sp>
@@ -2650,6 +2587,34 @@
               <a:buAutoNum type="arabicPeriod"/>
             </a:pPr>
             <a:endParaRPr lang="en-GB" sz="1600" dirty="0"/>
+          </a:p>
+        </p:txBody>
+      </p:sp>
+      <p:sp>
+        <p:nvSpPr>
+          <p:cNvPr id="8" name="Espace réservé du numéro de diapositive 7"/>
+          <p:cNvSpPr>
+            <a:spLocks noGrp="1"/>
+          </p:cNvSpPr>
+          <p:nvPr>
+            <p:ph type="sldNum" sz="quarter" idx="4"/>
+          </p:nvPr>
+        </p:nvSpPr>
+        <p:spPr/>
+        <p:txBody>
+          <a:bodyPr/>
+          <a:lstStyle/>
+          <a:p>
+            <a:fld id="{83363BB8-67C3-44C4-A9E3-5652E069104A}" type="slidenum">
+              <a:rPr lang="en-US" smtClean="0"/>
+              <a:pPr/>
+              <a:t>10</a:t>
+            </a:fld>
+            <a:r>
+              <a:rPr lang="en-US" smtClean="0"/>
+              <a:t>/18</a:t>
+            </a:r>
+            <a:endParaRPr lang="en-US" dirty="0"/>
           </a:p>
         </p:txBody>
       </p:sp>
@@ -2736,40 +2701,9 @@
           <a:p>
             <a:r>
               <a:rPr lang="fr-FR" smtClean="0"/>
-              <a:t>draft-ivov-mmusic-trickle-ice</a:t>
-            </a:r>
-            <a:br>
-              <a:rPr lang="fr-FR" smtClean="0"/>
-            </a:br>
-            <a:r>
-              <a:rPr lang="fr-FR" smtClean="0"/>
-              <a:t>E. Rescorla, J. Uberti, E. Ivov</a:t>
+              <a:t>draft-ivov-mmusic-trickle-ice E. Rescorla, J. Uberti, E. Ivov</a:t>
             </a:r>
             <a:endParaRPr lang="en-US" dirty="0" smtClean="0"/>
-          </a:p>
-        </p:txBody>
-      </p:sp>
-      <p:sp>
-        <p:nvSpPr>
-          <p:cNvPr id="5" name="Espace réservé du numéro de diapositive 4"/>
-          <p:cNvSpPr>
-            <a:spLocks noGrp="1"/>
-          </p:cNvSpPr>
-          <p:nvPr>
-            <p:ph type="sldNum" sz="quarter" idx="12"/>
-          </p:nvPr>
-        </p:nvSpPr>
-        <p:spPr/>
-        <p:txBody>
-          <a:bodyPr/>
-          <a:lstStyle/>
-          <a:p>
-            <a:fld id="{83363BB8-67C3-44C4-A9E3-5652E069104A}" type="slidenum">
-              <a:rPr lang="en-US" smtClean="0"/>
-              <a:pPr/>
-              <a:t>11</a:t>
-            </a:fld>
-            <a:endParaRPr lang="en-US"/>
           </a:p>
         </p:txBody>
       </p:sp>
@@ -3380,6 +3314,34 @@
               <a:t>Therefore, can we just concentrate on foundations?</a:t>
             </a:r>
             <a:endParaRPr lang="en-GB" sz="2000" dirty="0"/>
+          </a:p>
+        </p:txBody>
+      </p:sp>
+      <p:sp>
+        <p:nvSpPr>
+          <p:cNvPr id="11" name="Espace réservé du numéro de diapositive 10"/>
+          <p:cNvSpPr>
+            <a:spLocks noGrp="1"/>
+          </p:cNvSpPr>
+          <p:nvPr>
+            <p:ph type="sldNum" sz="quarter" idx="4"/>
+          </p:nvPr>
+        </p:nvSpPr>
+        <p:spPr/>
+        <p:txBody>
+          <a:bodyPr/>
+          <a:lstStyle/>
+          <a:p>
+            <a:fld id="{83363BB8-67C3-44C4-A9E3-5652E069104A}" type="slidenum">
+              <a:rPr lang="en-US" smtClean="0"/>
+              <a:pPr/>
+              <a:t>11</a:t>
+            </a:fld>
+            <a:r>
+              <a:rPr lang="en-US" smtClean="0"/>
+              <a:t>/18</a:t>
+            </a:r>
+            <a:endParaRPr lang="en-US" dirty="0"/>
           </a:p>
         </p:txBody>
       </p:sp>
@@ -3533,14 +3495,7 @@
           <a:p>
             <a:r>
               <a:rPr lang="fr-FR" smtClean="0"/>
-              <a:t>draft-ivov-mmusic-trickle-ice</a:t>
-            </a:r>
-            <a:br>
-              <a:rPr lang="fr-FR" smtClean="0"/>
-            </a:br>
-            <a:r>
-              <a:rPr lang="fr-FR" smtClean="0"/>
-              <a:t>E. Rescorla, J. Uberti, E. Ivov</a:t>
+              <a:t>draft-ivov-mmusic-trickle-ice E. Rescorla, J. Uberti, E. Ivov</a:t>
             </a:r>
             <a:endParaRPr lang="en-US" dirty="0" smtClean="0"/>
           </a:p>
@@ -3548,12 +3503,12 @@
       </p:sp>
       <p:sp>
         <p:nvSpPr>
-          <p:cNvPr id="5" name="Espace réservé du numéro de diapositive 4"/>
+          <p:cNvPr id="6" name="Espace réservé du numéro de diapositive 5"/>
           <p:cNvSpPr>
             <a:spLocks noGrp="1"/>
           </p:cNvSpPr>
           <p:nvPr>
-            <p:ph type="sldNum" sz="quarter" idx="12"/>
+            <p:ph type="sldNum" sz="quarter" idx="4"/>
           </p:nvPr>
         </p:nvSpPr>
         <p:spPr/>
@@ -3566,7 +3521,11 @@
               <a:pPr/>
               <a:t>12</a:t>
             </a:fld>
-            <a:endParaRPr lang="en-US"/>
+            <a:r>
+              <a:rPr lang="en-US" smtClean="0"/>
+              <a:t>/18</a:t>
+            </a:r>
+            <a:endParaRPr lang="en-US" dirty="0"/>
           </a:p>
         </p:txBody>
       </p:sp>
@@ -3646,66 +3605,10 @@
           <a:lstStyle/>
           <a:p>
             <a:r>
-              <a:rPr lang="fr-FR" dirty="0" err="1" smtClean="0"/>
-              <a:t>draft-ivov-mmusic-trickle-ice</a:t>
-            </a:r>
-            <a:r>
-              <a:rPr lang="fr-FR" dirty="0" smtClean="0"/>
-              <a:t/>
-            </a:r>
-            <a:br>
-              <a:rPr lang="fr-FR" dirty="0" smtClean="0"/>
-            </a:br>
-            <a:r>
-              <a:rPr lang="fr-FR" dirty="0" smtClean="0"/>
-              <a:t>E. </a:t>
-            </a:r>
-            <a:r>
-              <a:rPr lang="fr-FR" dirty="0" err="1" smtClean="0"/>
-              <a:t>Rescorla</a:t>
-            </a:r>
-            <a:r>
-              <a:rPr lang="fr-FR" dirty="0" smtClean="0"/>
-              <a:t>, J. </a:t>
-            </a:r>
-            <a:r>
-              <a:rPr lang="fr-FR" dirty="0" err="1" smtClean="0"/>
-              <a:t>Uberti</a:t>
-            </a:r>
-            <a:r>
-              <a:rPr lang="fr-FR" dirty="0" smtClean="0"/>
-              <a:t>, E. Ivov</a:t>
+              <a:rPr lang="fr-FR" smtClean="0"/>
+              <a:t>draft-ivov-mmusic-trickle-ice E. Rescorla, J. Uberti, E. Ivov</a:t>
             </a:r>
             <a:endParaRPr lang="en-US" dirty="0" smtClean="0"/>
-          </a:p>
-        </p:txBody>
-      </p:sp>
-      <p:sp>
-        <p:nvSpPr>
-          <p:cNvPr id="5" name="Espace réservé du numéro de diapositive 4"/>
-          <p:cNvSpPr>
-            <a:spLocks noGrp="1"/>
-          </p:cNvSpPr>
-          <p:nvPr>
-            <p:ph type="sldNum" sz="quarter" idx="12"/>
-          </p:nvPr>
-        </p:nvSpPr>
-        <p:spPr>
-          <a:xfrm>
-            <a:off x="6553200" y="6492875"/>
-            <a:ext cx="2133600" cy="365125"/>
-          </a:xfrm>
-        </p:spPr>
-        <p:txBody>
-          <a:bodyPr/>
-          <a:lstStyle/>
-          <a:p>
-            <a:fld id="{83363BB8-67C3-44C4-A9E3-5652E069104A}" type="slidenum">
-              <a:rPr lang="en-US" smtClean="0"/>
-              <a:pPr/>
-              <a:t>13</a:t>
-            </a:fld>
-            <a:endParaRPr lang="en-US"/>
           </a:p>
         </p:txBody>
       </p:sp>
@@ -4957,6 +4860,34 @@
           </a:p>
         </p:txBody>
       </p:sp>
+      <p:sp>
+        <p:nvSpPr>
+          <p:cNvPr id="43" name="Espace réservé du numéro de diapositive 42"/>
+          <p:cNvSpPr>
+            <a:spLocks noGrp="1"/>
+          </p:cNvSpPr>
+          <p:nvPr>
+            <p:ph type="sldNum" sz="quarter" idx="4"/>
+          </p:nvPr>
+        </p:nvSpPr>
+        <p:spPr/>
+        <p:txBody>
+          <a:bodyPr/>
+          <a:lstStyle/>
+          <a:p>
+            <a:fld id="{83363BB8-67C3-44C4-A9E3-5652E069104A}" type="slidenum">
+              <a:rPr lang="en-US" smtClean="0"/>
+              <a:pPr/>
+              <a:t>13</a:t>
+            </a:fld>
+            <a:r>
+              <a:rPr lang="en-US" smtClean="0"/>
+              <a:t>/18</a:t>
+            </a:r>
+            <a:endParaRPr lang="en-US" dirty="0"/>
+          </a:p>
+        </p:txBody>
+      </p:sp>
     </p:spTree>
   </p:cSld>
   <p:clrMapOvr>
@@ -5241,27 +5172,21 @@
           <a:lstStyle/>
           <a:p>
             <a:r>
-              <a:rPr lang="en-GB" smtClean="0"/>
-              <a:t>draft-ivov-mmusic-trickle-ice</a:t>
-            </a:r>
-            <a:br>
-              <a:rPr lang="en-GB" smtClean="0"/>
-            </a:br>
-            <a:r>
-              <a:rPr lang="en-GB" smtClean="0"/>
-              <a:t>E. Rescorla, J. Uberti, E. Ivov</a:t>
-            </a:r>
+              <a:rPr lang="fr-FR" smtClean="0"/>
+              <a:t>draft-ivov-mmusic-trickle-ice E. Rescorla, J. Uberti, E. Ivov</a:t>
+            </a:r>
+            <a:endParaRPr lang="en-GB" smtClean="0"/>
           </a:p>
         </p:txBody>
       </p:sp>
       <p:sp>
         <p:nvSpPr>
-          <p:cNvPr id="5" name="Espace réservé du numéro de diapositive 4"/>
+          <p:cNvPr id="6" name="Espace réservé du numéro de diapositive 5"/>
           <p:cNvSpPr>
             <a:spLocks noGrp="1"/>
           </p:cNvSpPr>
           <p:nvPr>
-            <p:ph type="sldNum" sz="quarter" idx="12"/>
+            <p:ph type="sldNum" sz="quarter" idx="4"/>
           </p:nvPr>
         </p:nvSpPr>
         <p:spPr/>
@@ -5270,11 +5195,15 @@
           <a:lstStyle/>
           <a:p>
             <a:fld id="{83363BB8-67C3-44C4-A9E3-5652E069104A}" type="slidenum">
-              <a:rPr lang="en-GB" smtClean="0"/>
+              <a:rPr lang="en-US" smtClean="0"/>
               <a:pPr/>
               <a:t>14</a:t>
             </a:fld>
-            <a:endParaRPr lang="en-GB"/>
+            <a:r>
+              <a:rPr lang="en-US" smtClean="0"/>
+              <a:t>/18</a:t>
+            </a:r>
+            <a:endParaRPr lang="en-US" dirty="0"/>
           </a:p>
         </p:txBody>
       </p:sp>
@@ -5715,27 +5644,21 @@
           <a:lstStyle/>
           <a:p>
             <a:r>
-              <a:rPr lang="en-GB" smtClean="0"/>
-              <a:t>draft-ivov-mmusic-trickle-ice</a:t>
-            </a:r>
-            <a:br>
-              <a:rPr lang="en-GB" smtClean="0"/>
-            </a:br>
-            <a:r>
-              <a:rPr lang="en-GB" smtClean="0"/>
-              <a:t>E. Rescorla, J. Uberti, E. Ivov</a:t>
-            </a:r>
+              <a:rPr lang="fr-FR" smtClean="0"/>
+              <a:t>draft-ivov-mmusic-trickle-ice E. Rescorla, J. Uberti, E. Ivov</a:t>
+            </a:r>
+            <a:endParaRPr lang="en-GB" smtClean="0"/>
           </a:p>
         </p:txBody>
       </p:sp>
       <p:sp>
         <p:nvSpPr>
-          <p:cNvPr id="5" name="Espace réservé du numéro de diapositive 4"/>
+          <p:cNvPr id="6" name="Espace réservé du numéro de diapositive 5"/>
           <p:cNvSpPr>
             <a:spLocks noGrp="1"/>
           </p:cNvSpPr>
           <p:nvPr>
-            <p:ph type="sldNum" sz="quarter" idx="12"/>
+            <p:ph type="sldNum" sz="quarter" idx="4"/>
           </p:nvPr>
         </p:nvSpPr>
         <p:spPr/>
@@ -5744,11 +5667,15 @@
           <a:lstStyle/>
           <a:p>
             <a:fld id="{83363BB8-67C3-44C4-A9E3-5652E069104A}" type="slidenum">
-              <a:rPr lang="en-GB" smtClean="0"/>
+              <a:rPr lang="en-US" smtClean="0"/>
               <a:pPr/>
               <a:t>15</a:t>
             </a:fld>
-            <a:endParaRPr lang="en-GB"/>
+            <a:r>
+              <a:rPr lang="en-US" smtClean="0"/>
+              <a:t>/18</a:t>
+            </a:r>
+            <a:endParaRPr lang="en-US" dirty="0"/>
           </a:p>
         </p:txBody>
       </p:sp>
@@ -5975,27 +5902,21 @@
           <a:lstStyle/>
           <a:p>
             <a:r>
-              <a:rPr lang="en-GB" smtClean="0"/>
-              <a:t>draft-ivov-mmusic-trickle-ice</a:t>
-            </a:r>
-            <a:br>
-              <a:rPr lang="en-GB" smtClean="0"/>
-            </a:br>
-            <a:r>
-              <a:rPr lang="en-GB" smtClean="0"/>
-              <a:t>E. Rescorla, J. Uberti, E. Ivov</a:t>
-            </a:r>
+              <a:rPr lang="fr-FR" smtClean="0"/>
+              <a:t>draft-ivov-mmusic-trickle-ice E. Rescorla, J. Uberti, E. Ivov</a:t>
+            </a:r>
+            <a:endParaRPr lang="en-GB" smtClean="0"/>
           </a:p>
         </p:txBody>
       </p:sp>
       <p:sp>
         <p:nvSpPr>
-          <p:cNvPr id="5" name="Espace réservé du numéro de diapositive 4"/>
+          <p:cNvPr id="6" name="Espace réservé du numéro de diapositive 5"/>
           <p:cNvSpPr>
             <a:spLocks noGrp="1"/>
           </p:cNvSpPr>
           <p:nvPr>
-            <p:ph type="sldNum" sz="quarter" idx="12"/>
+            <p:ph type="sldNum" sz="quarter" idx="4"/>
           </p:nvPr>
         </p:nvSpPr>
         <p:spPr/>
@@ -6004,11 +5925,15 @@
           <a:lstStyle/>
           <a:p>
             <a:fld id="{83363BB8-67C3-44C4-A9E3-5652E069104A}" type="slidenum">
-              <a:rPr lang="en-GB" smtClean="0"/>
+              <a:rPr lang="en-US" smtClean="0"/>
               <a:pPr/>
               <a:t>16</a:t>
             </a:fld>
-            <a:endParaRPr lang="en-GB"/>
+            <a:r>
+              <a:rPr lang="en-US" smtClean="0"/>
+              <a:t>/18</a:t>
+            </a:r>
+            <a:endParaRPr lang="en-US" dirty="0"/>
           </a:p>
         </p:txBody>
       </p:sp>
@@ -6097,40 +6022,10 @@
           <a:lstStyle/>
           <a:p>
             <a:r>
-              <a:rPr lang="en-GB" smtClean="0"/>
-              <a:t>draft-ivov-mmusic-trickle-ice</a:t>
-            </a:r>
-            <a:br>
-              <a:rPr lang="en-GB" smtClean="0"/>
-            </a:br>
-            <a:r>
-              <a:rPr lang="en-GB" smtClean="0"/>
-              <a:t>E. Rescorla, J. Uberti, E. Ivov</a:t>
-            </a:r>
-          </a:p>
-        </p:txBody>
-      </p:sp>
-      <p:sp>
-        <p:nvSpPr>
-          <p:cNvPr id="5" name="Espace réservé du numéro de diapositive 4"/>
-          <p:cNvSpPr>
-            <a:spLocks noGrp="1"/>
-          </p:cNvSpPr>
-          <p:nvPr>
-            <p:ph type="sldNum" sz="quarter" idx="12"/>
-          </p:nvPr>
-        </p:nvSpPr>
-        <p:spPr/>
-        <p:txBody>
-          <a:bodyPr/>
-          <a:lstStyle/>
-          <a:p>
-            <a:fld id="{83363BB8-67C3-44C4-A9E3-5652E069104A}" type="slidenum">
-              <a:rPr lang="en-GB" smtClean="0"/>
-              <a:pPr/>
-              <a:t>17</a:t>
-            </a:fld>
-            <a:endParaRPr lang="en-GB"/>
+              <a:rPr lang="fr-FR" smtClean="0"/>
+              <a:t>draft-ivov-mmusic-trickle-ice E. Rescorla, J. Uberti, E. Ivov</a:t>
+            </a:r>
+            <a:endParaRPr lang="en-GB" smtClean="0"/>
           </a:p>
         </p:txBody>
       </p:sp>
@@ -6420,6 +6315,34 @@
               <a:t> (WIP)</a:t>
             </a:r>
             <a:endParaRPr lang="en-GB" sz="1800" dirty="0" smtClean="0"/>
+          </a:p>
+        </p:txBody>
+      </p:sp>
+      <p:sp>
+        <p:nvSpPr>
+          <p:cNvPr id="8" name="Espace réservé du numéro de diapositive 7"/>
+          <p:cNvSpPr>
+            <a:spLocks noGrp="1"/>
+          </p:cNvSpPr>
+          <p:nvPr>
+            <p:ph type="sldNum" sz="quarter" idx="4"/>
+          </p:nvPr>
+        </p:nvSpPr>
+        <p:spPr/>
+        <p:txBody>
+          <a:bodyPr/>
+          <a:lstStyle/>
+          <a:p>
+            <a:fld id="{83363BB8-67C3-44C4-A9E3-5652E069104A}" type="slidenum">
+              <a:rPr lang="en-US" smtClean="0"/>
+              <a:pPr/>
+              <a:t>17</a:t>
+            </a:fld>
+            <a:r>
+              <a:rPr lang="en-US" smtClean="0"/>
+              <a:t>/18</a:t>
+            </a:r>
+            <a:endParaRPr lang="en-US" dirty="0"/>
           </a:p>
         </p:txBody>
       </p:sp>
@@ -6482,35 +6405,6 @@
               <a:t>A SIP Usage for Trickle ICE (3/3)</a:t>
             </a:r>
             <a:endParaRPr lang="en-GB" sz="4444" dirty="0"/>
-          </a:p>
-        </p:txBody>
-      </p:sp>
-      <p:sp>
-        <p:nvSpPr>
-          <p:cNvPr id="5" name="Espace réservé du numéro de diapositive 4"/>
-          <p:cNvSpPr>
-            <a:spLocks noGrp="1"/>
-          </p:cNvSpPr>
-          <p:nvPr>
-            <p:ph type="sldNum" sz="quarter" idx="12"/>
-          </p:nvPr>
-        </p:nvSpPr>
-        <p:spPr>
-          <a:xfrm>
-            <a:off x="6858000" y="6356350"/>
-            <a:ext cx="2133600" cy="365125"/>
-          </a:xfrm>
-        </p:spPr>
-        <p:txBody>
-          <a:bodyPr/>
-          <a:lstStyle/>
-          <a:p>
-            <a:fld id="{83363BB8-67C3-44C4-A9E3-5652E069104A}" type="slidenum">
-              <a:rPr lang="en-GB" smtClean="0"/>
-              <a:pPr/>
-              <a:t>18</a:t>
-            </a:fld>
-            <a:endParaRPr lang="en-GB"/>
           </a:p>
         </p:txBody>
       </p:sp>
@@ -7952,6 +7846,57 @@
           </a:p>
         </p:txBody>
       </p:sp>
+      <p:sp>
+        <p:nvSpPr>
+          <p:cNvPr id="50" name="Espace réservé du pied de page 49"/>
+          <p:cNvSpPr>
+            <a:spLocks noGrp="1"/>
+          </p:cNvSpPr>
+          <p:nvPr>
+            <p:ph type="ftr" sz="quarter" idx="11"/>
+          </p:nvPr>
+        </p:nvSpPr>
+        <p:spPr/>
+        <p:txBody>
+          <a:bodyPr/>
+          <a:lstStyle/>
+          <a:p>
+            <a:r>
+              <a:rPr lang="fr-FR" smtClean="0"/>
+              <a:t>draft-ivov-mmusic-trickle-ice E. Rescorla, J. Uberti, E. Ivov</a:t>
+            </a:r>
+            <a:endParaRPr lang="en-US" dirty="0" smtClean="0"/>
+          </a:p>
+        </p:txBody>
+      </p:sp>
+      <p:sp>
+        <p:nvSpPr>
+          <p:cNvPr id="52" name="Espace réservé du numéro de diapositive 51"/>
+          <p:cNvSpPr>
+            <a:spLocks noGrp="1"/>
+          </p:cNvSpPr>
+          <p:nvPr>
+            <p:ph type="sldNum" sz="quarter" idx="4"/>
+          </p:nvPr>
+        </p:nvSpPr>
+        <p:spPr/>
+        <p:txBody>
+          <a:bodyPr/>
+          <a:lstStyle/>
+          <a:p>
+            <a:fld id="{83363BB8-67C3-44C4-A9E3-5652E069104A}" type="slidenum">
+              <a:rPr lang="en-US" smtClean="0"/>
+              <a:pPr/>
+              <a:t>18</a:t>
+            </a:fld>
+            <a:r>
+              <a:rPr lang="en-US" smtClean="0"/>
+              <a:t>/18</a:t>
+            </a:r>
+            <a:endParaRPr lang="en-US" dirty="0"/>
+          </a:p>
+        </p:txBody>
+      </p:sp>
     </p:spTree>
   </p:cSld>
   <p:clrMapOvr>
@@ -8121,30 +8066,6 @@
               <a:t>Reminder: Vanilla ICE</a:t>
             </a:r>
             <a:endParaRPr lang="en-GB" sz="3200"/>
-          </a:p>
-        </p:txBody>
-      </p:sp>
-      <p:sp>
-        <p:nvSpPr>
-          <p:cNvPr id="4" name="Espace réservé du numéro de diapositive 3"/>
-          <p:cNvSpPr>
-            <a:spLocks noGrp="1"/>
-          </p:cNvSpPr>
-          <p:nvPr>
-            <p:ph type="sldNum" sz="quarter" idx="12"/>
-          </p:nvPr>
-        </p:nvSpPr>
-        <p:spPr/>
-        <p:txBody>
-          <a:bodyPr/>
-          <a:lstStyle/>
-          <a:p>
-            <a:fld id="{83363BB8-67C3-44C4-A9E3-5652E069104A}" type="slidenum">
-              <a:rPr lang="en-GB" smtClean="0"/>
-              <a:pPr/>
-              <a:t>2</a:t>
-            </a:fld>
-            <a:endParaRPr lang="en-GB"/>
           </a:p>
         </p:txBody>
       </p:sp>
@@ -9212,6 +9133,57 @@
           </p:spPr>
         </p:cxnSp>
       </p:grpSp>
+      <p:sp>
+        <p:nvSpPr>
+          <p:cNvPr id="40" name="Espace réservé du pied de page 39"/>
+          <p:cNvSpPr>
+            <a:spLocks noGrp="1"/>
+          </p:cNvSpPr>
+          <p:nvPr>
+            <p:ph type="ftr" sz="quarter" idx="11"/>
+          </p:nvPr>
+        </p:nvSpPr>
+        <p:spPr/>
+        <p:txBody>
+          <a:bodyPr/>
+          <a:lstStyle/>
+          <a:p>
+            <a:r>
+              <a:rPr lang="fr-FR" smtClean="0"/>
+              <a:t>draft-ivov-mmusic-trickle-ice E. Rescorla, J. Uberti, E. Ivov</a:t>
+            </a:r>
+            <a:endParaRPr lang="en-US" dirty="0" smtClean="0"/>
+          </a:p>
+        </p:txBody>
+      </p:sp>
+      <p:sp>
+        <p:nvSpPr>
+          <p:cNvPr id="44" name="Espace réservé du numéro de diapositive 43"/>
+          <p:cNvSpPr>
+            <a:spLocks noGrp="1"/>
+          </p:cNvSpPr>
+          <p:nvPr>
+            <p:ph type="sldNum" sz="quarter" idx="4"/>
+          </p:nvPr>
+        </p:nvSpPr>
+        <p:spPr/>
+        <p:txBody>
+          <a:bodyPr/>
+          <a:lstStyle/>
+          <a:p>
+            <a:fld id="{83363BB8-67C3-44C4-A9E3-5652E069104A}" type="slidenum">
+              <a:rPr lang="en-US" smtClean="0"/>
+              <a:pPr/>
+              <a:t>2</a:t>
+            </a:fld>
+            <a:r>
+              <a:rPr lang="en-US" smtClean="0"/>
+              <a:t>/18</a:t>
+            </a:r>
+            <a:endParaRPr lang="en-US" dirty="0"/>
+          </a:p>
+        </p:txBody>
+      </p:sp>
     </p:spTree>
   </p:cSld>
   <p:clrMapOvr>
@@ -9421,30 +9393,6 @@
               <a:t>Reminder: Vanilla ICE vs Trickle ICE</a:t>
             </a:r>
             <a:endParaRPr lang="en-GB" sz="3200"/>
-          </a:p>
-        </p:txBody>
-      </p:sp>
-      <p:sp>
-        <p:nvSpPr>
-          <p:cNvPr id="4" name="Espace réservé du numéro de diapositive 3"/>
-          <p:cNvSpPr>
-            <a:spLocks noGrp="1"/>
-          </p:cNvSpPr>
-          <p:nvPr>
-            <p:ph type="sldNum" sz="quarter" idx="12"/>
-          </p:nvPr>
-        </p:nvSpPr>
-        <p:spPr/>
-        <p:txBody>
-          <a:bodyPr/>
-          <a:lstStyle/>
-          <a:p>
-            <a:fld id="{83363BB8-67C3-44C4-A9E3-5652E069104A}" type="slidenum">
-              <a:rPr lang="en-GB" smtClean="0"/>
-              <a:pPr/>
-              <a:t>3</a:t>
-            </a:fld>
-            <a:endParaRPr lang="en-GB"/>
           </a:p>
         </p:txBody>
       </p:sp>
@@ -11799,6 +11747,57 @@
           </a:p>
         </p:txBody>
       </p:sp>
+      <p:sp>
+        <p:nvSpPr>
+          <p:cNvPr id="83" name="Espace réservé du pied de page 82"/>
+          <p:cNvSpPr>
+            <a:spLocks noGrp="1"/>
+          </p:cNvSpPr>
+          <p:nvPr>
+            <p:ph type="ftr" sz="quarter" idx="11"/>
+          </p:nvPr>
+        </p:nvSpPr>
+        <p:spPr/>
+        <p:txBody>
+          <a:bodyPr/>
+          <a:lstStyle/>
+          <a:p>
+            <a:r>
+              <a:rPr lang="fr-FR" smtClean="0"/>
+              <a:t>draft-ivov-mmusic-trickle-ice E. Rescorla, J. Uberti, E. Ivov</a:t>
+            </a:r>
+            <a:endParaRPr lang="en-US" dirty="0" smtClean="0"/>
+          </a:p>
+        </p:txBody>
+      </p:sp>
+      <p:sp>
+        <p:nvSpPr>
+          <p:cNvPr id="84" name="Espace réservé du numéro de diapositive 83"/>
+          <p:cNvSpPr>
+            <a:spLocks noGrp="1"/>
+          </p:cNvSpPr>
+          <p:nvPr>
+            <p:ph type="sldNum" sz="quarter" idx="4"/>
+          </p:nvPr>
+        </p:nvSpPr>
+        <p:spPr/>
+        <p:txBody>
+          <a:bodyPr/>
+          <a:lstStyle/>
+          <a:p>
+            <a:fld id="{83363BB8-67C3-44C4-A9E3-5652E069104A}" type="slidenum">
+              <a:rPr lang="en-US" smtClean="0"/>
+              <a:pPr/>
+              <a:t>3</a:t>
+            </a:fld>
+            <a:r>
+              <a:rPr lang="en-US" smtClean="0"/>
+              <a:t>/18</a:t>
+            </a:r>
+            <a:endParaRPr lang="en-US" dirty="0"/>
+          </a:p>
+        </p:txBody>
+      </p:sp>
     </p:spTree>
   </p:cSld>
   <p:clrMapOvr>
@@ -12374,27 +12373,21 @@
           <a:lstStyle/>
           <a:p>
             <a:r>
-              <a:rPr lang="en-GB" smtClean="0"/>
-              <a:t>draft-ivov-mmusic-trickle-ice</a:t>
-            </a:r>
-            <a:br>
-              <a:rPr lang="en-GB" smtClean="0"/>
-            </a:br>
-            <a:r>
-              <a:rPr lang="en-GB" smtClean="0"/>
-              <a:t>E. Rescorla, J. Uberti, E. Ivov</a:t>
-            </a:r>
+              <a:rPr lang="fr-FR" smtClean="0"/>
+              <a:t>draft-ivov-mmusic-trickle-ice E. Rescorla, J. Uberti, E. Ivov</a:t>
+            </a:r>
+            <a:endParaRPr lang="en-GB" smtClean="0"/>
           </a:p>
         </p:txBody>
       </p:sp>
       <p:sp>
         <p:nvSpPr>
-          <p:cNvPr id="5" name="Espace réservé du numéro de diapositive 4"/>
+          <p:cNvPr id="6" name="Espace réservé du numéro de diapositive 5"/>
           <p:cNvSpPr>
             <a:spLocks noGrp="1"/>
           </p:cNvSpPr>
           <p:nvPr>
-            <p:ph type="sldNum" sz="quarter" idx="12"/>
+            <p:ph type="sldNum" sz="quarter" idx="4"/>
           </p:nvPr>
         </p:nvSpPr>
         <p:spPr/>
@@ -12403,11 +12396,15 @@
           <a:lstStyle/>
           <a:p>
             <a:fld id="{83363BB8-67C3-44C4-A9E3-5652E069104A}" type="slidenum">
-              <a:rPr lang="en-GB" smtClean="0"/>
+              <a:rPr lang="en-US" smtClean="0"/>
               <a:pPr/>
               <a:t>4</a:t>
             </a:fld>
-            <a:endParaRPr lang="en-GB"/>
+            <a:r>
+              <a:rPr lang="en-US" smtClean="0"/>
+              <a:t>/18</a:t>
+            </a:r>
+            <a:endParaRPr lang="en-US" dirty="0"/>
           </a:p>
         </p:txBody>
       </p:sp>
@@ -12670,27 +12667,21 @@
           <a:lstStyle/>
           <a:p>
             <a:r>
-              <a:rPr lang="en-GB" smtClean="0"/>
-              <a:t>draft-ivov-mmusic-trickle-ice</a:t>
-            </a:r>
-            <a:br>
-              <a:rPr lang="en-GB" smtClean="0"/>
-            </a:br>
-            <a:r>
-              <a:rPr lang="en-GB" smtClean="0"/>
-              <a:t>E. Rescorla, J. Uberti, E. Ivov</a:t>
-            </a:r>
+              <a:rPr lang="fr-FR" smtClean="0"/>
+              <a:t>draft-ivov-mmusic-trickle-ice E. Rescorla, J. Uberti, E. Ivov</a:t>
+            </a:r>
+            <a:endParaRPr lang="en-GB" smtClean="0"/>
           </a:p>
         </p:txBody>
       </p:sp>
       <p:sp>
         <p:nvSpPr>
-          <p:cNvPr id="5" name="Espace réservé du numéro de diapositive 4"/>
+          <p:cNvPr id="6" name="Espace réservé du numéro de diapositive 5"/>
           <p:cNvSpPr>
             <a:spLocks noGrp="1"/>
           </p:cNvSpPr>
           <p:nvPr>
-            <p:ph type="sldNum" sz="quarter" idx="12"/>
+            <p:ph type="sldNum" sz="quarter" idx="4"/>
           </p:nvPr>
         </p:nvSpPr>
         <p:spPr/>
@@ -12699,11 +12690,15 @@
           <a:lstStyle/>
           <a:p>
             <a:fld id="{83363BB8-67C3-44C4-A9E3-5652E069104A}" type="slidenum">
-              <a:rPr lang="en-GB" smtClean="0"/>
+              <a:rPr lang="en-US" smtClean="0"/>
               <a:pPr/>
               <a:t>5</a:t>
             </a:fld>
-            <a:endParaRPr lang="en-GB"/>
+            <a:r>
+              <a:rPr lang="en-US" smtClean="0"/>
+              <a:t>/18</a:t>
+            </a:r>
+            <a:endParaRPr lang="en-US" dirty="0"/>
           </a:p>
         </p:txBody>
       </p:sp>
@@ -12827,40 +12822,10 @@
           <a:lstStyle/>
           <a:p>
             <a:r>
-              <a:rPr lang="en-GB" smtClean="0"/>
-              <a:t>draft-ivov-mmusic-trickle-ice</a:t>
-            </a:r>
-            <a:br>
-              <a:rPr lang="en-GB" smtClean="0"/>
-            </a:br>
-            <a:r>
-              <a:rPr lang="en-GB" smtClean="0"/>
-              <a:t>E. Rescorla, J. Uberti, E. Ivov</a:t>
-            </a:r>
-          </a:p>
-        </p:txBody>
-      </p:sp>
-      <p:sp>
-        <p:nvSpPr>
-          <p:cNvPr id="5" name="Espace réservé du numéro de diapositive 4"/>
-          <p:cNvSpPr>
-            <a:spLocks noGrp="1"/>
-          </p:cNvSpPr>
-          <p:nvPr>
-            <p:ph type="sldNum" sz="quarter" idx="12"/>
-          </p:nvPr>
-        </p:nvSpPr>
-        <p:spPr/>
-        <p:txBody>
-          <a:bodyPr/>
-          <a:lstStyle/>
-          <a:p>
-            <a:fld id="{83363BB8-67C3-44C4-A9E3-5652E069104A}" type="slidenum">
-              <a:rPr lang="en-GB" smtClean="0"/>
-              <a:pPr/>
-              <a:t>6</a:t>
-            </a:fld>
-            <a:endParaRPr lang="en-GB"/>
+              <a:rPr lang="fr-FR" smtClean="0"/>
+              <a:t>draft-ivov-mmusic-trickle-ice E. Rescorla, J. Uberti, E. Ivov</a:t>
+            </a:r>
+            <a:endParaRPr lang="en-GB" smtClean="0"/>
           </a:p>
         </p:txBody>
       </p:sp>
@@ -14017,6 +13982,34 @@
           </a:p>
         </p:txBody>
       </p:sp>
+      <p:sp>
+        <p:nvSpPr>
+          <p:cNvPr id="36" name="Espace réservé du numéro de diapositive 35"/>
+          <p:cNvSpPr>
+            <a:spLocks noGrp="1"/>
+          </p:cNvSpPr>
+          <p:nvPr>
+            <p:ph type="sldNum" sz="quarter" idx="4"/>
+          </p:nvPr>
+        </p:nvSpPr>
+        <p:spPr/>
+        <p:txBody>
+          <a:bodyPr/>
+          <a:lstStyle/>
+          <a:p>
+            <a:fld id="{83363BB8-67C3-44C4-A9E3-5652E069104A}" type="slidenum">
+              <a:rPr lang="en-US" smtClean="0"/>
+              <a:pPr/>
+              <a:t>6</a:t>
+            </a:fld>
+            <a:r>
+              <a:rPr lang="en-US" smtClean="0"/>
+              <a:t>/18</a:t>
+            </a:r>
+            <a:endParaRPr lang="en-US" dirty="0"/>
+          </a:p>
+        </p:txBody>
+      </p:sp>
     </p:spTree>
   </p:cSld>
   <p:clrMapOvr>
@@ -14111,40 +14104,9 @@
           <a:p>
             <a:r>
               <a:rPr lang="fr-FR" smtClean="0"/>
-              <a:t>draft-ivov-mmusic-trickle-ice</a:t>
-            </a:r>
-            <a:br>
-              <a:rPr lang="fr-FR" smtClean="0"/>
-            </a:br>
-            <a:r>
-              <a:rPr lang="fr-FR" smtClean="0"/>
-              <a:t>E. Rescorla, J. Uberti, E. Ivov</a:t>
+              <a:t>draft-ivov-mmusic-trickle-ice E. Rescorla, J. Uberti, E. Ivov</a:t>
             </a:r>
             <a:endParaRPr lang="en-US" dirty="0" smtClean="0"/>
-          </a:p>
-        </p:txBody>
-      </p:sp>
-      <p:sp>
-        <p:nvSpPr>
-          <p:cNvPr id="5" name="Espace réservé du numéro de diapositive 4"/>
-          <p:cNvSpPr>
-            <a:spLocks noGrp="1"/>
-          </p:cNvSpPr>
-          <p:nvPr>
-            <p:ph type="sldNum" sz="quarter" idx="12"/>
-          </p:nvPr>
-        </p:nvSpPr>
-        <p:spPr/>
-        <p:txBody>
-          <a:bodyPr/>
-          <a:lstStyle/>
-          <a:p>
-            <a:fld id="{83363BB8-67C3-44C4-A9E3-5652E069104A}" type="slidenum">
-              <a:rPr lang="en-US" smtClean="0"/>
-              <a:pPr/>
-              <a:t>7</a:t>
-            </a:fld>
-            <a:endParaRPr lang="en-US"/>
           </a:p>
         </p:txBody>
       </p:sp>
@@ -14818,6 +14780,34 @@
               <a:t> compatible</a:t>
             </a:r>
             <a:endParaRPr lang="en-GB" dirty="0"/>
+          </a:p>
+        </p:txBody>
+      </p:sp>
+      <p:sp>
+        <p:nvSpPr>
+          <p:cNvPr id="10" name="Espace réservé du numéro de diapositive 9"/>
+          <p:cNvSpPr>
+            <a:spLocks noGrp="1"/>
+          </p:cNvSpPr>
+          <p:nvPr>
+            <p:ph type="sldNum" sz="quarter" idx="4"/>
+          </p:nvPr>
+        </p:nvSpPr>
+        <p:spPr/>
+        <p:txBody>
+          <a:bodyPr/>
+          <a:lstStyle/>
+          <a:p>
+            <a:fld id="{83363BB8-67C3-44C4-A9E3-5652E069104A}" type="slidenum">
+              <a:rPr lang="en-US" smtClean="0"/>
+              <a:pPr/>
+              <a:t>7</a:t>
+            </a:fld>
+            <a:r>
+              <a:rPr lang="en-US" smtClean="0"/>
+              <a:t>/18</a:t>
+            </a:r>
+            <a:endParaRPr lang="en-US" dirty="0"/>
           </a:p>
         </p:txBody>
       </p:sp>
@@ -14908,40 +14898,9 @@
           <a:p>
             <a:r>
               <a:rPr lang="fr-FR" smtClean="0"/>
-              <a:t>draft-ivov-mmusic-trickle-ice</a:t>
-            </a:r>
-            <a:br>
-              <a:rPr lang="fr-FR" smtClean="0"/>
-            </a:br>
-            <a:r>
-              <a:rPr lang="fr-FR" smtClean="0"/>
-              <a:t>E. Rescorla, J. Uberti, E. Ivov</a:t>
+              <a:t>draft-ivov-mmusic-trickle-ice E. Rescorla, J. Uberti, E. Ivov</a:t>
             </a:r>
             <a:endParaRPr lang="en-US" dirty="0" smtClean="0"/>
-          </a:p>
-        </p:txBody>
-      </p:sp>
-      <p:sp>
-        <p:nvSpPr>
-          <p:cNvPr id="5" name="Espace réservé du numéro de diapositive 4"/>
-          <p:cNvSpPr>
-            <a:spLocks noGrp="1"/>
-          </p:cNvSpPr>
-          <p:nvPr>
-            <p:ph type="sldNum" sz="quarter" idx="12"/>
-          </p:nvPr>
-        </p:nvSpPr>
-        <p:spPr/>
-        <p:txBody>
-          <a:bodyPr/>
-          <a:lstStyle/>
-          <a:p>
-            <a:fld id="{83363BB8-67C3-44C4-A9E3-5652E069104A}" type="slidenum">
-              <a:rPr lang="en-US" smtClean="0"/>
-              <a:pPr/>
-              <a:t>8</a:t>
-            </a:fld>
-            <a:endParaRPr lang="en-US"/>
           </a:p>
         </p:txBody>
       </p:sp>
@@ -15578,6 +15537,34 @@
               <a:latin typeface="Courier New"/>
               <a:cs typeface="Courier New"/>
             </a:endParaRPr>
+          </a:p>
+        </p:txBody>
+      </p:sp>
+      <p:sp>
+        <p:nvSpPr>
+          <p:cNvPr id="8" name="Espace réservé du numéro de diapositive 7"/>
+          <p:cNvSpPr>
+            <a:spLocks noGrp="1"/>
+          </p:cNvSpPr>
+          <p:nvPr>
+            <p:ph type="sldNum" sz="quarter" idx="4"/>
+          </p:nvPr>
+        </p:nvSpPr>
+        <p:spPr/>
+        <p:txBody>
+          <a:bodyPr/>
+          <a:lstStyle/>
+          <a:p>
+            <a:fld id="{83363BB8-67C3-44C4-A9E3-5652E069104A}" type="slidenum">
+              <a:rPr lang="en-US" smtClean="0"/>
+              <a:pPr/>
+              <a:t>8</a:t>
+            </a:fld>
+            <a:r>
+              <a:rPr lang="en-US" smtClean="0"/>
+              <a:t>/18</a:t>
+            </a:r>
+            <a:endParaRPr lang="en-US" dirty="0"/>
           </a:p>
         </p:txBody>
       </p:sp>
@@ -15668,40 +15655,9 @@
           <a:p>
             <a:r>
               <a:rPr lang="fr-FR" smtClean="0"/>
-              <a:t>draft-ivov-mmusic-trickle-ice</a:t>
-            </a:r>
-            <a:br>
-              <a:rPr lang="fr-FR" smtClean="0"/>
-            </a:br>
-            <a:r>
-              <a:rPr lang="fr-FR" smtClean="0"/>
-              <a:t>E. Rescorla, J. Uberti, E. Ivov</a:t>
+              <a:t>draft-ivov-mmusic-trickle-ice E. Rescorla, J. Uberti, E. Ivov</a:t>
             </a:r>
             <a:endParaRPr lang="en-US" dirty="0" smtClean="0"/>
-          </a:p>
-        </p:txBody>
-      </p:sp>
-      <p:sp>
-        <p:nvSpPr>
-          <p:cNvPr id="5" name="Espace réservé du numéro de diapositive 4"/>
-          <p:cNvSpPr>
-            <a:spLocks noGrp="1"/>
-          </p:cNvSpPr>
-          <p:nvPr>
-            <p:ph type="sldNum" sz="quarter" idx="12"/>
-          </p:nvPr>
-        </p:nvSpPr>
-        <p:spPr/>
-        <p:txBody>
-          <a:bodyPr/>
-          <a:lstStyle/>
-          <a:p>
-            <a:fld id="{83363BB8-67C3-44C4-A9E3-5652E069104A}" type="slidenum">
-              <a:rPr lang="en-US" smtClean="0"/>
-              <a:pPr/>
-              <a:t>9</a:t>
-            </a:fld>
-            <a:endParaRPr lang="en-US"/>
           </a:p>
         </p:txBody>
       </p:sp>
@@ -16440,6 +16396,34 @@
               <a:latin typeface="Courier New"/>
               <a:cs typeface="Courier New"/>
             </a:endParaRPr>
+          </a:p>
+        </p:txBody>
+      </p:sp>
+      <p:sp>
+        <p:nvSpPr>
+          <p:cNvPr id="8" name="Espace réservé du numéro de diapositive 7"/>
+          <p:cNvSpPr>
+            <a:spLocks noGrp="1"/>
+          </p:cNvSpPr>
+          <p:nvPr>
+            <p:ph type="sldNum" sz="quarter" idx="4"/>
+          </p:nvPr>
+        </p:nvSpPr>
+        <p:spPr/>
+        <p:txBody>
+          <a:bodyPr/>
+          <a:lstStyle/>
+          <a:p>
+            <a:fld id="{83363BB8-67C3-44C4-A9E3-5652E069104A}" type="slidenum">
+              <a:rPr lang="en-US" smtClean="0"/>
+              <a:pPr/>
+              <a:t>9</a:t>
+            </a:fld>
+            <a:r>
+              <a:rPr lang="en-US" smtClean="0"/>
+              <a:t>/18</a:t>
+            </a:r>
+            <a:endParaRPr lang="en-US" dirty="0"/>
           </a:p>
         </p:txBody>
       </p:sp>

</xml_diff>

<commit_message>
Updates slides as per comments from Justin
</commit_message>
<xml_diff>
--- a/slides/trickle-ice-iet86-orlando.pptx
+++ b/slides/trickle-ice-iet86-orlando.pptx
@@ -5,30 +5,27 @@
     <p:sldMasterId id="2147483648" r:id="rId1"/>
   </p:sldMasterIdLst>
   <p:notesMasterIdLst>
-    <p:notesMasterId r:id="rId20"/>
+    <p:notesMasterId r:id="rId17"/>
   </p:notesMasterIdLst>
   <p:handoutMasterIdLst>
-    <p:handoutMasterId r:id="rId21"/>
+    <p:handoutMasterId r:id="rId18"/>
   </p:handoutMasterIdLst>
   <p:sldIdLst>
     <p:sldId id="257" r:id="rId2"/>
     <p:sldId id="277" r:id="rId3"/>
     <p:sldId id="279" r:id="rId4"/>
-    <p:sldId id="275" r:id="rId5"/>
-    <p:sldId id="299" r:id="rId6"/>
-    <p:sldId id="294" r:id="rId7"/>
+    <p:sldId id="299" r:id="rId5"/>
+    <p:sldId id="294" r:id="rId6"/>
+    <p:sldId id="275" r:id="rId7"/>
     <p:sldId id="292" r:id="rId8"/>
     <p:sldId id="296" r:id="rId9"/>
     <p:sldId id="297" r:id="rId10"/>
     <p:sldId id="298" r:id="rId11"/>
     <p:sldId id="295" r:id="rId12"/>
     <p:sldId id="293" r:id="rId13"/>
-    <p:sldId id="282" r:id="rId14"/>
-    <p:sldId id="286" r:id="rId15"/>
-    <p:sldId id="284" r:id="rId16"/>
-    <p:sldId id="289" r:id="rId17"/>
-    <p:sldId id="290" r:id="rId18"/>
-    <p:sldId id="291" r:id="rId19"/>
+    <p:sldId id="289" r:id="rId14"/>
+    <p:sldId id="290" r:id="rId15"/>
+    <p:sldId id="291" r:id="rId16"/>
   </p:sldIdLst>
   <p:sldSz cx="9144000" cy="6858000" type="screen4x3"/>
   <p:notesSz cx="6858000" cy="9144000"/>
@@ -3572,15 +3569,160 @@
         </p:spPr>
         <p:txBody>
           <a:bodyPr>
-            <a:normAutofit/>
+            <a:normAutofit fontScale="90000"/>
           </a:bodyPr>
           <a:lstStyle/>
           <a:p>
             <a:r>
-              <a:rPr lang="en-GB" sz="4000" dirty="0" smtClean="0"/>
-              <a:t>Half Trickle</a:t>
-            </a:r>
-            <a:endParaRPr lang="en-GB" sz="4000" dirty="0"/>
+              <a:rPr lang="en-GB" sz="2667" dirty="0" smtClean="0"/>
+              <a:t>Appendix:</a:t>
+            </a:r>
+            <a:br>
+              <a:rPr lang="en-GB" sz="2667" dirty="0" smtClean="0"/>
+            </a:br>
+            <a:r>
+              <a:rPr lang="en-GB" sz="3556" dirty="0" smtClean="0"/>
+              <a:t>A SIP Usage for Trickle ICE (1/3)</a:t>
+            </a:r>
+            <a:endParaRPr lang="en-GB" sz="4444" dirty="0"/>
+          </a:p>
+        </p:txBody>
+      </p:sp>
+      <p:sp>
+        <p:nvSpPr>
+          <p:cNvPr id="3" name="Espace réservé du contenu 2"/>
+          <p:cNvSpPr>
+            <a:spLocks noGrp="1"/>
+          </p:cNvSpPr>
+          <p:nvPr>
+            <p:ph idx="1"/>
+          </p:nvPr>
+        </p:nvSpPr>
+        <p:spPr>
+          <a:xfrm>
+            <a:off x="457200" y="1143000"/>
+            <a:ext cx="7620000" cy="4724400"/>
+          </a:xfrm>
+        </p:spPr>
+        <p:txBody>
+          <a:bodyPr>
+            <a:noAutofit/>
+          </a:bodyPr>
+          <a:lstStyle/>
+          <a:p>
+            <a:pPr indent="20638" algn="just"/>
+            <a:r>
+              <a:rPr lang="en-GB" sz="2400" dirty="0" smtClean="0"/>
+              <a:t> SIP Applications would always do half trickle unless explicitly configured otherwise</a:t>
+            </a:r>
+          </a:p>
+          <a:p>
+            <a:pPr indent="20638" algn="just">
+              <a:buNone/>
+            </a:pPr>
+            <a:endParaRPr lang="en-GB" sz="2400" dirty="0" smtClean="0"/>
+          </a:p>
+          <a:p>
+            <a:pPr indent="20638" algn="just"/>
+            <a:r>
+              <a:rPr lang="en-GB" sz="2400" dirty="0" smtClean="0"/>
+              <a:t> Trickling will happen with in-dialog SIP INFO requests as per RFC </a:t>
+            </a:r>
+            <a:r>
+              <a:rPr lang="en-GB" sz="2400" dirty="0" smtClean="0"/>
+              <a:t>6086. </a:t>
+            </a:r>
+          </a:p>
+          <a:p>
+            <a:pPr indent="20638" algn="just"/>
+            <a:endParaRPr lang="en-GB" sz="2400" dirty="0" smtClean="0"/>
+          </a:p>
+          <a:p>
+            <a:pPr indent="20638" algn="just"/>
+            <a:r>
+              <a:rPr lang="en-GB" sz="2400" dirty="0" smtClean="0"/>
+              <a:t> </a:t>
+            </a:r>
+            <a:r>
+              <a:rPr lang="fr-FR" sz="2400" dirty="0" smtClean="0"/>
+              <a:t>The INFO Package </a:t>
+            </a:r>
+            <a:r>
+              <a:rPr lang="fr-FR" sz="2400" dirty="0" err="1" smtClean="0"/>
+              <a:t>token</a:t>
+            </a:r>
+            <a:r>
+              <a:rPr lang="fr-FR" sz="2400" dirty="0" smtClean="0"/>
+              <a:t> </a:t>
+            </a:r>
+            <a:r>
+              <a:rPr lang="fr-FR" sz="2400" dirty="0" err="1" smtClean="0"/>
+              <a:t>name</a:t>
+            </a:r>
+            <a:r>
+              <a:rPr lang="fr-FR" sz="2400" dirty="0" smtClean="0"/>
+              <a:t> for </a:t>
+            </a:r>
+            <a:r>
+              <a:rPr lang="fr-FR" sz="2400" dirty="0" err="1" smtClean="0"/>
+              <a:t>this</a:t>
+            </a:r>
+            <a:r>
+              <a:rPr lang="fr-FR" sz="2400" dirty="0" smtClean="0"/>
+              <a:t> package </a:t>
+            </a:r>
+            <a:r>
+              <a:rPr lang="fr-FR" sz="2400" dirty="0" err="1" smtClean="0"/>
+              <a:t>is</a:t>
+            </a:r>
+            <a:r>
+              <a:rPr lang="fr-FR" sz="2400" dirty="0" smtClean="0"/>
+              <a:t> "</a:t>
+            </a:r>
+            <a:r>
+              <a:rPr lang="fr-FR" sz="2400" dirty="0" err="1" smtClean="0"/>
+              <a:t>trickle-ice</a:t>
+            </a:r>
+            <a:r>
+              <a:rPr lang="fr-FR" sz="2400" dirty="0" smtClean="0"/>
+              <a:t>”</a:t>
+            </a:r>
+            <a:r>
+              <a:rPr lang="en-GB" sz="2400" dirty="0" smtClean="0"/>
+              <a:t>	</a:t>
+            </a:r>
+          </a:p>
+          <a:p>
+            <a:pPr lvl="1" indent="20638" algn="just"/>
+            <a:r>
+              <a:rPr lang="en-GB" sz="2400" dirty="0" smtClean="0"/>
+              <a:t> Does not mandate GRUU support</a:t>
+            </a:r>
+          </a:p>
+          <a:p>
+            <a:pPr lvl="1" indent="20638" algn="just">
+              <a:buNone/>
+            </a:pPr>
+            <a:endParaRPr lang="en-GB" sz="2400" dirty="0" smtClean="0"/>
+          </a:p>
+          <a:p>
+            <a:pPr indent="20638" algn="just"/>
+            <a:r>
+              <a:rPr lang="en-GB" sz="2400" dirty="0" smtClean="0"/>
+              <a:t> Does not remove the requirement for doing a re-INVITE upon completion of ICE processing. </a:t>
+            </a:r>
+          </a:p>
+          <a:p>
+            <a:pPr indent="20638" algn="just">
+              <a:buNone/>
+            </a:pPr>
+            <a:endParaRPr lang="en-GB" sz="2400" dirty="0" smtClean="0"/>
+          </a:p>
+          <a:p>
+            <a:pPr lvl="1" indent="20638" algn="just">
+              <a:buNone/>
+            </a:pPr>
+            <a:endParaRPr lang="en-GB" sz="2400" dirty="0" smtClean="0"/>
           </a:p>
         </p:txBody>
       </p:sp>
@@ -3594,12 +3736,7 @@
             <p:ph type="ftr" sz="quarter" idx="11"/>
           </p:nvPr>
         </p:nvSpPr>
-        <p:spPr>
-          <a:xfrm>
-            <a:off x="3124200" y="6400800"/>
-            <a:ext cx="2895600" cy="365125"/>
-          </a:xfrm>
-        </p:spPr>
+        <p:spPr/>
         <p:txBody>
           <a:bodyPr/>
           <a:lstStyle/>
@@ -3608,1261 +3745,13 @@
               <a:rPr lang="fr-FR" smtClean="0"/>
               <a:t>draft-ivov-mmusic-trickle-ice E. Rescorla, J. Uberti, E. Ivov</a:t>
             </a:r>
-            <a:endParaRPr lang="en-US" dirty="0" smtClean="0"/>
-          </a:p>
-        </p:txBody>
-      </p:sp>
-      <p:cxnSp>
-        <p:nvCxnSpPr>
-          <p:cNvPr id="40" name="Connecteur droit 39"/>
-          <p:cNvCxnSpPr/>
-          <p:nvPr/>
-        </p:nvCxnSpPr>
-        <p:spPr bwMode="auto">
-          <a:xfrm rot="5400000" flipH="1" flipV="1">
-            <a:off x="3931819" y="4170182"/>
-            <a:ext cx="4258902" cy="1588"/>
-          </a:xfrm>
-          <a:prstGeom prst="line">
-            <a:avLst/>
-          </a:prstGeom>
-          <a:solidFill>
-            <a:schemeClr val="accent1"/>
-          </a:solidFill>
-          <a:ln w="19050" cap="flat" cmpd="sng" algn="ctr">
-            <a:solidFill>
-              <a:schemeClr val="tx1"/>
-            </a:solidFill>
-            <a:prstDash val="solid"/>
-            <a:round/>
-            <a:headEnd type="none" w="med" len="med"/>
-            <a:tailEnd type="none" w="med" len="med"/>
-          </a:ln>
-          <a:effectLst/>
-        </p:spPr>
-      </p:cxnSp>
-      <p:cxnSp>
-        <p:nvCxnSpPr>
-          <p:cNvPr id="41" name="Connecteur droit 40"/>
-          <p:cNvCxnSpPr/>
-          <p:nvPr/>
-        </p:nvCxnSpPr>
-        <p:spPr bwMode="auto">
-          <a:xfrm rot="5400000" flipH="1" flipV="1">
-            <a:off x="4917267" y="4170182"/>
-            <a:ext cx="4258902" cy="1588"/>
-          </a:xfrm>
-          <a:prstGeom prst="line">
-            <a:avLst/>
-          </a:prstGeom>
-          <a:solidFill>
-            <a:schemeClr val="accent1"/>
-          </a:solidFill>
-          <a:ln w="19050" cap="flat" cmpd="sng" algn="ctr">
-            <a:solidFill>
-              <a:schemeClr val="tx1"/>
-            </a:solidFill>
-            <a:prstDash val="solid"/>
-            <a:round/>
-            <a:headEnd type="none" w="med" len="med"/>
-            <a:tailEnd type="none" w="med" len="med"/>
-          </a:ln>
-          <a:effectLst/>
-        </p:spPr>
-      </p:cxnSp>
-      <p:pic>
-        <p:nvPicPr>
-          <p:cNvPr id="42" name="Image 41" descr="cn.emf"/>
-          <p:cNvPicPr>
-            <a:picLocks noChangeAspect="1"/>
-          </p:cNvPicPr>
-          <p:nvPr/>
-        </p:nvPicPr>
-        <p:blipFill>
-          <a:blip r:embed="rId2"/>
-          <a:stretch>
-            <a:fillRect/>
-          </a:stretch>
-        </p:blipFill>
-        <p:spPr>
-          <a:xfrm>
-            <a:off x="5766116" y="915917"/>
-            <a:ext cx="547598" cy="531170"/>
-          </a:xfrm>
-          <a:prstGeom prst="rect">
-            <a:avLst/>
-          </a:prstGeom>
-          <a:effectLst>
-            <a:outerShdw blurRad="50800" dist="38100" dir="2700000" algn="tl" rotWithShape="0">
-              <a:prstClr val="black">
-                <a:alpha val="40000"/>
-              </a:prstClr>
-            </a:outerShdw>
-          </a:effectLst>
-        </p:spPr>
-      </p:pic>
-      <p:grpSp>
-        <p:nvGrpSpPr>
-          <p:cNvPr id="7" name="Grouper 45"/>
-          <p:cNvGrpSpPr/>
-          <p:nvPr/>
-        </p:nvGrpSpPr>
-        <p:grpSpPr>
-          <a:xfrm>
-            <a:off x="6283924" y="914400"/>
-            <a:ext cx="1564676" cy="990600"/>
-            <a:chOff x="3469676" y="914400"/>
-            <a:chExt cx="1564676" cy="990600"/>
-          </a:xfrm>
-        </p:grpSpPr>
-        <p:pic>
-          <p:nvPicPr>
-            <p:cNvPr id="47" name="Picture 6"/>
-            <p:cNvPicPr>
-              <a:picLocks noChangeAspect="1" noChangeArrowheads="1"/>
-            </p:cNvPicPr>
-            <p:nvPr/>
-          </p:nvPicPr>
-          <p:blipFill>
-            <a:blip r:embed="rId3" cstate="print">
-              <a:clrChange>
-                <a:clrFrom>
-                  <a:srgbClr val="FFFFFF"/>
-                </a:clrFrom>
-                <a:clrTo>
-                  <a:srgbClr val="FFFFFF">
-                    <a:alpha val="0"/>
-                  </a:srgbClr>
-                </a:clrTo>
-              </a:clrChange>
-              <a:grayscl/>
-            </a:blip>
-            <a:srcRect/>
-            <a:stretch>
-              <a:fillRect/>
-            </a:stretch>
-          </p:blipFill>
-          <p:spPr bwMode="auto">
-            <a:xfrm>
-              <a:off x="4035586" y="914400"/>
-              <a:ext cx="384014" cy="534205"/>
-            </a:xfrm>
-            <a:prstGeom prst="rect">
-              <a:avLst/>
-            </a:prstGeom>
-            <a:noFill/>
-            <a:ln w="9525">
-              <a:noFill/>
-              <a:miter lim="800000"/>
-              <a:headEnd/>
-              <a:tailEnd/>
-            </a:ln>
-            <a:effectLst>
-              <a:outerShdw blurRad="50800" dist="38100" dir="2700000" algn="tl" rotWithShape="0">
-                <a:prstClr val="black">
-                  <a:alpha val="40000"/>
-                </a:prstClr>
-              </a:outerShdw>
-            </a:effectLst>
-          </p:spPr>
-        </p:pic>
-        <p:sp>
-          <p:nvSpPr>
-            <p:cNvPr id="48" name="Content Placeholder 2"/>
-            <p:cNvSpPr txBox="1">
-              <a:spLocks/>
-            </p:cNvSpPr>
-            <p:nvPr/>
-          </p:nvSpPr>
-          <p:spPr>
-            <a:xfrm>
-              <a:off x="3469676" y="1447800"/>
-              <a:ext cx="1564676" cy="457200"/>
-            </a:xfrm>
-            <a:prstGeom prst="rect">
-              <a:avLst/>
-            </a:prstGeom>
-          </p:spPr>
-          <p:txBody>
-            <a:bodyPr vert="horz" lIns="91440" tIns="45720" rIns="91440" bIns="45720" rtlCol="0">
-              <a:noAutofit/>
-            </a:bodyPr>
-            <a:lstStyle/>
-            <a:p>
-              <a:pPr marL="0" marR="0" lvl="0" indent="0" algn="ctr" defTabSz="914400" rtl="0" eaLnBrk="1" fontAlgn="auto" latinLnBrk="0" hangingPunct="1">
-                <a:lnSpc>
-                  <a:spcPct val="100000"/>
-                </a:lnSpc>
-                <a:spcBef>
-                  <a:spcPct val="20000"/>
-                </a:spcBef>
-                <a:spcAft>
-                  <a:spcPts val="0"/>
-                </a:spcAft>
-                <a:buClrTx/>
-                <a:buSzTx/>
-                <a:buFont typeface="Arial" pitchFamily="34" charset="0"/>
-                <a:buNone/>
-                <a:tabLst/>
-                <a:defRPr/>
-              </a:pPr>
-              <a:r>
-                <a:rPr lang="en-US" sz="1400" dirty="0" smtClean="0"/>
-                <a:t>STUN/TURN </a:t>
-              </a:r>
-              <a:br>
-                <a:rPr lang="en-US" sz="1400" dirty="0" smtClean="0"/>
-              </a:br>
-              <a:r>
-                <a:rPr lang="en-US" sz="1400" dirty="0" smtClean="0"/>
-                <a:t>Server </a:t>
-              </a:r>
-              <a:endParaRPr kumimoji="0" lang="en-US" sz="1400" b="0" i="0" u="none" strike="noStrike" kern="1200" cap="none" spc="0" normalizeH="0" baseline="0" noProof="0" dirty="0" smtClean="0">
-                <a:ln>
-                  <a:noFill/>
-                </a:ln>
-                <a:solidFill>
-                  <a:schemeClr val="tx1"/>
-                </a:solidFill>
-                <a:effectLst/>
-                <a:uLnTx/>
-                <a:uFillTx/>
-                <a:latin typeface="+mn-lt"/>
-                <a:ea typeface="+mn-ea"/>
-                <a:cs typeface="+mn-cs"/>
-              </a:endParaRPr>
-            </a:p>
-          </p:txBody>
-        </p:sp>
-      </p:grpSp>
-      <p:sp>
-        <p:nvSpPr>
-          <p:cNvPr id="49" name="Content Placeholder 2"/>
-          <p:cNvSpPr txBox="1">
-            <a:spLocks/>
-          </p:cNvSpPr>
-          <p:nvPr/>
-        </p:nvSpPr>
-        <p:spPr>
-          <a:xfrm>
-            <a:off x="5562600" y="1447800"/>
-            <a:ext cx="955076" cy="304800"/>
-          </a:xfrm>
-          <a:prstGeom prst="rect">
-            <a:avLst/>
-          </a:prstGeom>
-        </p:spPr>
-        <p:txBody>
-          <a:bodyPr vert="horz" lIns="91440" tIns="45720" rIns="91440" bIns="45720" rtlCol="0">
-            <a:normAutofit/>
-          </a:bodyPr>
-          <a:lstStyle/>
-          <a:p>
-            <a:pPr marL="0" marR="0" lvl="0" indent="0" algn="ctr" defTabSz="914400" rtl="0" eaLnBrk="1" fontAlgn="auto" latinLnBrk="0" hangingPunct="1">
-              <a:lnSpc>
-                <a:spcPct val="100000"/>
-              </a:lnSpc>
-              <a:spcBef>
-                <a:spcPct val="20000"/>
-              </a:spcBef>
-              <a:spcAft>
-                <a:spcPts val="0"/>
-              </a:spcAft>
-              <a:buClrTx/>
-              <a:buSzTx/>
-              <a:buFont typeface="Arial" pitchFamily="34" charset="0"/>
-              <a:buNone/>
-              <a:tabLst/>
-              <a:defRPr/>
-            </a:pPr>
-            <a:r>
-              <a:rPr lang="en-US" sz="1400" dirty="0" smtClean="0"/>
-              <a:t>Bob</a:t>
-            </a:r>
-            <a:endParaRPr kumimoji="0" lang="en-US" sz="1400" b="0" i="0" u="none" strike="noStrike" kern="1200" cap="none" spc="0" normalizeH="0" baseline="0" noProof="0" dirty="0" smtClean="0">
-              <a:ln>
-                <a:noFill/>
-              </a:ln>
-              <a:solidFill>
-                <a:schemeClr val="tx1"/>
-              </a:solidFill>
-              <a:effectLst/>
-              <a:uLnTx/>
-              <a:uFillTx/>
-              <a:latin typeface="+mn-lt"/>
-              <a:ea typeface="+mn-ea"/>
-              <a:cs typeface="+mn-cs"/>
-            </a:endParaRPr>
-          </a:p>
-        </p:txBody>
-      </p:sp>
-      <p:grpSp>
-        <p:nvGrpSpPr>
-          <p:cNvPr id="73" name="Grouper 72"/>
-          <p:cNvGrpSpPr/>
-          <p:nvPr/>
-        </p:nvGrpSpPr>
-        <p:grpSpPr>
-          <a:xfrm>
-            <a:off x="1371600" y="914400"/>
-            <a:ext cx="2133600" cy="5249502"/>
-            <a:chOff x="1529152" y="914400"/>
-            <a:chExt cx="2133600" cy="5249502"/>
-          </a:xfrm>
-        </p:grpSpPr>
-        <p:cxnSp>
-          <p:nvCxnSpPr>
-            <p:cNvPr id="38" name="Connecteur droit 37"/>
-            <p:cNvCxnSpPr/>
-            <p:nvPr/>
-          </p:nvCxnSpPr>
-          <p:spPr bwMode="auto">
-            <a:xfrm rot="5400000" flipH="1" flipV="1">
-              <a:off x="121819" y="4033657"/>
-              <a:ext cx="4258902" cy="1588"/>
-            </a:xfrm>
-            <a:prstGeom prst="line">
-              <a:avLst/>
-            </a:prstGeom>
-            <a:solidFill>
-              <a:schemeClr val="accent1"/>
-            </a:solidFill>
-            <a:ln w="19050" cap="flat" cmpd="sng" algn="ctr">
-              <a:solidFill>
-                <a:schemeClr val="tx1"/>
-              </a:solidFill>
-              <a:prstDash val="solid"/>
-              <a:round/>
-              <a:headEnd type="none" w="med" len="med"/>
-              <a:tailEnd type="none" w="med" len="med"/>
-            </a:ln>
-            <a:effectLst/>
-          </p:spPr>
-        </p:cxnSp>
-        <p:cxnSp>
-          <p:nvCxnSpPr>
-            <p:cNvPr id="39" name="Connecteur droit 38"/>
-            <p:cNvCxnSpPr/>
-            <p:nvPr/>
-          </p:nvCxnSpPr>
-          <p:spPr bwMode="auto">
-            <a:xfrm rot="5400000" flipH="1" flipV="1">
-              <a:off x="1076895" y="4033657"/>
-              <a:ext cx="4258902" cy="1588"/>
-            </a:xfrm>
-            <a:prstGeom prst="line">
-              <a:avLst/>
-            </a:prstGeom>
-            <a:solidFill>
-              <a:schemeClr val="accent1"/>
-            </a:solidFill>
-            <a:ln w="19050" cap="flat" cmpd="sng" algn="ctr">
-              <a:solidFill>
-                <a:schemeClr val="tx1"/>
-              </a:solidFill>
-              <a:prstDash val="solid"/>
-              <a:round/>
-              <a:headEnd type="none" w="med" len="med"/>
-              <a:tailEnd type="none" w="med" len="med"/>
-            </a:ln>
-            <a:effectLst/>
-          </p:spPr>
-        </p:cxnSp>
-        <p:grpSp>
-          <p:nvGrpSpPr>
-            <p:cNvPr id="6" name="Grouper 42"/>
-            <p:cNvGrpSpPr/>
-            <p:nvPr/>
-          </p:nvGrpSpPr>
-          <p:grpSpPr>
-            <a:xfrm>
-              <a:off x="1529152" y="914400"/>
-              <a:ext cx="1401972" cy="990600"/>
-              <a:chOff x="-299648" y="914400"/>
-              <a:chExt cx="1401972" cy="990600"/>
-            </a:xfrm>
-          </p:grpSpPr>
-          <p:pic>
-            <p:nvPicPr>
-              <p:cNvPr id="44" name="Picture 6"/>
-              <p:cNvPicPr>
-                <a:picLocks noChangeAspect="1" noChangeArrowheads="1"/>
-              </p:cNvPicPr>
-              <p:nvPr/>
-            </p:nvPicPr>
-            <p:blipFill>
-              <a:blip r:embed="rId3" cstate="print">
-                <a:clrChange>
-                  <a:clrFrom>
-                    <a:srgbClr val="FFFFFF"/>
-                  </a:clrFrom>
-                  <a:clrTo>
-                    <a:srgbClr val="FFFFFF">
-                      <a:alpha val="0"/>
-                    </a:srgbClr>
-                  </a:clrTo>
-                </a:clrChange>
-                <a:grayscl/>
-              </a:blip>
-              <a:srcRect/>
-              <a:stretch>
-                <a:fillRect/>
-              </a:stretch>
-            </p:blipFill>
-            <p:spPr bwMode="auto">
-              <a:xfrm>
-                <a:off x="193076" y="914400"/>
-                <a:ext cx="384014" cy="534205"/>
-              </a:xfrm>
-              <a:prstGeom prst="rect">
-                <a:avLst/>
-              </a:prstGeom>
-              <a:noFill/>
-              <a:ln w="9525">
-                <a:noFill/>
-                <a:miter lim="800000"/>
-                <a:headEnd/>
-                <a:tailEnd/>
-              </a:ln>
-              <a:effectLst>
-                <a:outerShdw blurRad="50800" dist="38100" dir="2700000" algn="tl" rotWithShape="0">
-                  <a:prstClr val="black">
-                    <a:alpha val="40000"/>
-                  </a:prstClr>
-                </a:outerShdw>
-              </a:effectLst>
-            </p:spPr>
-          </p:pic>
-          <p:sp>
-            <p:nvSpPr>
-              <p:cNvPr id="45" name="Content Placeholder 2"/>
-              <p:cNvSpPr txBox="1">
-                <a:spLocks/>
-              </p:cNvSpPr>
-              <p:nvPr/>
-            </p:nvSpPr>
-            <p:spPr>
-              <a:xfrm>
-                <a:off x="-299648" y="1447800"/>
-                <a:ext cx="1401972" cy="457200"/>
-              </a:xfrm>
-              <a:prstGeom prst="rect">
-                <a:avLst/>
-              </a:prstGeom>
-            </p:spPr>
-            <p:txBody>
-              <a:bodyPr vert="horz" lIns="91440" tIns="45720" rIns="91440" bIns="45720" rtlCol="0">
-                <a:noAutofit/>
-              </a:bodyPr>
-              <a:lstStyle/>
-              <a:p>
-                <a:pPr marL="0" marR="0" lvl="0" indent="0" algn="ctr" defTabSz="914400" rtl="0" eaLnBrk="1" fontAlgn="auto" latinLnBrk="0" hangingPunct="1">
-                  <a:lnSpc>
-                    <a:spcPct val="100000"/>
-                  </a:lnSpc>
-                  <a:spcBef>
-                    <a:spcPct val="20000"/>
-                  </a:spcBef>
-                  <a:spcAft>
-                    <a:spcPts val="0"/>
-                  </a:spcAft>
-                  <a:buClrTx/>
-                  <a:buSzTx/>
-                  <a:buFont typeface="Arial" pitchFamily="34" charset="0"/>
-                  <a:buNone/>
-                  <a:tabLst/>
-                  <a:defRPr/>
-                </a:pPr>
-                <a:r>
-                  <a:rPr lang="en-US" sz="1400" dirty="0" smtClean="0"/>
-                  <a:t>STUN /TURN</a:t>
-                </a:r>
-                <a:br>
-                  <a:rPr lang="en-US" sz="1400" dirty="0" smtClean="0"/>
-                </a:br>
-                <a:r>
-                  <a:rPr lang="en-US" sz="1400" dirty="0" smtClean="0"/>
-                  <a:t>Server </a:t>
-                </a:r>
-                <a:endParaRPr kumimoji="0" lang="en-US" sz="1400" b="0" i="0" u="none" strike="noStrike" kern="1200" cap="none" spc="0" normalizeH="0" baseline="0" noProof="0" dirty="0" smtClean="0">
-                  <a:ln>
-                    <a:noFill/>
-                  </a:ln>
-                  <a:solidFill>
-                    <a:schemeClr val="tx1"/>
-                  </a:solidFill>
-                  <a:effectLst/>
-                  <a:uLnTx/>
-                  <a:uFillTx/>
-                  <a:latin typeface="+mn-lt"/>
-                  <a:ea typeface="+mn-ea"/>
-                  <a:cs typeface="+mn-cs"/>
-                </a:endParaRPr>
-              </a:p>
-            </p:txBody>
-          </p:sp>
-        </p:grpSp>
-        <p:grpSp>
-          <p:nvGrpSpPr>
-            <p:cNvPr id="8" name="Grouper 49"/>
-            <p:cNvGrpSpPr/>
-            <p:nvPr/>
-          </p:nvGrpSpPr>
-          <p:grpSpPr>
-            <a:xfrm>
-              <a:off x="2707676" y="914802"/>
-              <a:ext cx="955076" cy="837798"/>
-              <a:chOff x="955076" y="914802"/>
-              <a:chExt cx="955076" cy="837798"/>
-            </a:xfrm>
-          </p:grpSpPr>
-          <p:pic>
-            <p:nvPicPr>
-              <p:cNvPr id="51" name="Image 50" descr="mn.emf"/>
-              <p:cNvPicPr>
-                <a:picLocks noChangeAspect="1"/>
-              </p:cNvPicPr>
-              <p:nvPr/>
-            </p:nvPicPr>
-            <p:blipFill>
-              <a:blip r:embed="rId4">
-                <a:duotone>
-                  <a:srgbClr val="4F81BD">
-                    <a:shade val="45000"/>
-                    <a:satMod val="135000"/>
-                  </a:srgbClr>
-                  <a:prstClr val="white"/>
-                </a:duotone>
-              </a:blip>
-              <a:stretch>
-                <a:fillRect/>
-              </a:stretch>
-            </p:blipFill>
-            <p:spPr>
-              <a:xfrm>
-                <a:off x="1311440" y="914802"/>
-                <a:ext cx="267460" cy="533400"/>
-              </a:xfrm>
-              <a:prstGeom prst="rect">
-                <a:avLst/>
-              </a:prstGeom>
-              <a:effectLst>
-                <a:outerShdw blurRad="50800" dist="38100" dir="2700000" algn="tl" rotWithShape="0">
-                  <a:prstClr val="black">
-                    <a:alpha val="40000"/>
-                  </a:prstClr>
-                </a:outerShdw>
-              </a:effectLst>
-            </p:spPr>
-          </p:pic>
-          <p:sp>
-            <p:nvSpPr>
-              <p:cNvPr id="52" name="Content Placeholder 2"/>
-              <p:cNvSpPr txBox="1">
-                <a:spLocks/>
-              </p:cNvSpPr>
-              <p:nvPr/>
-            </p:nvSpPr>
-            <p:spPr>
-              <a:xfrm>
-                <a:off x="955076" y="1447800"/>
-                <a:ext cx="955076" cy="304800"/>
-              </a:xfrm>
-              <a:prstGeom prst="rect">
-                <a:avLst/>
-              </a:prstGeom>
-            </p:spPr>
-            <p:txBody>
-              <a:bodyPr vert="horz" lIns="91440" tIns="45720" rIns="91440" bIns="45720" rtlCol="0">
-                <a:normAutofit/>
-              </a:bodyPr>
-              <a:lstStyle/>
-              <a:p>
-                <a:pPr marL="0" marR="0" lvl="0" indent="0" algn="ctr" defTabSz="914400" rtl="0" eaLnBrk="1" fontAlgn="auto" latinLnBrk="0" hangingPunct="1">
-                  <a:lnSpc>
-                    <a:spcPct val="100000"/>
-                  </a:lnSpc>
-                  <a:spcBef>
-                    <a:spcPct val="20000"/>
-                  </a:spcBef>
-                  <a:spcAft>
-                    <a:spcPts val="0"/>
-                  </a:spcAft>
-                  <a:buClrTx/>
-                  <a:buSzTx/>
-                  <a:buFont typeface="Arial" pitchFamily="34" charset="0"/>
-                  <a:buNone/>
-                  <a:tabLst/>
-                  <a:defRPr/>
-                </a:pPr>
-                <a:r>
-                  <a:rPr lang="en-US" sz="1400" dirty="0" smtClean="0"/>
-                  <a:t>Alice</a:t>
-                </a:r>
-                <a:endParaRPr kumimoji="0" lang="en-US" sz="1400" b="0" i="0" u="none" strike="noStrike" kern="1200" cap="none" spc="0" normalizeH="0" baseline="0" noProof="0" dirty="0" smtClean="0">
-                  <a:ln>
-                    <a:noFill/>
-                  </a:ln>
-                  <a:solidFill>
-                    <a:schemeClr val="tx1"/>
-                  </a:solidFill>
-                  <a:effectLst/>
-                  <a:uLnTx/>
-                  <a:uFillTx/>
-                  <a:latin typeface="+mn-lt"/>
-                  <a:ea typeface="+mn-ea"/>
-                  <a:cs typeface="+mn-cs"/>
-                </a:endParaRPr>
-              </a:p>
-            </p:txBody>
-          </p:sp>
-        </p:grpSp>
-        <p:grpSp>
-          <p:nvGrpSpPr>
-            <p:cNvPr id="9" name="Grouper 49"/>
-            <p:cNvGrpSpPr/>
-            <p:nvPr/>
-          </p:nvGrpSpPr>
-          <p:grpSpPr>
-            <a:xfrm>
-              <a:off x="2098075" y="1981197"/>
-              <a:ext cx="1326045" cy="1134705"/>
-              <a:chOff x="202124" y="3428992"/>
-              <a:chExt cx="4751648" cy="1134705"/>
-            </a:xfrm>
-          </p:grpSpPr>
-          <p:grpSp>
-            <p:nvGrpSpPr>
-              <p:cNvPr id="10" name="Groupe 14"/>
-              <p:cNvGrpSpPr/>
-              <p:nvPr/>
-            </p:nvGrpSpPr>
-            <p:grpSpPr>
-              <a:xfrm>
-                <a:off x="202124" y="3428422"/>
-                <a:ext cx="4751648" cy="706581"/>
-                <a:chOff x="184996" y="3071810"/>
-                <a:chExt cx="9372360" cy="462892"/>
-              </a:xfrm>
-            </p:grpSpPr>
-            <p:cxnSp>
-              <p:nvCxnSpPr>
-                <p:cNvPr id="56" name="Connecteur droit avec flèche 55"/>
-                <p:cNvCxnSpPr/>
-                <p:nvPr/>
-              </p:nvCxnSpPr>
-              <p:spPr bwMode="auto">
-                <a:xfrm flipH="1">
-                  <a:off x="1234042" y="3071810"/>
-                  <a:ext cx="6818793" cy="1588"/>
-                </a:xfrm>
-                <a:prstGeom prst="straightConnector1">
-                  <a:avLst/>
-                </a:prstGeom>
-                <a:solidFill>
-                  <a:schemeClr val="accent1"/>
-                </a:solidFill>
-                <a:ln w="28575" cap="flat" cmpd="sng" algn="ctr">
-                  <a:solidFill>
-                    <a:schemeClr val="tx1"/>
-                  </a:solidFill>
-                  <a:prstDash val="solid"/>
-                  <a:round/>
-                  <a:headEnd type="none" w="med" len="med"/>
-                  <a:tailEnd type="arrow"/>
-                </a:ln>
-                <a:effectLst>
-                  <a:outerShdw blurRad="50800" dist="38100" dir="2700000" algn="tl" rotWithShape="0">
-                    <a:prstClr val="black">
-                      <a:alpha val="40000"/>
-                    </a:prstClr>
-                  </a:outerShdw>
-                </a:effectLst>
-              </p:spPr>
-            </p:cxnSp>
-            <p:sp>
-              <p:nvSpPr>
-                <p:cNvPr id="57" name="ZoneTexte 56"/>
-                <p:cNvSpPr txBox="1"/>
-                <p:nvPr/>
-              </p:nvSpPr>
-              <p:spPr>
-                <a:xfrm>
-                  <a:off x="184996" y="3323017"/>
-                  <a:ext cx="9372360" cy="211685"/>
-                </a:xfrm>
-                <a:prstGeom prst="rect">
-                  <a:avLst/>
-                </a:prstGeom>
-                <a:noFill/>
-              </p:spPr>
-              <p:txBody>
-                <a:bodyPr wrap="square" rtlCol="0">
-                  <a:spAutoFit/>
-                </a:bodyPr>
-                <a:lstStyle/>
-                <a:p>
-                  <a:pPr algn="ctr"/>
-                  <a:r>
-                    <a:rPr lang="fr-FR" sz="1500" i="0" dirty="0" smtClean="0"/>
-                    <a:t>disco</a:t>
-                  </a:r>
-                  <a:endParaRPr lang="fr-FR" sz="1500" i="0" dirty="0"/>
-                </a:p>
-              </p:txBody>
-            </p:sp>
-          </p:grpSp>
-          <p:cxnSp>
-            <p:nvCxnSpPr>
-              <p:cNvPr id="55" name="Connecteur droit avec flèche 54"/>
-              <p:cNvCxnSpPr/>
-              <p:nvPr/>
-            </p:nvCxnSpPr>
-            <p:spPr bwMode="auto">
-              <a:xfrm flipH="1">
-                <a:off x="733972" y="4561273"/>
-                <a:ext cx="3457027" cy="2424"/>
-              </a:xfrm>
-              <a:prstGeom prst="straightConnector1">
-                <a:avLst/>
-              </a:prstGeom>
-              <a:solidFill>
-                <a:schemeClr val="accent1"/>
-              </a:solidFill>
-              <a:ln w="28575" cap="flat" cmpd="sng" algn="ctr">
-                <a:solidFill>
-                  <a:schemeClr val="tx1"/>
-                </a:solidFill>
-                <a:prstDash val="solid"/>
-                <a:round/>
-                <a:headEnd type="arrow" w="med" len="med"/>
-                <a:tailEnd type="none"/>
-              </a:ln>
-              <a:effectLst>
-                <a:outerShdw blurRad="50800" dist="38100" dir="2700000" algn="tl" rotWithShape="0">
-                  <a:prstClr val="black">
-                    <a:alpha val="40000"/>
-                  </a:prstClr>
-                </a:outerShdw>
-              </a:effectLst>
-            </p:spPr>
-          </p:cxnSp>
-        </p:grpSp>
-      </p:grpSp>
-      <p:grpSp>
-        <p:nvGrpSpPr>
-          <p:cNvPr id="11" name="Grouper 60"/>
-          <p:cNvGrpSpPr/>
-          <p:nvPr/>
-        </p:nvGrpSpPr>
-        <p:grpSpPr>
-          <a:xfrm>
-            <a:off x="5960082" y="3554230"/>
-            <a:ext cx="1238242" cy="1230495"/>
-            <a:chOff x="352267" y="3428422"/>
-            <a:chExt cx="4707890" cy="1230495"/>
-          </a:xfrm>
-        </p:grpSpPr>
-        <p:grpSp>
-          <p:nvGrpSpPr>
-            <p:cNvPr id="12" name="Groupe 14"/>
-            <p:cNvGrpSpPr/>
-            <p:nvPr/>
-          </p:nvGrpSpPr>
-          <p:grpSpPr>
-            <a:xfrm>
-              <a:off x="352267" y="3428422"/>
-              <a:ext cx="4707890" cy="801891"/>
-              <a:chOff x="481142" y="3071810"/>
-              <a:chExt cx="9286053" cy="525331"/>
-            </a:xfrm>
-          </p:grpSpPr>
-          <p:cxnSp>
-            <p:nvCxnSpPr>
-              <p:cNvPr id="61" name="Connecteur droit avec flèche 60"/>
-              <p:cNvCxnSpPr/>
-              <p:nvPr/>
-            </p:nvCxnSpPr>
-            <p:spPr bwMode="auto">
-              <a:xfrm>
-                <a:off x="1234042" y="3071810"/>
-                <a:ext cx="6818793" cy="1588"/>
-              </a:xfrm>
-              <a:prstGeom prst="straightConnector1">
-                <a:avLst/>
-              </a:prstGeom>
-              <a:solidFill>
-                <a:schemeClr val="accent1"/>
-              </a:solidFill>
-              <a:ln w="28575" cap="flat" cmpd="sng" algn="ctr">
-                <a:solidFill>
-                  <a:schemeClr val="tx1"/>
-                </a:solidFill>
-                <a:prstDash val="solid"/>
-                <a:round/>
-                <a:headEnd type="none" w="med" len="med"/>
-                <a:tailEnd type="arrow"/>
-              </a:ln>
-              <a:effectLst>
-                <a:outerShdw blurRad="50800" dist="38100" dir="2700000" algn="tl" rotWithShape="0">
-                  <a:prstClr val="black">
-                    <a:alpha val="40000"/>
-                  </a:prstClr>
-                </a:outerShdw>
-              </a:effectLst>
-            </p:spPr>
-          </p:cxnSp>
-          <p:sp>
-            <p:nvSpPr>
-              <p:cNvPr id="62" name="ZoneTexte 61"/>
-              <p:cNvSpPr txBox="1"/>
-              <p:nvPr/>
-            </p:nvSpPr>
-            <p:spPr>
-              <a:xfrm>
-                <a:off x="481142" y="3385431"/>
-                <a:ext cx="9286053" cy="211710"/>
-              </a:xfrm>
-              <a:prstGeom prst="rect">
-                <a:avLst/>
-              </a:prstGeom>
-              <a:noFill/>
-            </p:spPr>
-            <p:txBody>
-              <a:bodyPr wrap="square" rtlCol="0">
-                <a:spAutoFit/>
-              </a:bodyPr>
-              <a:lstStyle/>
-              <a:p>
-                <a:pPr algn="ctr"/>
-                <a:r>
-                  <a:rPr lang="fr-FR" sz="1500" dirty="0" smtClean="0"/>
-                  <a:t>disco</a:t>
-                </a:r>
-                <a:endParaRPr lang="fr-FR" sz="1500" i="0" dirty="0"/>
-              </a:p>
-            </p:txBody>
-          </p:sp>
-        </p:grpSp>
-        <p:cxnSp>
-          <p:nvCxnSpPr>
-            <p:cNvPr id="60" name="Connecteur droit avec flèche 59"/>
-            <p:cNvCxnSpPr/>
-            <p:nvPr/>
-          </p:nvCxnSpPr>
-          <p:spPr bwMode="auto">
-            <a:xfrm>
-              <a:off x="733973" y="4656493"/>
-              <a:ext cx="3457030" cy="2424"/>
-            </a:xfrm>
-            <a:prstGeom prst="straightConnector1">
-              <a:avLst/>
-            </a:prstGeom>
-            <a:solidFill>
-              <a:schemeClr val="accent1"/>
-            </a:solidFill>
-            <a:ln w="28575" cap="flat" cmpd="sng" algn="ctr">
-              <a:solidFill>
-                <a:schemeClr val="tx1"/>
-              </a:solidFill>
-              <a:prstDash val="solid"/>
-              <a:round/>
-              <a:headEnd type="arrow" w="med" len="med"/>
-              <a:tailEnd type="none"/>
-            </a:ln>
-            <a:effectLst>
-              <a:outerShdw blurRad="50800" dist="38100" dir="2700000" algn="tl" rotWithShape="0">
-                <a:prstClr val="black">
-                  <a:alpha val="40000"/>
-                </a:prstClr>
-              </a:outerShdw>
-            </a:effectLst>
-          </p:spPr>
-        </p:cxnSp>
-      </p:grpSp>
-      <p:grpSp>
-        <p:nvGrpSpPr>
-          <p:cNvPr id="65" name="Grouper 64"/>
-          <p:cNvGrpSpPr/>
-          <p:nvPr/>
-        </p:nvGrpSpPr>
-        <p:grpSpPr>
-          <a:xfrm>
-            <a:off x="2585648" y="3032125"/>
-            <a:ext cx="3891352" cy="2057400"/>
-            <a:chOff x="2514600" y="2895600"/>
-            <a:chExt cx="3886200" cy="2057400"/>
-          </a:xfrm>
-        </p:grpSpPr>
-        <p:grpSp>
-          <p:nvGrpSpPr>
-            <p:cNvPr id="54" name="Grouper 53"/>
-            <p:cNvGrpSpPr/>
-            <p:nvPr/>
-          </p:nvGrpSpPr>
-          <p:grpSpPr>
-            <a:xfrm>
-              <a:off x="2514600" y="2895600"/>
-              <a:ext cx="3886200" cy="704165"/>
-              <a:chOff x="3733800" y="2895600"/>
-              <a:chExt cx="2077008" cy="704165"/>
-            </a:xfrm>
-          </p:grpSpPr>
-          <p:sp>
-            <p:nvSpPr>
-              <p:cNvPr id="64" name="ZoneTexte 63"/>
-              <p:cNvSpPr txBox="1"/>
-              <p:nvPr/>
-            </p:nvSpPr>
-            <p:spPr>
-              <a:xfrm>
-                <a:off x="3733800" y="2895600"/>
-                <a:ext cx="2077008" cy="323165"/>
-              </a:xfrm>
-              <a:prstGeom prst="rect">
-                <a:avLst/>
-              </a:prstGeom>
-              <a:noFill/>
-            </p:spPr>
-            <p:txBody>
-              <a:bodyPr wrap="square" rtlCol="0">
-                <a:spAutoFit/>
-              </a:bodyPr>
-              <a:lstStyle/>
-              <a:p>
-                <a:pPr algn="ctr"/>
-                <a:r>
-                  <a:rPr lang="fr-FR" sz="1500" i="0" dirty="0" err="1" smtClean="0"/>
-                  <a:t>Offer</a:t>
-                </a:r>
-                <a:r>
-                  <a:rPr lang="fr-FR" sz="1500" i="0" dirty="0" smtClean="0"/>
-                  <a:t> </a:t>
-                </a:r>
-                <a:r>
-                  <a:rPr lang="fr-FR" sz="1500" i="0" dirty="0" err="1" smtClean="0"/>
-                  <a:t>with</a:t>
-                </a:r>
-                <a:r>
-                  <a:rPr lang="fr-FR" sz="1500" i="0" dirty="0" smtClean="0"/>
-                  <a:t>  </a:t>
-                </a:r>
-                <a:r>
-                  <a:rPr lang="fr-FR" sz="1500" b="1" i="0" dirty="0" smtClean="0"/>
-                  <a:t>all </a:t>
-                </a:r>
-                <a:r>
-                  <a:rPr lang="fr-FR" sz="1500" i="0" dirty="0" smtClean="0"/>
-                  <a:t>candidates</a:t>
-                </a:r>
-                <a:endParaRPr lang="fr-FR" sz="1500" i="0" dirty="0"/>
-              </a:p>
-            </p:txBody>
-          </p:sp>
-          <p:cxnSp>
-            <p:nvCxnSpPr>
-              <p:cNvPr id="66" name="Connecteur droit avec flèche 65"/>
-              <p:cNvCxnSpPr/>
-              <p:nvPr/>
-            </p:nvCxnSpPr>
-            <p:spPr bwMode="auto">
-              <a:xfrm rot="10800000" flipH="1">
-                <a:off x="4043753" y="3589878"/>
-                <a:ext cx="1488475" cy="1588"/>
-              </a:xfrm>
-              <a:prstGeom prst="straightConnector1">
-                <a:avLst/>
-              </a:prstGeom>
-              <a:solidFill>
-                <a:schemeClr val="accent1"/>
-              </a:solidFill>
-              <a:ln w="28575" cap="flat" cmpd="sng" algn="ctr">
-                <a:solidFill>
-                  <a:schemeClr val="tx1"/>
-                </a:solidFill>
-                <a:prstDash val="solid"/>
-                <a:round/>
-                <a:headEnd type="arrow" w="med" len="med"/>
-                <a:tailEnd type="none"/>
-              </a:ln>
-              <a:effectLst>
-                <a:outerShdw blurRad="50800" dist="38100" dir="2700000" algn="tl" rotWithShape="0">
-                  <a:prstClr val="black">
-                    <a:alpha val="40000"/>
-                  </a:prstClr>
-                </a:outerShdw>
-              </a:effectLst>
-            </p:spPr>
-          </p:cxnSp>
-          <p:sp>
-            <p:nvSpPr>
-              <p:cNvPr id="67" name="ZoneTexte 66"/>
-              <p:cNvSpPr txBox="1"/>
-              <p:nvPr/>
-            </p:nvSpPr>
-            <p:spPr>
-              <a:xfrm>
-                <a:off x="4038600" y="3276600"/>
-                <a:ext cx="1533850" cy="323165"/>
-              </a:xfrm>
-              <a:prstGeom prst="rect">
-                <a:avLst/>
-              </a:prstGeom>
-              <a:noFill/>
-            </p:spPr>
-            <p:txBody>
-              <a:bodyPr wrap="square" rtlCol="0">
-                <a:spAutoFit/>
-              </a:bodyPr>
-              <a:lstStyle/>
-              <a:p>
-                <a:pPr algn="ctr"/>
-                <a:r>
-                  <a:rPr lang="en-US" sz="1500" i="0" dirty="0" smtClean="0"/>
-                  <a:t>Answer with </a:t>
-                </a:r>
-                <a:r>
-                  <a:rPr lang="en-US" sz="1500" b="1" i="0" dirty="0" smtClean="0"/>
-                  <a:t>no </a:t>
-                </a:r>
-                <a:r>
-                  <a:rPr lang="en-US" sz="1500" i="0" dirty="0" err="1" smtClean="0"/>
-                  <a:t>candiates</a:t>
-                </a:r>
-                <a:endParaRPr lang="fr-FR" sz="1500" i="0" dirty="0"/>
-              </a:p>
-            </p:txBody>
-          </p:sp>
-          <p:cxnSp>
-            <p:nvCxnSpPr>
-              <p:cNvPr id="68" name="Connecteur droit avec flèche 67"/>
-              <p:cNvCxnSpPr/>
-              <p:nvPr/>
-            </p:nvCxnSpPr>
-            <p:spPr bwMode="auto">
-              <a:xfrm rot="10800000">
-                <a:off x="4043753" y="3266713"/>
-                <a:ext cx="1488475" cy="1588"/>
-              </a:xfrm>
-              <a:prstGeom prst="straightConnector1">
-                <a:avLst/>
-              </a:prstGeom>
-              <a:solidFill>
-                <a:schemeClr val="accent1"/>
-              </a:solidFill>
-              <a:ln w="28575" cap="flat" cmpd="sng" algn="ctr">
-                <a:solidFill>
-                  <a:schemeClr val="tx1"/>
-                </a:solidFill>
-                <a:prstDash val="solid"/>
-                <a:round/>
-                <a:headEnd type="arrow" w="med" len="med"/>
-                <a:tailEnd type="none"/>
-              </a:ln>
-              <a:effectLst>
-                <a:outerShdw blurRad="50800" dist="38100" dir="2700000" algn="tl" rotWithShape="0">
-                  <a:prstClr val="black">
-                    <a:alpha val="40000"/>
-                  </a:prstClr>
-                </a:outerShdw>
-              </a:effectLst>
-            </p:spPr>
-          </p:cxnSp>
-        </p:grpSp>
-        <p:grpSp>
-          <p:nvGrpSpPr>
-            <p:cNvPr id="58" name="Grouper 57"/>
-            <p:cNvGrpSpPr/>
-            <p:nvPr/>
-          </p:nvGrpSpPr>
-          <p:grpSpPr>
-            <a:xfrm>
-              <a:off x="2819400" y="3937338"/>
-              <a:ext cx="3352800" cy="1015662"/>
-              <a:chOff x="3733800" y="3886200"/>
-              <a:chExt cx="2104032" cy="1015662"/>
-            </a:xfrm>
-          </p:grpSpPr>
-          <p:cxnSp>
-            <p:nvCxnSpPr>
-              <p:cNvPr id="46" name="Connecteur droit avec flèche 45"/>
-              <p:cNvCxnSpPr/>
-              <p:nvPr/>
-            </p:nvCxnSpPr>
-            <p:spPr bwMode="auto">
-              <a:xfrm flipH="1">
-                <a:off x="3932834" y="3908822"/>
-                <a:ext cx="1752598" cy="2424"/>
-              </a:xfrm>
-              <a:prstGeom prst="straightConnector1">
-                <a:avLst/>
-              </a:prstGeom>
-              <a:solidFill>
-                <a:schemeClr val="accent1"/>
-              </a:solidFill>
-              <a:ln w="28575" cap="flat" cmpd="sng" algn="ctr">
-                <a:solidFill>
-                  <a:schemeClr val="tx1"/>
-                </a:solidFill>
-                <a:prstDash val="solid"/>
-                <a:round/>
-                <a:headEnd type="none" w="med" len="med"/>
-                <a:tailEnd type="arrow"/>
-              </a:ln>
-              <a:effectLst>
-                <a:outerShdw blurRad="50800" dist="38100" dir="2700000" algn="tl" rotWithShape="0">
-                  <a:prstClr val="black">
-                    <a:alpha val="40000"/>
-                  </a:prstClr>
-                </a:outerShdw>
-              </a:effectLst>
-            </p:spPr>
-          </p:cxnSp>
-          <p:sp>
-            <p:nvSpPr>
-              <p:cNvPr id="50" name="ZoneTexte 49"/>
-              <p:cNvSpPr txBox="1"/>
-              <p:nvPr/>
-            </p:nvSpPr>
-            <p:spPr>
-              <a:xfrm>
-                <a:off x="3733800" y="3886200"/>
-                <a:ext cx="2104032" cy="1015662"/>
-              </a:xfrm>
-              <a:prstGeom prst="rect">
-                <a:avLst/>
-              </a:prstGeom>
-              <a:noFill/>
-            </p:spPr>
-            <p:txBody>
-              <a:bodyPr wrap="square" rtlCol="0">
-                <a:spAutoFit/>
-              </a:bodyPr>
-              <a:lstStyle/>
-              <a:p>
-                <a:pPr algn="ctr"/>
-                <a:r>
-                  <a:rPr lang="fr-FR" sz="1500" dirty="0" smtClean="0"/>
-                  <a:t>… </a:t>
-                </a:r>
-                <a:br>
-                  <a:rPr lang="fr-FR" sz="1500" dirty="0" smtClean="0"/>
-                </a:br>
-                <a:r>
-                  <a:rPr lang="fr-FR" sz="1500" dirty="0" smtClean="0"/>
-                  <a:t>more </a:t>
-                </a:r>
-                <a:r>
-                  <a:rPr lang="fr-FR" sz="1500" dirty="0" err="1" smtClean="0"/>
-                  <a:t>cands</a:t>
-                </a:r>
-                <a:r>
-                  <a:rPr lang="fr-FR" sz="1500" dirty="0" smtClean="0"/>
-                  <a:t>  &amp;</a:t>
-                </a:r>
-                <a:br>
-                  <a:rPr lang="fr-FR" sz="1500" dirty="0" smtClean="0"/>
-                </a:br>
-                <a:r>
-                  <a:rPr lang="fr-FR" sz="1500" dirty="0" err="1" smtClean="0"/>
-                  <a:t>conn</a:t>
-                </a:r>
-                <a:r>
-                  <a:rPr lang="fr-FR" sz="1500" dirty="0" smtClean="0"/>
-                  <a:t> </a:t>
-                </a:r>
-                <a:r>
-                  <a:rPr lang="fr-FR" sz="1500" dirty="0" err="1" smtClean="0"/>
-                  <a:t>checks</a:t>
-                </a:r>
-                <a:r>
-                  <a:rPr lang="fr-FR" sz="1500" dirty="0" smtClean="0"/>
-                  <a:t> </a:t>
-                </a:r>
-                <a:br>
-                  <a:rPr lang="fr-FR" sz="1500" dirty="0" smtClean="0"/>
-                </a:br>
-                <a:r>
-                  <a:rPr lang="fr-FR" sz="1500" dirty="0" smtClean="0"/>
-                  <a:t>…</a:t>
-                </a:r>
-                <a:endParaRPr lang="fr-FR" sz="1500" i="0" dirty="0"/>
-              </a:p>
-            </p:txBody>
-          </p:sp>
-          <p:cxnSp>
-            <p:nvCxnSpPr>
-              <p:cNvPr id="53" name="Connecteur droit avec flèche 52"/>
-              <p:cNvCxnSpPr/>
-              <p:nvPr/>
-            </p:nvCxnSpPr>
-            <p:spPr bwMode="auto">
-              <a:xfrm>
-                <a:off x="3932832" y="4897191"/>
-                <a:ext cx="1752598" cy="2424"/>
-              </a:xfrm>
-              <a:prstGeom prst="straightConnector1">
-                <a:avLst/>
-              </a:prstGeom>
-              <a:solidFill>
-                <a:schemeClr val="accent1"/>
-              </a:solidFill>
-              <a:ln w="28575" cap="flat" cmpd="sng" algn="ctr">
-                <a:solidFill>
-                  <a:schemeClr val="tx1"/>
-                </a:solidFill>
-                <a:prstDash val="solid"/>
-                <a:round/>
-                <a:headEnd type="arrow" w="med" len="med"/>
-                <a:tailEnd type="none"/>
-              </a:ln>
-              <a:effectLst>
-                <a:outerShdw blurRad="50800" dist="38100" dir="2700000" algn="tl" rotWithShape="0">
-                  <a:prstClr val="black">
-                    <a:alpha val="40000"/>
-                  </a:prstClr>
-                </a:outerShdw>
-              </a:effectLst>
-            </p:spPr>
-          </p:cxnSp>
-        </p:grpSp>
-      </p:grpSp>
-      <p:sp>
-        <p:nvSpPr>
-          <p:cNvPr id="63" name="ZoneTexte 62"/>
-          <p:cNvSpPr txBox="1"/>
-          <p:nvPr/>
-        </p:nvSpPr>
-        <p:spPr>
-          <a:xfrm>
-            <a:off x="2280848" y="5604560"/>
-            <a:ext cx="4729552" cy="338554"/>
-          </a:xfrm>
-          <a:prstGeom prst="rect">
-            <a:avLst/>
-          </a:prstGeom>
-          <a:solidFill>
-            <a:srgbClr val="FFFFFF"/>
-          </a:solidFill>
-        </p:spPr>
-        <p:txBody>
-          <a:bodyPr wrap="square" rtlCol="0">
-            <a:spAutoFit/>
-          </a:bodyPr>
-          <a:lstStyle/>
-          <a:p>
-            <a:pPr algn="ctr"/>
-            <a:r>
-              <a:rPr lang="en-GB" sz="1600" b="1" dirty="0" smtClean="0"/>
-              <a:t>Enjoying FULL TRICKLE from then on</a:t>
-            </a:r>
-            <a:endParaRPr lang="en-GB" sz="1600" b="1" i="0" dirty="0"/>
+            <a:endParaRPr lang="en-GB" smtClean="0"/>
           </a:p>
         </p:txBody>
       </p:sp>
       <p:sp>
         <p:nvSpPr>
-          <p:cNvPr id="43" name="Espace réservé du numéro de diapositive 42"/>
+          <p:cNvPr id="6" name="Espace réservé du numéro de diapositive 5"/>
           <p:cNvSpPr>
             <a:spLocks noGrp="1"/>
           </p:cNvSpPr>
@@ -4938,1055 +3827,6 @@
         </p:spPr>
         <p:txBody>
           <a:bodyPr>
-            <a:normAutofit/>
-          </a:bodyPr>
-          <a:lstStyle/>
-          <a:p>
-            <a:r>
-              <a:rPr lang="en-GB" sz="2400" dirty="0" smtClean="0"/>
-              <a:t>Open Issues</a:t>
-            </a:r>
-            <a:br>
-              <a:rPr lang="en-GB" sz="2400" dirty="0" smtClean="0"/>
-            </a:br>
-            <a:r>
-              <a:rPr lang="en-GB" sz="2400" dirty="0" smtClean="0"/>
-              <a:t>MID </a:t>
-            </a:r>
-            <a:r>
-              <a:rPr lang="en-GB" sz="2400" dirty="0" err="1" smtClean="0"/>
-              <a:t>vs</a:t>
-            </a:r>
-            <a:r>
-              <a:rPr lang="en-GB" sz="2400" dirty="0" smtClean="0"/>
-              <a:t> Stream Index</a:t>
-            </a:r>
-            <a:endParaRPr lang="en-GB" sz="2400" dirty="0"/>
-          </a:p>
-        </p:txBody>
-      </p:sp>
-      <p:sp>
-        <p:nvSpPr>
-          <p:cNvPr id="3" name="Espace réservé du contenu 2"/>
-          <p:cNvSpPr>
-            <a:spLocks noGrp="1"/>
-          </p:cNvSpPr>
-          <p:nvPr>
-            <p:ph idx="1"/>
-          </p:nvPr>
-        </p:nvSpPr>
-        <p:spPr>
-          <a:xfrm>
-            <a:off x="457200" y="1219200"/>
-            <a:ext cx="8839200" cy="4800600"/>
-          </a:xfrm>
-        </p:spPr>
-        <p:txBody>
-          <a:bodyPr>
-            <a:normAutofit lnSpcReduction="10000"/>
-          </a:bodyPr>
-          <a:lstStyle/>
-          <a:p>
-            <a:r>
-              <a:rPr lang="en-GB" sz="2800" dirty="0" smtClean="0"/>
-              <a:t>Do we really need the stream index option?</a:t>
-            </a:r>
-          </a:p>
-          <a:p>
-            <a:endParaRPr lang="en-GB" sz="2800" dirty="0" smtClean="0"/>
-          </a:p>
-          <a:p>
-            <a:r>
-              <a:rPr lang="en-GB" sz="2800" dirty="0" smtClean="0"/>
-              <a:t>Possible application syntax (do we want to spec this)?</a:t>
-            </a:r>
-            <a:br>
-              <a:rPr lang="en-GB" sz="2800" dirty="0" smtClean="0"/>
-            </a:br>
-            <a:endParaRPr lang="en-GB" sz="2800" dirty="0" smtClean="0"/>
-          </a:p>
-          <a:p>
-            <a:pPr>
-              <a:buNone/>
-            </a:pPr>
-            <a:r>
-              <a:rPr lang="en-GB" sz="2800" dirty="0" smtClean="0"/>
-              <a:t>For example:</a:t>
-            </a:r>
-            <a:endParaRPr lang="en-GB" dirty="0" smtClean="0"/>
-          </a:p>
-          <a:p>
-            <a:pPr marL="0" indent="0">
-              <a:buNone/>
-            </a:pPr>
-            <a:r>
-              <a:rPr lang="en-GB" sz="1800" b="1" dirty="0" smtClean="0">
-                <a:latin typeface="Courier New"/>
-                <a:cs typeface="Courier New"/>
-              </a:rPr>
-              <a:t>a=mid:1</a:t>
-            </a:r>
-          </a:p>
-          <a:p>
-            <a:pPr marL="0" indent="0" algn="just">
-              <a:buNone/>
-            </a:pPr>
-            <a:r>
-              <a:rPr lang="en-GB" sz="1800" dirty="0" smtClean="0">
-                <a:latin typeface="Courier New"/>
-                <a:cs typeface="Courier New"/>
-              </a:rPr>
-              <a:t>a=candidate:1 1 UDP 16582 12.18.10.3 5000 </a:t>
-            </a:r>
-            <a:r>
-              <a:rPr lang="en-GB" sz="1800" dirty="0" err="1" smtClean="0">
-                <a:latin typeface="Courier New"/>
-                <a:cs typeface="Courier New"/>
-              </a:rPr>
-              <a:t>typ</a:t>
-            </a:r>
-            <a:r>
-              <a:rPr lang="en-GB" sz="1800" dirty="0" smtClean="0">
-                <a:latin typeface="Courier New"/>
-                <a:cs typeface="Courier New"/>
-              </a:rPr>
-              <a:t> host</a:t>
-            </a:r>
-          </a:p>
-          <a:p>
-            <a:pPr marL="0" indent="0">
-              <a:buNone/>
-            </a:pPr>
-            <a:r>
-              <a:rPr lang="en-GB" sz="1800" dirty="0" smtClean="0">
-                <a:latin typeface="Courier New"/>
-                <a:cs typeface="Courier New"/>
-              </a:rPr>
-              <a:t>a=candidate:2 1 UDP 16584 96.1.2.3 5000 </a:t>
-            </a:r>
-            <a:r>
-              <a:rPr lang="en-GB" sz="1800" dirty="0" err="1" smtClean="0">
-                <a:latin typeface="Courier New"/>
-                <a:cs typeface="Courier New"/>
-              </a:rPr>
-              <a:t>typ</a:t>
-            </a:r>
-            <a:r>
-              <a:rPr lang="en-GB" sz="1800" dirty="0" smtClean="0">
-                <a:latin typeface="Courier New"/>
-                <a:cs typeface="Courier New"/>
-              </a:rPr>
-              <a:t> </a:t>
-            </a:r>
-            <a:r>
-              <a:rPr lang="en-GB" sz="1800" dirty="0" err="1" smtClean="0">
-                <a:latin typeface="Courier New"/>
-                <a:cs typeface="Courier New"/>
-              </a:rPr>
-              <a:t>srflx</a:t>
-            </a:r>
-            <a:endParaRPr lang="en-GB" sz="1800" dirty="0" smtClean="0">
-              <a:latin typeface="Courier New"/>
-              <a:cs typeface="Courier New"/>
-            </a:endParaRPr>
-          </a:p>
-          <a:p>
-            <a:pPr marL="0" indent="0">
-              <a:buNone/>
-            </a:pPr>
-            <a:r>
-              <a:rPr lang="en-GB" sz="1800" dirty="0" smtClean="0">
-                <a:latin typeface="Courier New"/>
-                <a:cs typeface="Courier New"/>
-              </a:rPr>
-              <a:t>a=end-of-candidates</a:t>
-            </a:r>
-          </a:p>
-          <a:p>
-            <a:pPr marL="0" indent="0">
-              <a:buNone/>
-            </a:pPr>
-            <a:r>
-              <a:rPr lang="en-GB" sz="1800" b="1" dirty="0" smtClean="0">
-                <a:latin typeface="Courier New"/>
-                <a:cs typeface="Courier New"/>
-              </a:rPr>
-              <a:t>a=mid:2</a:t>
-            </a:r>
-          </a:p>
-          <a:p>
-            <a:pPr marL="0" indent="0">
-              <a:buNone/>
-            </a:pPr>
-            <a:r>
-              <a:rPr lang="en-GB" sz="1800" dirty="0" smtClean="0">
-                <a:latin typeface="Courier New"/>
-                <a:cs typeface="Courier New"/>
-              </a:rPr>
-              <a:t>a=candidate:2 1 UDP 16915 96.1.2.3 5002 </a:t>
-            </a:r>
-            <a:r>
-              <a:rPr lang="en-GB" sz="1800" dirty="0" err="1" smtClean="0">
-                <a:latin typeface="Courier New"/>
-                <a:cs typeface="Courier New"/>
-              </a:rPr>
-              <a:t>typ</a:t>
-            </a:r>
-            <a:r>
-              <a:rPr lang="en-GB" sz="1800" dirty="0" smtClean="0">
-                <a:latin typeface="Courier New"/>
-                <a:cs typeface="Courier New"/>
-              </a:rPr>
-              <a:t> </a:t>
-            </a:r>
-            <a:r>
-              <a:rPr lang="en-GB" sz="1800" dirty="0" err="1" smtClean="0">
-                <a:latin typeface="Courier New"/>
-                <a:cs typeface="Courier New"/>
-              </a:rPr>
-              <a:t>srflx</a:t>
-            </a:r>
-            <a:endParaRPr lang="en-GB" sz="1800" dirty="0" smtClean="0">
-              <a:latin typeface="Courier New"/>
-              <a:cs typeface="Courier New"/>
-            </a:endParaRPr>
-          </a:p>
-          <a:p>
-            <a:endParaRPr lang="en-GB" dirty="0" smtClean="0"/>
-          </a:p>
-        </p:txBody>
-      </p:sp>
-      <p:sp>
-        <p:nvSpPr>
-          <p:cNvPr id="4" name="Espace réservé du pied de page 3"/>
-          <p:cNvSpPr>
-            <a:spLocks noGrp="1"/>
-          </p:cNvSpPr>
-          <p:nvPr>
-            <p:ph type="ftr" sz="quarter" idx="11"/>
-          </p:nvPr>
-        </p:nvSpPr>
-        <p:spPr/>
-        <p:txBody>
-          <a:bodyPr/>
-          <a:lstStyle/>
-          <a:p>
-            <a:r>
-              <a:rPr lang="fr-FR" smtClean="0"/>
-              <a:t>draft-ivov-mmusic-trickle-ice E. Rescorla, J. Uberti, E. Ivov</a:t>
-            </a:r>
-            <a:endParaRPr lang="en-GB" smtClean="0"/>
-          </a:p>
-        </p:txBody>
-      </p:sp>
-      <p:sp>
-        <p:nvSpPr>
-          <p:cNvPr id="6" name="Espace réservé du numéro de diapositive 5"/>
-          <p:cNvSpPr>
-            <a:spLocks noGrp="1"/>
-          </p:cNvSpPr>
-          <p:nvPr>
-            <p:ph type="sldNum" sz="quarter" idx="4"/>
-          </p:nvPr>
-        </p:nvSpPr>
-        <p:spPr/>
-        <p:txBody>
-          <a:bodyPr/>
-          <a:lstStyle/>
-          <a:p>
-            <a:fld id="{83363BB8-67C3-44C4-A9E3-5652E069104A}" type="slidenum">
-              <a:rPr lang="en-US" smtClean="0"/>
-              <a:pPr/>
-              <a:t>14</a:t>
-            </a:fld>
-            <a:r>
-              <a:rPr lang="en-US" smtClean="0"/>
-              <a:t>/18</a:t>
-            </a:r>
-            <a:endParaRPr lang="en-US" dirty="0"/>
-          </a:p>
-        </p:txBody>
-      </p:sp>
-    </p:spTree>
-  </p:cSld>
-  <p:clrMapOvr>
-    <a:masterClrMapping/>
-  </p:clrMapOvr>
-</p:sld>
-</file>
-
-<file path=ppt/slides/slide15.xml><?xml version="1.0" encoding="utf-8"?>
-<p:sld xmlns:a="http://schemas.openxmlformats.org/drawingml/2006/main" xmlns:r="http://schemas.openxmlformats.org/officeDocument/2006/relationships" xmlns:mc="http://schemas.openxmlformats.org/markup-compatibility/2006" xmlns:mv="urn:schemas-microsoft-com:mac:vml" xmlns:p="http://schemas.openxmlformats.org/presentationml/2006/main" mc:Ignorable="mv" mc:PreserveAttributes="mv:*">
-  <p:cSld>
-    <p:spTree>
-      <p:nvGrpSpPr>
-        <p:cNvPr id="1" name=""/>
-        <p:cNvGrpSpPr/>
-        <p:nvPr/>
-      </p:nvGrpSpPr>
-      <p:grpSpPr>
-        <a:xfrm>
-          <a:off x="0" y="0"/>
-          <a:ext cx="0" cy="0"/>
-          <a:chOff x="0" y="0"/>
-          <a:chExt cx="0" cy="0"/>
-        </a:xfrm>
-      </p:grpSpPr>
-      <p:sp>
-        <p:nvSpPr>
-          <p:cNvPr id="2" name="Titre 1"/>
-          <p:cNvSpPr>
-            <a:spLocks noGrp="1"/>
-          </p:cNvSpPr>
-          <p:nvPr>
-            <p:ph type="title"/>
-          </p:nvPr>
-        </p:nvSpPr>
-        <p:spPr>
-          <a:xfrm>
-            <a:off x="457200" y="381000"/>
-            <a:ext cx="8229600" cy="914400"/>
-          </a:xfrm>
-        </p:spPr>
-        <p:txBody>
-          <a:bodyPr>
-            <a:normAutofit fontScale="90000"/>
-          </a:bodyPr>
-          <a:lstStyle/>
-          <a:p>
-            <a:r>
-              <a:rPr lang="en-GB" sz="2667" smtClean="0"/>
-              <a:t>Open Issues</a:t>
-            </a:r>
-            <a:br>
-              <a:rPr lang="en-GB" sz="2667" smtClean="0"/>
-            </a:br>
-            <a:r>
-              <a:rPr lang="en-GB" sz="3556" smtClean="0"/>
-              <a:t>Session or media level end-of-candidates</a:t>
-            </a:r>
-            <a:br>
-              <a:rPr lang="en-GB" sz="3556" smtClean="0"/>
-            </a:br>
-            <a:endParaRPr lang="en-GB" sz="3556"/>
-          </a:p>
-        </p:txBody>
-      </p:sp>
-      <p:sp>
-        <p:nvSpPr>
-          <p:cNvPr id="3" name="Espace réservé du contenu 2"/>
-          <p:cNvSpPr>
-            <a:spLocks noGrp="1"/>
-          </p:cNvSpPr>
-          <p:nvPr>
-            <p:ph idx="1"/>
-          </p:nvPr>
-        </p:nvSpPr>
-        <p:spPr>
-          <a:xfrm>
-            <a:off x="457200" y="1219200"/>
-            <a:ext cx="7620000" cy="4800600"/>
-          </a:xfrm>
-        </p:spPr>
-        <p:txBody>
-          <a:bodyPr>
-            <a:normAutofit fontScale="70000" lnSpcReduction="20000"/>
-          </a:bodyPr>
-          <a:lstStyle/>
-          <a:p>
-            <a:endParaRPr lang="en-GB" sz="2800" dirty="0" smtClean="0"/>
-          </a:p>
-          <a:p>
-            <a:pPr marL="0" indent="0">
-              <a:buNone/>
-            </a:pPr>
-            <a:r>
-              <a:rPr lang="en-GB" sz="2571" dirty="0" err="1" smtClean="0">
-                <a:latin typeface="Courier New"/>
-                <a:cs typeface="Courier New"/>
-              </a:rPr>
-              <a:t>c</a:t>
-            </a:r>
-            <a:r>
-              <a:rPr lang="en-GB" sz="2571" dirty="0" smtClean="0">
-                <a:latin typeface="Courier New"/>
-                <a:cs typeface="Courier New"/>
-              </a:rPr>
-              <a:t>=IN IP4 12.18.10.3</a:t>
-            </a:r>
-          </a:p>
-          <a:p>
-            <a:pPr marL="0" indent="0">
-              <a:buNone/>
-            </a:pPr>
-            <a:r>
-              <a:rPr lang="en-GB" sz="2571" b="1" dirty="0" smtClean="0">
-                <a:latin typeface="Courier New"/>
-                <a:cs typeface="Courier New"/>
-              </a:rPr>
-              <a:t>a=end-of-candidates</a:t>
-            </a:r>
-            <a:endParaRPr lang="en-GB" sz="2571" dirty="0" smtClean="0">
-              <a:latin typeface="Courier New"/>
-              <a:cs typeface="Courier New"/>
-            </a:endParaRPr>
-          </a:p>
-          <a:p>
-            <a:pPr marL="0" indent="0">
-              <a:buNone/>
-            </a:pPr>
-            <a:r>
-              <a:rPr lang="en-GB" sz="2571" dirty="0" err="1" smtClean="0">
-                <a:latin typeface="Courier New"/>
-                <a:cs typeface="Courier New"/>
-              </a:rPr>
-              <a:t>m</a:t>
-            </a:r>
-            <a:r>
-              <a:rPr lang="en-GB" sz="2571" dirty="0" smtClean="0">
-                <a:latin typeface="Courier New"/>
-                <a:cs typeface="Courier New"/>
-              </a:rPr>
-              <a:t>=audio 5000 RTP/AVP 0 96</a:t>
-            </a:r>
-          </a:p>
-          <a:p>
-            <a:pPr marL="0" indent="0">
-              <a:buNone/>
-            </a:pPr>
-            <a:r>
-              <a:rPr lang="en-GB" sz="2571" dirty="0" smtClean="0">
-                <a:latin typeface="Courier New"/>
-                <a:cs typeface="Courier New"/>
-              </a:rPr>
-              <a:t>a=candidate:1 1 UDP 16582 12.18.10.3 5000 </a:t>
-            </a:r>
-            <a:r>
-              <a:rPr lang="en-GB" sz="2571" dirty="0" err="1" smtClean="0">
-                <a:latin typeface="Courier New"/>
-                <a:cs typeface="Courier New"/>
-              </a:rPr>
-              <a:t>typ</a:t>
-            </a:r>
-            <a:r>
-              <a:rPr lang="en-GB" sz="2571" dirty="0" smtClean="0">
-                <a:latin typeface="Courier New"/>
-                <a:cs typeface="Courier New"/>
-              </a:rPr>
-              <a:t> host</a:t>
-            </a:r>
-          </a:p>
-          <a:p>
-            <a:pPr marL="0" indent="0">
-              <a:buNone/>
-            </a:pPr>
-            <a:r>
-              <a:rPr lang="en-GB" sz="2571" dirty="0" err="1" smtClean="0">
-                <a:latin typeface="Courier New"/>
-                <a:cs typeface="Courier New"/>
-              </a:rPr>
-              <a:t>m</a:t>
-            </a:r>
-            <a:r>
-              <a:rPr lang="en-GB" sz="2571" dirty="0" smtClean="0">
-                <a:latin typeface="Courier New"/>
-                <a:cs typeface="Courier New"/>
-              </a:rPr>
-              <a:t>=video 5000 RTP/AVP 0 96</a:t>
-            </a:r>
-          </a:p>
-          <a:p>
-            <a:pPr marL="0" indent="0">
-              <a:buNone/>
-            </a:pPr>
-            <a:r>
-              <a:rPr lang="en-GB" sz="2571" dirty="0" smtClean="0">
-                <a:latin typeface="Courier New"/>
-                <a:cs typeface="Courier New"/>
-              </a:rPr>
-              <a:t>a=candidate:2 1 UDP 16915 96.1.2.3 5002 </a:t>
-            </a:r>
-            <a:r>
-              <a:rPr lang="en-GB" sz="2571" dirty="0" err="1" smtClean="0">
-                <a:latin typeface="Courier New"/>
-                <a:cs typeface="Courier New"/>
-              </a:rPr>
-              <a:t>typ</a:t>
-            </a:r>
-            <a:r>
-              <a:rPr lang="en-GB" sz="2571" dirty="0" smtClean="0">
-                <a:latin typeface="Courier New"/>
-                <a:cs typeface="Courier New"/>
-              </a:rPr>
-              <a:t> </a:t>
-            </a:r>
-            <a:r>
-              <a:rPr lang="en-GB" sz="2571" dirty="0" err="1" smtClean="0">
-                <a:latin typeface="Courier New"/>
-                <a:cs typeface="Courier New"/>
-              </a:rPr>
-              <a:t>srflx</a:t>
-            </a:r>
-            <a:endParaRPr lang="en-GB" sz="2571" dirty="0" smtClean="0"/>
-          </a:p>
-          <a:p>
-            <a:pPr>
-              <a:buNone/>
-            </a:pPr>
-            <a:endParaRPr lang="en-GB" sz="2571" dirty="0" smtClean="0"/>
-          </a:p>
-          <a:p>
-            <a:pPr>
-              <a:buNone/>
-            </a:pPr>
-            <a:r>
-              <a:rPr lang="fr-FR" sz="2571" dirty="0" smtClean="0"/>
-              <a:t>V</a:t>
-            </a:r>
-            <a:r>
-              <a:rPr lang="en-GB" sz="2571" dirty="0" smtClean="0"/>
-              <a:t>S </a:t>
-            </a:r>
-          </a:p>
-          <a:p>
-            <a:pPr>
-              <a:buNone/>
-            </a:pPr>
-            <a:r>
-              <a:rPr lang="en-GB" sz="2571" dirty="0" smtClean="0">
-                <a:solidFill>
-                  <a:srgbClr val="7F7F7F"/>
-                </a:solidFill>
-              </a:rPr>
-              <a:t>(our preference)</a:t>
-            </a:r>
-          </a:p>
-          <a:p>
-            <a:pPr marL="0" indent="0">
-              <a:buNone/>
-            </a:pPr>
-            <a:r>
-              <a:rPr lang="en-GB" sz="2571" dirty="0" err="1" smtClean="0">
-                <a:latin typeface="Courier New"/>
-                <a:cs typeface="Courier New"/>
-              </a:rPr>
-              <a:t>c</a:t>
-            </a:r>
-            <a:r>
-              <a:rPr lang="en-GB" sz="2571" dirty="0" smtClean="0">
-                <a:latin typeface="Courier New"/>
-                <a:cs typeface="Courier New"/>
-              </a:rPr>
-              <a:t>=IN IP4 12.18.10.3</a:t>
-            </a:r>
-          </a:p>
-          <a:p>
-            <a:pPr marL="0" indent="0">
-              <a:buNone/>
-            </a:pPr>
-            <a:r>
-              <a:rPr lang="en-GB" sz="2571" dirty="0" err="1" smtClean="0">
-                <a:latin typeface="Courier New"/>
-                <a:cs typeface="Courier New"/>
-              </a:rPr>
-              <a:t>m</a:t>
-            </a:r>
-            <a:r>
-              <a:rPr lang="en-GB" sz="2571" dirty="0" smtClean="0">
-                <a:latin typeface="Courier New"/>
-                <a:cs typeface="Courier New"/>
-              </a:rPr>
-              <a:t>=audio 5000 RTP/AVP 0 96</a:t>
-            </a:r>
-          </a:p>
-          <a:p>
-            <a:pPr marL="0" indent="0">
-              <a:buNone/>
-            </a:pPr>
-            <a:r>
-              <a:rPr lang="en-GB" sz="2571" dirty="0" smtClean="0">
-                <a:latin typeface="Courier New"/>
-                <a:cs typeface="Courier New"/>
-              </a:rPr>
-              <a:t>a=candidate:1 1 UDP 16582 12.18.10.3 5000 </a:t>
-            </a:r>
-            <a:r>
-              <a:rPr lang="en-GB" sz="2571" dirty="0" err="1" smtClean="0">
-                <a:latin typeface="Courier New"/>
-                <a:cs typeface="Courier New"/>
-              </a:rPr>
-              <a:t>typ</a:t>
-            </a:r>
-            <a:r>
-              <a:rPr lang="en-GB" sz="2571" dirty="0" smtClean="0">
-                <a:latin typeface="Courier New"/>
-                <a:cs typeface="Courier New"/>
-              </a:rPr>
-              <a:t> host</a:t>
-            </a:r>
-          </a:p>
-          <a:p>
-            <a:pPr marL="0" indent="0">
-              <a:buNone/>
-            </a:pPr>
-            <a:r>
-              <a:rPr lang="en-GB" sz="2571" b="1" dirty="0" smtClean="0">
-                <a:latin typeface="Courier New"/>
-                <a:cs typeface="Courier New"/>
-              </a:rPr>
-              <a:t>a=end-of-candidates</a:t>
-            </a:r>
-          </a:p>
-          <a:p>
-            <a:pPr marL="0" indent="0">
-              <a:buNone/>
-            </a:pPr>
-            <a:r>
-              <a:rPr lang="en-GB" sz="2571" dirty="0" err="1" smtClean="0">
-                <a:latin typeface="Courier New"/>
-                <a:cs typeface="Courier New"/>
-              </a:rPr>
-              <a:t>m</a:t>
-            </a:r>
-            <a:r>
-              <a:rPr lang="en-GB" sz="2571" dirty="0" smtClean="0">
-                <a:latin typeface="Courier New"/>
-                <a:cs typeface="Courier New"/>
-              </a:rPr>
-              <a:t>=video 5000 RTP/AVP 0 96</a:t>
-            </a:r>
-          </a:p>
-          <a:p>
-            <a:pPr marL="0" indent="0">
-              <a:buNone/>
-            </a:pPr>
-            <a:r>
-              <a:rPr lang="en-GB" sz="2571" dirty="0" smtClean="0">
-                <a:latin typeface="Courier New"/>
-                <a:cs typeface="Courier New"/>
-              </a:rPr>
-              <a:t>a=candidate:2 1 UDP 16915 96.1.2.3 5002 </a:t>
-            </a:r>
-            <a:r>
-              <a:rPr lang="en-GB" sz="2571" dirty="0" err="1" smtClean="0">
-                <a:latin typeface="Courier New"/>
-                <a:cs typeface="Courier New"/>
-              </a:rPr>
-              <a:t>typ</a:t>
-            </a:r>
-            <a:r>
-              <a:rPr lang="en-GB" sz="2571" dirty="0" smtClean="0">
-                <a:latin typeface="Courier New"/>
-                <a:cs typeface="Courier New"/>
-              </a:rPr>
-              <a:t> </a:t>
-            </a:r>
-            <a:r>
-              <a:rPr lang="en-GB" sz="2571" dirty="0" err="1" smtClean="0">
-                <a:latin typeface="Courier New"/>
-                <a:cs typeface="Courier New"/>
-              </a:rPr>
-              <a:t>srflx</a:t>
-            </a:r>
-            <a:endParaRPr lang="en-GB" sz="2571" dirty="0" smtClean="0">
-              <a:latin typeface="Courier New"/>
-              <a:cs typeface="Courier New"/>
-            </a:endParaRPr>
-          </a:p>
-          <a:p>
-            <a:pPr marL="0" indent="0">
-              <a:buNone/>
-            </a:pPr>
-            <a:r>
-              <a:rPr lang="en-GB" sz="2571" b="1" dirty="0" smtClean="0">
-                <a:latin typeface="Courier New"/>
-                <a:cs typeface="Courier New"/>
-              </a:rPr>
-              <a:t>a=end-of-candidates</a:t>
-            </a:r>
-          </a:p>
-          <a:p>
-            <a:pPr marL="0" indent="0">
-              <a:buNone/>
-            </a:pPr>
-            <a:endParaRPr lang="en-GB" sz="2571" b="1" dirty="0" smtClean="0">
-              <a:latin typeface="Courier New"/>
-              <a:cs typeface="Courier New"/>
-            </a:endParaRPr>
-          </a:p>
-          <a:p>
-            <a:pPr marL="0" indent="0">
-              <a:buNone/>
-            </a:pPr>
-            <a:endParaRPr lang="en-GB" sz="1800" dirty="0" smtClean="0">
-              <a:latin typeface="Courier New"/>
-              <a:cs typeface="Courier New"/>
-            </a:endParaRPr>
-          </a:p>
-          <a:p>
-            <a:endParaRPr lang="en-GB" dirty="0" smtClean="0"/>
-          </a:p>
-        </p:txBody>
-      </p:sp>
-      <p:sp>
-        <p:nvSpPr>
-          <p:cNvPr id="4" name="Espace réservé du pied de page 3"/>
-          <p:cNvSpPr>
-            <a:spLocks noGrp="1"/>
-          </p:cNvSpPr>
-          <p:nvPr>
-            <p:ph type="ftr" sz="quarter" idx="11"/>
-          </p:nvPr>
-        </p:nvSpPr>
-        <p:spPr/>
-        <p:txBody>
-          <a:bodyPr/>
-          <a:lstStyle/>
-          <a:p>
-            <a:r>
-              <a:rPr lang="fr-FR" smtClean="0"/>
-              <a:t>draft-ivov-mmusic-trickle-ice E. Rescorla, J. Uberti, E. Ivov</a:t>
-            </a:r>
-            <a:endParaRPr lang="en-GB" smtClean="0"/>
-          </a:p>
-        </p:txBody>
-      </p:sp>
-      <p:sp>
-        <p:nvSpPr>
-          <p:cNvPr id="6" name="Espace réservé du numéro de diapositive 5"/>
-          <p:cNvSpPr>
-            <a:spLocks noGrp="1"/>
-          </p:cNvSpPr>
-          <p:nvPr>
-            <p:ph type="sldNum" sz="quarter" idx="4"/>
-          </p:nvPr>
-        </p:nvSpPr>
-        <p:spPr/>
-        <p:txBody>
-          <a:bodyPr/>
-          <a:lstStyle/>
-          <a:p>
-            <a:fld id="{83363BB8-67C3-44C4-A9E3-5652E069104A}" type="slidenum">
-              <a:rPr lang="en-US" smtClean="0"/>
-              <a:pPr/>
-              <a:t>15</a:t>
-            </a:fld>
-            <a:r>
-              <a:rPr lang="en-US" smtClean="0"/>
-              <a:t>/18</a:t>
-            </a:r>
-            <a:endParaRPr lang="en-US" dirty="0"/>
-          </a:p>
-        </p:txBody>
-      </p:sp>
-    </p:spTree>
-  </p:cSld>
-  <p:clrMapOvr>
-    <a:masterClrMapping/>
-  </p:clrMapOvr>
-  <p:timing>
-    <p:tnLst>
-      <p:par>
-        <p:cTn id="1" dur="indefinite" restart="never" nodeType="tmRoot"/>
-      </p:par>
-    </p:tnLst>
-  </p:timing>
-</p:sld>
-</file>
-
-<file path=ppt/slides/slide16.xml><?xml version="1.0" encoding="utf-8"?>
-<p:sld xmlns:a="http://schemas.openxmlformats.org/drawingml/2006/main" xmlns:r="http://schemas.openxmlformats.org/officeDocument/2006/relationships" xmlns:mc="http://schemas.openxmlformats.org/markup-compatibility/2006" xmlns:mv="urn:schemas-microsoft-com:mac:vml" xmlns:p="http://schemas.openxmlformats.org/presentationml/2006/main" mc:Ignorable="mv" mc:PreserveAttributes="mv:*">
-  <p:cSld>
-    <p:spTree>
-      <p:nvGrpSpPr>
-        <p:cNvPr id="1" name=""/>
-        <p:cNvGrpSpPr/>
-        <p:nvPr/>
-      </p:nvGrpSpPr>
-      <p:grpSpPr>
-        <a:xfrm>
-          <a:off x="0" y="0"/>
-          <a:ext cx="0" cy="0"/>
-          <a:chOff x="0" y="0"/>
-          <a:chExt cx="0" cy="0"/>
-        </a:xfrm>
-      </p:grpSpPr>
-      <p:sp>
-        <p:nvSpPr>
-          <p:cNvPr id="2" name="Titre 1"/>
-          <p:cNvSpPr>
-            <a:spLocks noGrp="1"/>
-          </p:cNvSpPr>
-          <p:nvPr>
-            <p:ph type="title"/>
-          </p:nvPr>
-        </p:nvSpPr>
-        <p:spPr>
-          <a:xfrm>
-            <a:off x="457200" y="76200"/>
-            <a:ext cx="8229600" cy="914400"/>
-          </a:xfrm>
-        </p:spPr>
-        <p:txBody>
-          <a:bodyPr>
-            <a:normAutofit fontScale="90000"/>
-          </a:bodyPr>
-          <a:lstStyle/>
-          <a:p>
-            <a:r>
-              <a:rPr lang="en-GB" sz="2667" dirty="0" smtClean="0"/>
-              <a:t>Appendix:</a:t>
-            </a:r>
-            <a:br>
-              <a:rPr lang="en-GB" sz="2667" dirty="0" smtClean="0"/>
-            </a:br>
-            <a:r>
-              <a:rPr lang="en-GB" sz="3556" dirty="0" smtClean="0"/>
-              <a:t>A SIP Usage for Trickle ICE (1/3)</a:t>
-            </a:r>
-            <a:endParaRPr lang="en-GB" sz="4444" dirty="0"/>
-          </a:p>
-        </p:txBody>
-      </p:sp>
-      <p:sp>
-        <p:nvSpPr>
-          <p:cNvPr id="3" name="Espace réservé du contenu 2"/>
-          <p:cNvSpPr>
-            <a:spLocks noGrp="1"/>
-          </p:cNvSpPr>
-          <p:nvPr>
-            <p:ph idx="1"/>
-          </p:nvPr>
-        </p:nvSpPr>
-        <p:spPr>
-          <a:xfrm>
-            <a:off x="457200" y="1143000"/>
-            <a:ext cx="7620000" cy="4724400"/>
-          </a:xfrm>
-        </p:spPr>
-        <p:txBody>
-          <a:bodyPr>
-            <a:noAutofit/>
-          </a:bodyPr>
-          <a:lstStyle/>
-          <a:p>
-            <a:pPr indent="20638" algn="just"/>
-            <a:r>
-              <a:rPr lang="en-GB" sz="2400" dirty="0" smtClean="0"/>
-              <a:t> SIP Applications would always do half trickle unless explicitly configured otherwise</a:t>
-            </a:r>
-          </a:p>
-          <a:p>
-            <a:pPr indent="20638" algn="just">
-              <a:buNone/>
-            </a:pPr>
-            <a:endParaRPr lang="en-GB" sz="2400" dirty="0" smtClean="0"/>
-          </a:p>
-          <a:p>
-            <a:pPr indent="20638" algn="just"/>
-            <a:r>
-              <a:rPr lang="en-GB" sz="2400" dirty="0" smtClean="0"/>
-              <a:t> Trickling will happen with in-dialog SIP INFO requests as per RFC </a:t>
-            </a:r>
-            <a:r>
-              <a:rPr lang="en-GB" sz="2400" dirty="0" smtClean="0"/>
-              <a:t>6086. </a:t>
-            </a:r>
-          </a:p>
-          <a:p>
-            <a:pPr indent="20638" algn="just"/>
-            <a:endParaRPr lang="en-GB" sz="2400" dirty="0" smtClean="0"/>
-          </a:p>
-          <a:p>
-            <a:pPr indent="20638" algn="just"/>
-            <a:r>
-              <a:rPr lang="en-GB" sz="2400" dirty="0" smtClean="0"/>
-              <a:t> </a:t>
-            </a:r>
-            <a:r>
-              <a:rPr lang="fr-FR" sz="2400" dirty="0" smtClean="0"/>
-              <a:t>The INFO Package </a:t>
-            </a:r>
-            <a:r>
-              <a:rPr lang="fr-FR" sz="2400" dirty="0" err="1" smtClean="0"/>
-              <a:t>token</a:t>
-            </a:r>
-            <a:r>
-              <a:rPr lang="fr-FR" sz="2400" dirty="0" smtClean="0"/>
-              <a:t> </a:t>
-            </a:r>
-            <a:r>
-              <a:rPr lang="fr-FR" sz="2400" dirty="0" err="1" smtClean="0"/>
-              <a:t>name</a:t>
-            </a:r>
-            <a:r>
-              <a:rPr lang="fr-FR" sz="2400" dirty="0" smtClean="0"/>
-              <a:t> for </a:t>
-            </a:r>
-            <a:r>
-              <a:rPr lang="fr-FR" sz="2400" dirty="0" err="1" smtClean="0"/>
-              <a:t>this</a:t>
-            </a:r>
-            <a:r>
-              <a:rPr lang="fr-FR" sz="2400" dirty="0" smtClean="0"/>
-              <a:t> package </a:t>
-            </a:r>
-            <a:r>
-              <a:rPr lang="fr-FR" sz="2400" dirty="0" err="1" smtClean="0"/>
-              <a:t>is</a:t>
-            </a:r>
-            <a:r>
-              <a:rPr lang="fr-FR" sz="2400" dirty="0" smtClean="0"/>
-              <a:t> "</a:t>
-            </a:r>
-            <a:r>
-              <a:rPr lang="fr-FR" sz="2400" dirty="0" err="1" smtClean="0"/>
-              <a:t>trickle-ice</a:t>
-            </a:r>
-            <a:r>
-              <a:rPr lang="fr-FR" sz="2400" dirty="0" smtClean="0"/>
-              <a:t>”</a:t>
-            </a:r>
-            <a:r>
-              <a:rPr lang="en-GB" sz="2400" dirty="0" smtClean="0"/>
-              <a:t>	</a:t>
-            </a:r>
-          </a:p>
-          <a:p>
-            <a:pPr lvl="1" indent="20638" algn="just"/>
-            <a:r>
-              <a:rPr lang="en-GB" sz="2400" dirty="0" smtClean="0"/>
-              <a:t> Does not mandate GRUU support</a:t>
-            </a:r>
-          </a:p>
-          <a:p>
-            <a:pPr lvl="1" indent="20638" algn="just">
-              <a:buNone/>
-            </a:pPr>
-            <a:endParaRPr lang="en-GB" sz="2400" dirty="0" smtClean="0"/>
-          </a:p>
-          <a:p>
-            <a:pPr indent="20638" algn="just"/>
-            <a:r>
-              <a:rPr lang="en-GB" sz="2400" dirty="0" smtClean="0"/>
-              <a:t> Does not remove the requirement for doing a re-INVITE upon completion of ICE processing. </a:t>
-            </a:r>
-          </a:p>
-          <a:p>
-            <a:pPr indent="20638" algn="just">
-              <a:buNone/>
-            </a:pPr>
-            <a:endParaRPr lang="en-GB" sz="2400" dirty="0" smtClean="0"/>
-          </a:p>
-          <a:p>
-            <a:pPr lvl="1" indent="20638" algn="just">
-              <a:buNone/>
-            </a:pPr>
-            <a:endParaRPr lang="en-GB" sz="2400" dirty="0" smtClean="0"/>
-          </a:p>
-        </p:txBody>
-      </p:sp>
-      <p:sp>
-        <p:nvSpPr>
-          <p:cNvPr id="4" name="Espace réservé du pied de page 3"/>
-          <p:cNvSpPr>
-            <a:spLocks noGrp="1"/>
-          </p:cNvSpPr>
-          <p:nvPr>
-            <p:ph type="ftr" sz="quarter" idx="11"/>
-          </p:nvPr>
-        </p:nvSpPr>
-        <p:spPr/>
-        <p:txBody>
-          <a:bodyPr/>
-          <a:lstStyle/>
-          <a:p>
-            <a:r>
-              <a:rPr lang="fr-FR" smtClean="0"/>
-              <a:t>draft-ivov-mmusic-trickle-ice E. Rescorla, J. Uberti, E. Ivov</a:t>
-            </a:r>
-            <a:endParaRPr lang="en-GB" smtClean="0"/>
-          </a:p>
-        </p:txBody>
-      </p:sp>
-      <p:sp>
-        <p:nvSpPr>
-          <p:cNvPr id="6" name="Espace réservé du numéro de diapositive 5"/>
-          <p:cNvSpPr>
-            <a:spLocks noGrp="1"/>
-          </p:cNvSpPr>
-          <p:nvPr>
-            <p:ph type="sldNum" sz="quarter" idx="4"/>
-          </p:nvPr>
-        </p:nvSpPr>
-        <p:spPr/>
-        <p:txBody>
-          <a:bodyPr/>
-          <a:lstStyle/>
-          <a:p>
-            <a:fld id="{83363BB8-67C3-44C4-A9E3-5652E069104A}" type="slidenum">
-              <a:rPr lang="en-US" smtClean="0"/>
-              <a:pPr/>
-              <a:t>16</a:t>
-            </a:fld>
-            <a:r>
-              <a:rPr lang="en-US" smtClean="0"/>
-              <a:t>/18</a:t>
-            </a:r>
-            <a:endParaRPr lang="en-US" dirty="0"/>
-          </a:p>
-        </p:txBody>
-      </p:sp>
-    </p:spTree>
-  </p:cSld>
-  <p:clrMapOvr>
-    <a:masterClrMapping/>
-  </p:clrMapOvr>
-  <p:timing>
-    <p:tnLst>
-      <p:par>
-        <p:cTn id="1" dur="indefinite" restart="never" nodeType="tmRoot"/>
-      </p:par>
-    </p:tnLst>
-  </p:timing>
-</p:sld>
-</file>
-
-<file path=ppt/slides/slide17.xml><?xml version="1.0" encoding="utf-8"?>
-<p:sld xmlns:a="http://schemas.openxmlformats.org/drawingml/2006/main" xmlns:r="http://schemas.openxmlformats.org/officeDocument/2006/relationships" xmlns:mc="http://schemas.openxmlformats.org/markup-compatibility/2006" xmlns:mv="urn:schemas-microsoft-com:mac:vml" xmlns:p="http://schemas.openxmlformats.org/presentationml/2006/main" mc:Ignorable="mv" mc:PreserveAttributes="mv:*">
-  <p:cSld>
-    <p:spTree>
-      <p:nvGrpSpPr>
-        <p:cNvPr id="1" name=""/>
-        <p:cNvGrpSpPr/>
-        <p:nvPr/>
-      </p:nvGrpSpPr>
-      <p:grpSpPr>
-        <a:xfrm>
-          <a:off x="0" y="0"/>
-          <a:ext cx="0" cy="0"/>
-          <a:chOff x="0" y="0"/>
-          <a:chExt cx="0" cy="0"/>
-        </a:xfrm>
-      </p:grpSpPr>
-      <p:sp>
-        <p:nvSpPr>
-          <p:cNvPr id="2" name="Titre 1"/>
-          <p:cNvSpPr>
-            <a:spLocks noGrp="1"/>
-          </p:cNvSpPr>
-          <p:nvPr>
-            <p:ph type="title"/>
-          </p:nvPr>
-        </p:nvSpPr>
-        <p:spPr>
-          <a:xfrm>
-            <a:off x="457200" y="76200"/>
-            <a:ext cx="8229600" cy="914400"/>
-          </a:xfrm>
-        </p:spPr>
-        <p:txBody>
-          <a:bodyPr>
             <a:normAutofit fontScale="90000"/>
           </a:bodyPr>
           <a:lstStyle/>
@@ -6336,7 +4176,7 @@
             <a:fld id="{83363BB8-67C3-44C4-A9E3-5652E069104A}" type="slidenum">
               <a:rPr lang="en-US" smtClean="0"/>
               <a:pPr/>
-              <a:t>17</a:t>
+              <a:t>14</a:t>
             </a:fld>
             <a:r>
               <a:rPr lang="en-US" smtClean="0"/>
@@ -6354,7 +4194,7 @@
 </p:sld>
 </file>
 
-<file path=ppt/slides/slide18.xml><?xml version="1.0" encoding="utf-8"?>
+<file path=ppt/slides/slide15.xml><?xml version="1.0" encoding="utf-8"?>
 <p:sld xmlns:a="http://schemas.openxmlformats.org/drawingml/2006/main" xmlns:r="http://schemas.openxmlformats.org/officeDocument/2006/relationships" xmlns:mc="http://schemas.openxmlformats.org/markup-compatibility/2006" xmlns:mv="urn:schemas-microsoft-com:mac:vml" xmlns:p="http://schemas.openxmlformats.org/presentationml/2006/main" mc:Ignorable="mv" mc:PreserveAttributes="mv:*">
   <p:cSld>
     <p:spTree>
@@ -7887,7 +5727,7 @@
             <a:fld id="{83363BB8-67C3-44C4-A9E3-5652E069104A}" type="slidenum">
               <a:rPr lang="en-US" smtClean="0"/>
               <a:pPr/>
-              <a:t>18</a:t>
+              <a:t>15</a:t>
             </a:fld>
             <a:r>
               <a:rPr lang="en-US" smtClean="0"/>
@@ -11858,7 +9698,23 @@
             </a:r>
             <a:r>
               <a:rPr lang="en-GB" sz="3600" dirty="0" smtClean="0"/>
-              <a:t>Boston Interim (1/3)</a:t>
+              <a:t>Boston Interim (</a:t>
+            </a:r>
+            <a:r>
+              <a:rPr lang="bg-BG" sz="3600" dirty="0" smtClean="0"/>
+              <a:t>1</a:t>
+            </a:r>
+            <a:r>
+              <a:rPr lang="en-GB" sz="3600" dirty="0" smtClean="0"/>
+              <a:t>/</a:t>
+            </a:r>
+            <a:r>
+              <a:rPr lang="bg-BG" sz="3600" dirty="0" smtClean="0"/>
+              <a:t>2</a:t>
+            </a:r>
+            <a:r>
+              <a:rPr lang="en-GB" sz="3600" dirty="0" smtClean="0"/>
+              <a:t>)</a:t>
             </a:r>
             <a:endParaRPr lang="en-GB" sz="3600" dirty="0"/>
           </a:p>
@@ -11882,34 +9738,91 @@
         </p:spPr>
         <p:txBody>
           <a:bodyPr>
-            <a:normAutofit fontScale="85000" lnSpcReduction="20000"/>
+            <a:normAutofit fontScale="55000" lnSpcReduction="20000"/>
           </a:bodyPr>
           <a:lstStyle/>
           <a:p>
             <a:r>
               <a:rPr lang="en-GB" dirty="0" smtClean="0"/>
-              <a:t>Advertising support for trickle ICE:</a:t>
-            </a:r>
+              <a:t>New candidates and </a:t>
+            </a:r>
+            <a:r>
+              <a:rPr lang="en-GB" dirty="0" smtClean="0"/>
+              <a:t>end-of-candidates</a:t>
+            </a:r>
+            <a:endParaRPr lang="en-GB" dirty="0" smtClean="0"/>
           </a:p>
           <a:p>
             <a:pPr lvl="1">
               <a:buNone/>
             </a:pPr>
             <a:r>
-              <a:rPr lang="en-GB" sz="2500" b="1" dirty="0" smtClean="0">
+              <a:rPr lang="en-GB" sz="3273" b="1" dirty="0" smtClean="0">
                 <a:latin typeface="Courier New"/>
                 <a:cs typeface="Courier New"/>
               </a:rPr>
-              <a:t>a=ice-</a:t>
-            </a:r>
-            <a:r>
-              <a:rPr lang="en-GB" sz="2500" b="1" dirty="0" err="1" smtClean="0">
+              <a:t>…</a:t>
+            </a:r>
+          </a:p>
+          <a:p>
+            <a:pPr lvl="1">
+              <a:buNone/>
+            </a:pPr>
+            <a:r>
+              <a:rPr lang="en-GB" sz="2909" b="1" dirty="0" smtClean="0">
                 <a:latin typeface="Courier New"/>
                 <a:cs typeface="Courier New"/>
               </a:rPr>
-              <a:t>options:trickle</a:t>
-            </a:r>
-            <a:endParaRPr lang="en-GB" sz="2500" b="1" dirty="0" smtClean="0">
+              <a:t>a=candidate:1 1 UDP 1234 1.2.1.4 5000 </a:t>
+            </a:r>
+            <a:r>
+              <a:rPr lang="en-GB" sz="2909" b="1" dirty="0" err="1" smtClean="0">
+                <a:latin typeface="Courier New"/>
+                <a:cs typeface="Courier New"/>
+              </a:rPr>
+              <a:t>typ</a:t>
+            </a:r>
+            <a:r>
+              <a:rPr lang="en-GB" sz="2909" b="1" dirty="0" smtClean="0">
+                <a:latin typeface="Courier New"/>
+                <a:cs typeface="Courier New"/>
+              </a:rPr>
+              <a:t> host</a:t>
+            </a:r>
+          </a:p>
+          <a:p>
+            <a:pPr lvl="1">
+              <a:buNone/>
+            </a:pPr>
+            <a:r>
+              <a:rPr lang="en-GB" sz="2909" b="1" dirty="0" smtClean="0">
+                <a:latin typeface="Courier New"/>
+                <a:cs typeface="Courier New"/>
+              </a:rPr>
+              <a:t>a=candidate:2 1 UDP 5678 6.1.2.3 5000 </a:t>
+            </a:r>
+            <a:r>
+              <a:rPr lang="en-GB" sz="2909" b="1" dirty="0" err="1" smtClean="0">
+                <a:latin typeface="Courier New"/>
+                <a:cs typeface="Courier New"/>
+              </a:rPr>
+              <a:t>typ</a:t>
+            </a:r>
+            <a:r>
+              <a:rPr lang="en-GB" sz="2909" b="1" dirty="0" smtClean="0">
+                <a:latin typeface="Courier New"/>
+                <a:cs typeface="Courier New"/>
+              </a:rPr>
+              <a:t> </a:t>
+            </a:r>
+            <a:r>
+              <a:rPr lang="en-GB" sz="2909" b="1" dirty="0" err="1" smtClean="0">
+                <a:latin typeface="Courier New"/>
+                <a:cs typeface="Courier New"/>
+              </a:rPr>
+              <a:t>srflx</a:t>
+            </a:r>
+            <a:endParaRPr lang="en-GB" sz="2909" b="1" dirty="0" smtClean="0">
               <a:latin typeface="Courier New"/>
               <a:cs typeface="Courier New"/>
             </a:endParaRPr>
@@ -11919,429 +9832,16 @@
               <a:buNone/>
             </a:pPr>
             <a:r>
-              <a:rPr lang="fr-FR" sz="2560" i="1" dirty="0" err="1" smtClean="0"/>
-              <a:t>maybe</a:t>
-            </a:r>
-            <a:r>
-              <a:rPr lang="fr-FR" sz="2560" i="1" dirty="0" smtClean="0"/>
-              <a:t> </a:t>
-            </a:r>
-            <a:r>
-              <a:rPr lang="fr-FR" sz="2560" i="1" dirty="0" err="1" smtClean="0"/>
-              <a:t>also</a:t>
-            </a:r>
-            <a:r>
-              <a:rPr lang="fr-FR" sz="2560" i="1" dirty="0" smtClean="0"/>
-              <a:t> </a:t>
-            </a:r>
-            <a:r>
-              <a:rPr lang="fr-FR" sz="2560" i="1" dirty="0" err="1" smtClean="0"/>
-              <a:t>add</a:t>
-            </a:r>
-            <a:r>
-              <a:rPr lang="fr-FR" sz="2560" i="1" dirty="0" smtClean="0"/>
-              <a:t> an a=</a:t>
-            </a:r>
-            <a:r>
-              <a:rPr lang="fr-FR" sz="2560" i="1" dirty="0" err="1" smtClean="0"/>
-              <a:t>ice-options:trickle</a:t>
-            </a:r>
-            <a:r>
-              <a:rPr lang="fr-FR" sz="2560" i="1" dirty="0" smtClean="0"/>
-              <a:t>-on … or </a:t>
-            </a:r>
-            <a:r>
-              <a:rPr lang="fr-FR" sz="2560" i="1" dirty="0" err="1" smtClean="0"/>
-              <a:t>maybe</a:t>
-            </a:r>
-            <a:r>
-              <a:rPr lang="fr-FR" sz="2560" i="1" dirty="0" smtClean="0"/>
-              <a:t> not </a:t>
-            </a:r>
-            <a:r>
-              <a:rPr lang="en-US" sz="2560" dirty="0" smtClean="0"/>
-              <a:t>(list comment from Ari)</a:t>
-            </a:r>
-            <a:r>
-              <a:rPr lang="en-GB" sz="2500" b="1" dirty="0" smtClean="0">
+              <a:rPr lang="en-GB" sz="2909" b="1" dirty="0" smtClean="0">
                 <a:latin typeface="Courier New"/>
                 <a:cs typeface="Courier New"/>
               </a:rPr>
-              <a:t/>
-            </a:r>
-            <a:br>
-              <a:rPr lang="en-GB" sz="2500" b="1" dirty="0" smtClean="0">
-                <a:latin typeface="Courier New"/>
-                <a:cs typeface="Courier New"/>
-              </a:rPr>
-            </a:br>
-            <a:endParaRPr lang="en-GB" sz="2500" b="1" dirty="0" smtClean="0">
+              <a:t>a=end-of-candidates</a:t>
+            </a:r>
+            <a:endParaRPr lang="en-GB" sz="2909" b="1" dirty="0" smtClean="0">
               <a:latin typeface="Courier New"/>
               <a:cs typeface="Courier New"/>
             </a:endParaRPr>
-          </a:p>
-          <a:p>
-            <a:r>
-              <a:rPr lang="en-GB" dirty="0" smtClean="0"/>
-              <a:t>Offers and answers with no candidates:</a:t>
-            </a:r>
-          </a:p>
-          <a:p>
-            <a:pPr lvl="1">
-              <a:buNone/>
-            </a:pPr>
-            <a:r>
-              <a:rPr lang="en-GB" sz="2500" b="1" dirty="0" err="1" smtClean="0">
-                <a:solidFill>
-                  <a:schemeClr val="bg1">
-                    <a:lumMod val="50000"/>
-                  </a:schemeClr>
-                </a:solidFill>
-                <a:latin typeface="Courier New"/>
-                <a:cs typeface="Courier New"/>
-              </a:rPr>
-              <a:t>c</a:t>
-            </a:r>
-            <a:r>
-              <a:rPr lang="en-GB" sz="2500" b="1" dirty="0" smtClean="0">
-                <a:solidFill>
-                  <a:schemeClr val="bg1">
-                    <a:lumMod val="50000"/>
-                  </a:schemeClr>
-                </a:solidFill>
-                <a:latin typeface="Courier New"/>
-                <a:cs typeface="Courier New"/>
-              </a:rPr>
-              <a:t>=IN IP4 </a:t>
-            </a:r>
-            <a:r>
-              <a:rPr lang="en-GB" sz="2500" b="1" dirty="0" smtClean="0">
-                <a:latin typeface="Courier New"/>
-                <a:cs typeface="Courier New"/>
-              </a:rPr>
-              <a:t>0.0.0.0</a:t>
-            </a:r>
-          </a:p>
-          <a:p>
-            <a:pPr lvl="1">
-              <a:buNone/>
-            </a:pPr>
-            <a:r>
-              <a:rPr lang="en-GB" sz="2500" b="1" dirty="0" err="1" smtClean="0">
-                <a:solidFill>
-                  <a:srgbClr val="7F7F7F"/>
-                </a:solidFill>
-                <a:latin typeface="Courier New"/>
-                <a:cs typeface="Courier New"/>
-              </a:rPr>
-              <a:t>m</a:t>
-            </a:r>
-            <a:r>
-              <a:rPr lang="en-GB" sz="2500" b="1" dirty="0" smtClean="0">
-                <a:solidFill>
-                  <a:srgbClr val="7F7F7F"/>
-                </a:solidFill>
-                <a:latin typeface="Courier New"/>
-                <a:cs typeface="Courier New"/>
-              </a:rPr>
-              <a:t>=audio </a:t>
-            </a:r>
-            <a:r>
-              <a:rPr lang="en-GB" sz="2500" b="1" dirty="0" smtClean="0">
-                <a:latin typeface="Courier New"/>
-                <a:cs typeface="Courier New"/>
-              </a:rPr>
-              <a:t>1 </a:t>
-            </a:r>
-            <a:r>
-              <a:rPr lang="en-GB" sz="2500" b="1" dirty="0" smtClean="0">
-                <a:solidFill>
-                  <a:srgbClr val="7F7F7F"/>
-                </a:solidFill>
-                <a:latin typeface="Courier New"/>
-                <a:cs typeface="Courier New"/>
-              </a:rPr>
-              <a:t>RTP/AVP 0 96</a:t>
-            </a:r>
-            <a:r>
-              <a:rPr lang="en-GB" sz="2500" b="1" dirty="0" smtClean="0">
-                <a:solidFill>
-                  <a:srgbClr val="7F7F7F"/>
-                </a:solidFill>
-                <a:latin typeface="Courier New"/>
-                <a:cs typeface="Courier New"/>
-              </a:rPr>
-              <a:t/>
-            </a:r>
-            <a:br>
-              <a:rPr lang="en-GB" sz="2500" b="1" dirty="0" smtClean="0">
-                <a:solidFill>
-                  <a:srgbClr val="7F7F7F"/>
-                </a:solidFill>
-                <a:latin typeface="Courier New"/>
-                <a:cs typeface="Courier New"/>
-              </a:rPr>
-            </a:br>
-            <a:endParaRPr lang="en-GB" dirty="0" smtClean="0"/>
-          </a:p>
-          <a:p>
-            <a:r>
-              <a:rPr lang="en-GB" dirty="0" smtClean="0"/>
-              <a:t>Change </a:t>
-            </a:r>
-            <a:r>
-              <a:rPr lang="en-GB" dirty="0" err="1" smtClean="0"/>
-              <a:t>c</a:t>
-            </a:r>
-            <a:r>
-              <a:rPr lang="en-GB" dirty="0" smtClean="0"/>
-              <a:t>= line for O/As with no </a:t>
-            </a:r>
-            <a:r>
-              <a:rPr lang="en-GB" dirty="0" err="1" smtClean="0"/>
-              <a:t>cands</a:t>
-            </a:r>
-            <a:r>
-              <a:rPr lang="en-GB" dirty="0" smtClean="0"/>
-              <a:t>:</a:t>
-            </a:r>
-          </a:p>
-          <a:p>
-            <a:pPr lvl="1" defTabSz="809625">
-              <a:buNone/>
-              <a:tabLst>
-                <a:tab pos="895350" algn="l"/>
-              </a:tabLst>
-            </a:pPr>
-            <a:r>
-              <a:rPr lang="en-GB" b="1" dirty="0" smtClean="0">
-                <a:solidFill>
-                  <a:schemeClr val="bg1">
-                    <a:lumMod val="50000"/>
-                  </a:schemeClr>
-                </a:solidFill>
-                <a:latin typeface="Courier New"/>
-                <a:cs typeface="Courier New"/>
-              </a:rPr>
-              <a:t>- </a:t>
-            </a:r>
-            <a:r>
-              <a:rPr lang="en-GB" b="1" dirty="0" err="1" smtClean="0">
-                <a:solidFill>
-                  <a:schemeClr val="bg1">
-                    <a:lumMod val="50000"/>
-                  </a:schemeClr>
-                </a:solidFill>
-                <a:latin typeface="Courier New"/>
-                <a:cs typeface="Courier New"/>
-              </a:rPr>
-              <a:t>c</a:t>
-            </a:r>
-            <a:r>
-              <a:rPr lang="en-GB" b="1" dirty="0" smtClean="0">
-                <a:solidFill>
-                  <a:schemeClr val="bg1">
-                    <a:lumMod val="50000"/>
-                  </a:schemeClr>
-                </a:solidFill>
-                <a:latin typeface="Courier New"/>
-                <a:cs typeface="Courier New"/>
-              </a:rPr>
-              <a:t>=IN </a:t>
-            </a:r>
-            <a:r>
-              <a:rPr lang="en-GB" b="1" dirty="0" smtClean="0">
-                <a:latin typeface="Courier New"/>
-                <a:cs typeface="Courier New"/>
-              </a:rPr>
-              <a:t>IP4 0.0.0.0</a:t>
-            </a:r>
-          </a:p>
-          <a:p>
-            <a:pPr lvl="1" defTabSz="809625">
-              <a:buNone/>
-              <a:tabLst>
-                <a:tab pos="895350" algn="l"/>
-              </a:tabLst>
-            </a:pPr>
-            <a:r>
-              <a:rPr lang="en-GB" b="1" dirty="0" smtClean="0">
-                <a:solidFill>
-                  <a:schemeClr val="bg1">
-                    <a:lumMod val="50000"/>
-                  </a:schemeClr>
-                </a:solidFill>
-                <a:latin typeface="Courier New"/>
-                <a:cs typeface="Courier New"/>
-              </a:rPr>
-              <a:t>- </a:t>
-            </a:r>
-            <a:r>
-              <a:rPr lang="en-GB" b="1" dirty="0" err="1" smtClean="0">
-                <a:solidFill>
-                  <a:schemeClr val="bg1">
-                    <a:lumMod val="50000"/>
-                  </a:schemeClr>
-                </a:solidFill>
-                <a:latin typeface="Courier New"/>
-                <a:cs typeface="Courier New"/>
-              </a:rPr>
-              <a:t>m</a:t>
-            </a:r>
-            <a:r>
-              <a:rPr lang="en-GB" b="1" dirty="0" smtClean="0">
-                <a:solidFill>
-                  <a:schemeClr val="bg1">
-                    <a:lumMod val="50000"/>
-                  </a:schemeClr>
-                </a:solidFill>
-                <a:latin typeface="Courier New"/>
-                <a:cs typeface="Courier New"/>
-              </a:rPr>
-              <a:t>=audio </a:t>
-            </a:r>
-            <a:r>
-              <a:rPr lang="en-GB" b="1" dirty="0" smtClean="0">
-                <a:solidFill>
-                  <a:srgbClr val="000000"/>
-                </a:solidFill>
-                <a:latin typeface="Courier New"/>
-                <a:cs typeface="Courier New"/>
-              </a:rPr>
-              <a:t>1</a:t>
-            </a:r>
-            <a:r>
-              <a:rPr lang="en-GB" b="1" dirty="0" smtClean="0">
-                <a:solidFill>
-                  <a:schemeClr val="bg1">
-                    <a:lumMod val="50000"/>
-                  </a:schemeClr>
-                </a:solidFill>
-                <a:latin typeface="Courier New"/>
-                <a:cs typeface="Courier New"/>
-              </a:rPr>
-              <a:t> RTP/AVP 0 96</a:t>
-            </a:r>
-          </a:p>
-          <a:p>
-            <a:pPr lvl="1" defTabSz="809625">
-              <a:buNone/>
-              <a:tabLst>
-                <a:tab pos="895350" algn="l"/>
-              </a:tabLst>
-            </a:pPr>
-            <a:r>
-              <a:rPr lang="en-GB" b="1" dirty="0" smtClean="0">
-                <a:solidFill>
-                  <a:schemeClr val="bg1">
-                    <a:lumMod val="50000"/>
-                  </a:schemeClr>
-                </a:solidFill>
-                <a:latin typeface="Courier New"/>
-                <a:cs typeface="Courier New"/>
-              </a:rPr>
-              <a:t>+ </a:t>
-            </a:r>
-            <a:r>
-              <a:rPr lang="en-GB" b="1" dirty="0" err="1" smtClean="0">
-                <a:solidFill>
-                  <a:schemeClr val="bg1">
-                    <a:lumMod val="50000"/>
-                  </a:schemeClr>
-                </a:solidFill>
-                <a:latin typeface="Courier New"/>
-                <a:cs typeface="Courier New"/>
-              </a:rPr>
-              <a:t>c</a:t>
-            </a:r>
-            <a:r>
-              <a:rPr lang="en-GB" b="1" dirty="0" smtClean="0">
-                <a:solidFill>
-                  <a:schemeClr val="bg1">
-                    <a:lumMod val="50000"/>
-                  </a:schemeClr>
-                </a:solidFill>
-                <a:latin typeface="Courier New"/>
-                <a:cs typeface="Courier New"/>
-              </a:rPr>
-              <a:t>=IN </a:t>
-            </a:r>
-            <a:r>
-              <a:rPr lang="en-GB" b="1" dirty="0" smtClean="0">
-                <a:solidFill>
-                  <a:srgbClr val="000000"/>
-                </a:solidFill>
-                <a:latin typeface="Courier New"/>
-                <a:cs typeface="Courier New"/>
-              </a:rPr>
-              <a:t>IP6 ::</a:t>
-            </a:r>
-          </a:p>
-          <a:p>
-            <a:pPr lvl="1" defTabSz="809625">
-              <a:buNone/>
-              <a:tabLst>
-                <a:tab pos="895350" algn="l"/>
-              </a:tabLst>
-            </a:pPr>
-            <a:r>
-              <a:rPr lang="en-GB" b="1" dirty="0" smtClean="0">
-                <a:solidFill>
-                  <a:schemeClr val="bg1">
-                    <a:lumMod val="50000"/>
-                  </a:schemeClr>
-                </a:solidFill>
-                <a:latin typeface="Courier New"/>
-                <a:cs typeface="Courier New"/>
-              </a:rPr>
-              <a:t>+ </a:t>
-            </a:r>
-            <a:r>
-              <a:rPr lang="en-GB" b="1" dirty="0" err="1" smtClean="0">
-                <a:solidFill>
-                  <a:schemeClr val="bg1">
-                    <a:lumMod val="50000"/>
-                  </a:schemeClr>
-                </a:solidFill>
-                <a:latin typeface="Courier New"/>
-                <a:cs typeface="Courier New"/>
-              </a:rPr>
-              <a:t>m</a:t>
-            </a:r>
-            <a:r>
-              <a:rPr lang="en-GB" b="1" dirty="0" smtClean="0">
-                <a:solidFill>
-                  <a:schemeClr val="bg1">
-                    <a:lumMod val="50000"/>
-                  </a:schemeClr>
-                </a:solidFill>
-                <a:latin typeface="Courier New"/>
-                <a:cs typeface="Courier New"/>
-              </a:rPr>
-              <a:t>=audio </a:t>
-            </a:r>
-            <a:r>
-              <a:rPr lang="en-GB" b="1" dirty="0" smtClean="0">
-                <a:solidFill>
-                  <a:srgbClr val="000000"/>
-                </a:solidFill>
-                <a:latin typeface="Courier New"/>
-                <a:cs typeface="Courier New"/>
-              </a:rPr>
-              <a:t>9</a:t>
-            </a:r>
-            <a:r>
-              <a:rPr lang="en-GB" b="1" dirty="0" smtClean="0">
-                <a:solidFill>
-                  <a:schemeClr val="bg1">
-                    <a:lumMod val="50000"/>
-                  </a:schemeClr>
-                </a:solidFill>
-                <a:latin typeface="Courier New"/>
-                <a:cs typeface="Courier New"/>
-              </a:rPr>
-              <a:t> RTP/AVP 0 96</a:t>
-            </a:r>
           </a:p>
           <a:p>
             <a:pPr lvl="1" defTabSz="809625">
@@ -12353,7 +9853,85 @@
             <a:endParaRPr lang="en-GB" dirty="0" smtClean="0"/>
           </a:p>
           <a:p>
+            <a:r>
+              <a:rPr lang="en-GB" dirty="0" smtClean="0"/>
+              <a:t>Remove use of </a:t>
+            </a:r>
+            <a:r>
+              <a:rPr lang="en-GB" dirty="0" err="1" smtClean="0"/>
+              <a:t>m</a:t>
+            </a:r>
+            <a:r>
+              <a:rPr lang="en-GB" dirty="0" smtClean="0"/>
+              <a:t>= line index when sending trickled candidates. Will use MID only</a:t>
+            </a:r>
+          </a:p>
+          <a:p>
             <a:endParaRPr lang="en-GB" dirty="0" smtClean="0"/>
+          </a:p>
+          <a:p>
+            <a:r>
+              <a:rPr lang="en-GB" dirty="0" smtClean="0"/>
+              <a:t>Always send end-of-candidates unless </a:t>
+            </a:r>
+            <a:r>
+              <a:rPr lang="en-US" dirty="0" smtClean="0"/>
+              <a:t>you are controlled and </a:t>
+            </a:r>
+            <a:r>
+              <a:rPr lang="en-GB" dirty="0" smtClean="0"/>
+              <a:t>ICE processing has ended</a:t>
+            </a:r>
+          </a:p>
+          <a:p>
+            <a:endParaRPr lang="en-GB" dirty="0" smtClean="0"/>
+          </a:p>
+          <a:p>
+            <a:r>
+              <a:rPr lang="en-GB" dirty="0" smtClean="0"/>
+              <a:t>MUST NOT send candidates after that and MUST do an ICE restart to change</a:t>
+            </a:r>
+          </a:p>
+          <a:p>
+            <a:endParaRPr lang="en-GB" dirty="0" smtClean="0"/>
+          </a:p>
+          <a:p>
+            <a:r>
+              <a:rPr lang="en-GB" dirty="0" smtClean="0"/>
+              <a:t>Add a reference to the SIP usage document</a:t>
+            </a:r>
+          </a:p>
+          <a:p>
+            <a:endParaRPr lang="en-GB" dirty="0" smtClean="0"/>
+          </a:p>
+          <a:p>
+            <a:r>
+              <a:rPr lang="en-GB" dirty="0" smtClean="0"/>
+              <a:t>Specify "end-of-candidates” as media level (obviously can be session too)</a:t>
+            </a:r>
+          </a:p>
+          <a:p>
+            <a:pPr lvl="1"/>
+            <a:r>
+              <a:rPr lang="fr-FR" dirty="0" smtClean="0"/>
+              <a:t>R</a:t>
+            </a:r>
+            <a:r>
+              <a:rPr lang="en-GB" dirty="0" err="1" smtClean="0"/>
+              <a:t>equires</a:t>
+            </a:r>
+            <a:r>
+              <a:rPr lang="en-GB" dirty="0" smtClean="0"/>
+              <a:t> small update to </a:t>
+            </a:r>
+            <a:r>
+              <a:rPr lang="en-GB" dirty="0" err="1" smtClean="0"/>
+              <a:t>WebRTC</a:t>
+            </a:r>
+            <a:r>
+              <a:rPr lang="en-GB" dirty="0" smtClean="0"/>
+              <a:t> W3C specs.</a:t>
+            </a:r>
           </a:p>
         </p:txBody>
       </p:sp>
@@ -12461,301 +10039,23 @@
             </a:r>
             <a:r>
               <a:rPr lang="en-GB" sz="3600" dirty="0" smtClean="0"/>
-              <a:t>Boston Interim (2/3)</a:t>
-            </a:r>
-            <a:endParaRPr lang="en-GB" sz="3600" dirty="0"/>
-          </a:p>
-        </p:txBody>
-      </p:sp>
-      <p:sp>
-        <p:nvSpPr>
-          <p:cNvPr id="3" name="Espace réservé du contenu 2"/>
-          <p:cNvSpPr>
-            <a:spLocks noGrp="1"/>
-          </p:cNvSpPr>
-          <p:nvPr>
-            <p:ph idx="1"/>
-          </p:nvPr>
-        </p:nvSpPr>
-        <p:spPr>
-          <a:xfrm>
-            <a:off x="457200" y="1143000"/>
-            <a:ext cx="8229600" cy="4983163"/>
-          </a:xfrm>
-        </p:spPr>
-        <p:txBody>
-          <a:bodyPr>
-            <a:normAutofit fontScale="55000" lnSpcReduction="20000"/>
-          </a:bodyPr>
-          <a:lstStyle/>
-          <a:p>
-            <a:r>
-              <a:rPr lang="en-GB" dirty="0" smtClean="0"/>
-              <a:t>New candidates and </a:t>
-            </a:r>
-            <a:r>
-              <a:rPr lang="en-GB" dirty="0" smtClean="0"/>
-              <a:t>end-of-candidates</a:t>
-            </a:r>
-            <a:endParaRPr lang="en-GB" dirty="0" smtClean="0"/>
-          </a:p>
-          <a:p>
-            <a:pPr lvl="1">
-              <a:buNone/>
-            </a:pPr>
-            <a:r>
-              <a:rPr lang="en-GB" sz="3273" b="1" dirty="0" smtClean="0">
-                <a:latin typeface="Courier New"/>
-                <a:cs typeface="Courier New"/>
-              </a:rPr>
-              <a:t>…</a:t>
-            </a:r>
-          </a:p>
-          <a:p>
-            <a:pPr lvl="1">
-              <a:buNone/>
-            </a:pPr>
-            <a:r>
-              <a:rPr lang="en-GB" sz="2909" b="1" dirty="0" smtClean="0">
-                <a:latin typeface="Courier New"/>
-                <a:cs typeface="Courier New"/>
-              </a:rPr>
-              <a:t>a=candidate:1 1 UDP 1234 1.2.1.4 5000 </a:t>
-            </a:r>
-            <a:r>
-              <a:rPr lang="en-GB" sz="2909" b="1" dirty="0" err="1" smtClean="0">
-                <a:latin typeface="Courier New"/>
-                <a:cs typeface="Courier New"/>
-              </a:rPr>
-              <a:t>typ</a:t>
-            </a:r>
-            <a:r>
-              <a:rPr lang="en-GB" sz="2909" b="1" dirty="0" smtClean="0">
-                <a:latin typeface="Courier New"/>
-                <a:cs typeface="Courier New"/>
-              </a:rPr>
-              <a:t> host</a:t>
-            </a:r>
-          </a:p>
-          <a:p>
-            <a:pPr lvl="1">
-              <a:buNone/>
-            </a:pPr>
-            <a:r>
-              <a:rPr lang="en-GB" sz="2909" b="1" dirty="0" smtClean="0">
-                <a:latin typeface="Courier New"/>
-                <a:cs typeface="Courier New"/>
-              </a:rPr>
-              <a:t>a=candidate:2 1 UDP 5678 6.1.2.3 5000 </a:t>
-            </a:r>
-            <a:r>
-              <a:rPr lang="en-GB" sz="2909" b="1" dirty="0" err="1" smtClean="0">
-                <a:latin typeface="Courier New"/>
-                <a:cs typeface="Courier New"/>
-              </a:rPr>
-              <a:t>typ</a:t>
-            </a:r>
-            <a:r>
-              <a:rPr lang="en-GB" sz="2909" b="1" dirty="0" smtClean="0">
-                <a:latin typeface="Courier New"/>
-                <a:cs typeface="Courier New"/>
-              </a:rPr>
-              <a:t> </a:t>
-            </a:r>
-            <a:r>
-              <a:rPr lang="en-GB" sz="2909" b="1" dirty="0" err="1" smtClean="0">
-                <a:latin typeface="Courier New"/>
-                <a:cs typeface="Courier New"/>
-              </a:rPr>
-              <a:t>srflx</a:t>
-            </a:r>
-            <a:endParaRPr lang="en-GB" sz="2909" b="1" dirty="0" smtClean="0">
-              <a:latin typeface="Courier New"/>
-              <a:cs typeface="Courier New"/>
-            </a:endParaRPr>
-          </a:p>
-          <a:p>
-            <a:pPr lvl="1">
-              <a:buNone/>
-            </a:pPr>
-            <a:r>
-              <a:rPr lang="en-GB" sz="2909" b="1" dirty="0" smtClean="0">
-                <a:latin typeface="Courier New"/>
-                <a:cs typeface="Courier New"/>
-              </a:rPr>
-              <a:t>a=end-of-candidates</a:t>
-            </a:r>
-            <a:endParaRPr lang="en-GB" sz="2909" b="1" dirty="0" smtClean="0">
-              <a:latin typeface="Courier New"/>
-              <a:cs typeface="Courier New"/>
-            </a:endParaRPr>
-          </a:p>
-          <a:p>
-            <a:pPr lvl="1" defTabSz="809625">
-              <a:buNone/>
-              <a:tabLst>
-                <a:tab pos="895350" algn="l"/>
-              </a:tabLst>
-            </a:pPr>
-            <a:endParaRPr lang="en-GB" dirty="0" smtClean="0"/>
-          </a:p>
-          <a:p>
-            <a:r>
-              <a:rPr lang="en-GB" dirty="0" smtClean="0"/>
-              <a:t>Remove use of </a:t>
-            </a:r>
-            <a:r>
-              <a:rPr lang="en-GB" dirty="0" err="1" smtClean="0"/>
-              <a:t>m</a:t>
-            </a:r>
-            <a:r>
-              <a:rPr lang="en-GB" dirty="0" smtClean="0"/>
-              <a:t>= line index when sending trickled candidates. Will use MID only</a:t>
-            </a:r>
-          </a:p>
-          <a:p>
-            <a:endParaRPr lang="en-GB" dirty="0" smtClean="0"/>
-          </a:p>
-          <a:p>
-            <a:r>
-              <a:rPr lang="en-GB" dirty="0" smtClean="0"/>
-              <a:t>Always send end-of-candidates unless ICE processing has ended</a:t>
-            </a:r>
-          </a:p>
-          <a:p>
-            <a:endParaRPr lang="en-GB" dirty="0" smtClean="0"/>
-          </a:p>
-          <a:p>
-            <a:r>
-              <a:rPr lang="en-GB" dirty="0" smtClean="0"/>
-              <a:t>MUST NOT send candidates after that and MUST do an ICE restart to change</a:t>
-            </a:r>
-          </a:p>
-          <a:p>
-            <a:endParaRPr lang="en-GB" dirty="0" smtClean="0"/>
-          </a:p>
-          <a:p>
-            <a:r>
-              <a:rPr lang="en-GB" dirty="0" smtClean="0"/>
-              <a:t>Add a reference to the SIP usage document</a:t>
-            </a:r>
-          </a:p>
-          <a:p>
-            <a:endParaRPr lang="en-GB" dirty="0" smtClean="0"/>
-          </a:p>
-          <a:p>
-            <a:r>
-              <a:rPr lang="en-GB" dirty="0" smtClean="0"/>
-              <a:t>Specify "end-of-candidates” as media level (obviously can be session too)</a:t>
-            </a:r>
-          </a:p>
-        </p:txBody>
-      </p:sp>
-      <p:sp>
-        <p:nvSpPr>
-          <p:cNvPr id="4" name="Espace réservé du pied de page 3"/>
-          <p:cNvSpPr>
-            <a:spLocks noGrp="1"/>
-          </p:cNvSpPr>
-          <p:nvPr>
-            <p:ph type="ftr" sz="quarter" idx="11"/>
-          </p:nvPr>
-        </p:nvSpPr>
-        <p:spPr/>
-        <p:txBody>
-          <a:bodyPr/>
-          <a:lstStyle/>
-          <a:p>
-            <a:r>
-              <a:rPr lang="fr-FR" smtClean="0"/>
-              <a:t>draft-ivov-mmusic-trickle-ice E. Rescorla, J. Uberti, E. Ivov</a:t>
-            </a:r>
-            <a:endParaRPr lang="en-GB" smtClean="0"/>
-          </a:p>
-        </p:txBody>
-      </p:sp>
-      <p:sp>
-        <p:nvSpPr>
-          <p:cNvPr id="6" name="Espace réservé du numéro de diapositive 5"/>
-          <p:cNvSpPr>
-            <a:spLocks noGrp="1"/>
-          </p:cNvSpPr>
-          <p:nvPr>
-            <p:ph type="sldNum" sz="quarter" idx="4"/>
-          </p:nvPr>
-        </p:nvSpPr>
-        <p:spPr/>
-        <p:txBody>
-          <a:bodyPr/>
-          <a:lstStyle/>
-          <a:p>
-            <a:fld id="{83363BB8-67C3-44C4-A9E3-5652E069104A}" type="slidenum">
-              <a:rPr lang="en-US" smtClean="0"/>
-              <a:pPr/>
-              <a:t>5</a:t>
-            </a:fld>
-            <a:r>
-              <a:rPr lang="en-US" smtClean="0"/>
-              <a:t>/18</a:t>
-            </a:r>
-            <a:endParaRPr lang="en-US" dirty="0"/>
-          </a:p>
-        </p:txBody>
-      </p:sp>
-    </p:spTree>
-  </p:cSld>
-  <p:clrMapOvr>
-    <a:masterClrMapping/>
-  </p:clrMapOvr>
-</p:sld>
-</file>
-
-<file path=ppt/slides/slide6.xml><?xml version="1.0" encoding="utf-8"?>
-<p:sld xmlns:a="http://schemas.openxmlformats.org/drawingml/2006/main" xmlns:r="http://schemas.openxmlformats.org/officeDocument/2006/relationships" xmlns:mc="http://schemas.openxmlformats.org/markup-compatibility/2006" xmlns:mv="urn:schemas-microsoft-com:mac:vml" xmlns:p="http://schemas.openxmlformats.org/presentationml/2006/main" mc:Ignorable="mv" mc:PreserveAttributes="mv:*">
-  <p:cSld>
-    <p:spTree>
-      <p:nvGrpSpPr>
-        <p:cNvPr id="1" name=""/>
-        <p:cNvGrpSpPr/>
-        <p:nvPr/>
-      </p:nvGrpSpPr>
-      <p:grpSpPr>
-        <a:xfrm>
-          <a:off x="0" y="0"/>
-          <a:ext cx="0" cy="0"/>
-          <a:chOff x="0" y="0"/>
-          <a:chExt cx="0" cy="0"/>
-        </a:xfrm>
-      </p:grpSpPr>
-      <p:sp>
-        <p:nvSpPr>
-          <p:cNvPr id="2" name="Titre 1"/>
-          <p:cNvSpPr>
-            <a:spLocks noGrp="1"/>
-          </p:cNvSpPr>
-          <p:nvPr>
-            <p:ph type="title"/>
-          </p:nvPr>
-        </p:nvSpPr>
-        <p:spPr>
-          <a:xfrm>
-            <a:off x="457200" y="0"/>
-            <a:ext cx="8229600" cy="1143000"/>
-          </a:xfrm>
-        </p:spPr>
-        <p:txBody>
-          <a:bodyPr>
-            <a:normAutofit/>
-          </a:bodyPr>
-          <a:lstStyle/>
-          <a:p>
+              <a:t>Boston Interim (</a:t>
+            </a:r>
+            <a:r>
+              <a:rPr lang="bg-BG" sz="3600" dirty="0" smtClean="0"/>
+              <a:t>2</a:t>
+            </a:r>
             <a:r>
               <a:rPr lang="en-GB" sz="3600" dirty="0" smtClean="0"/>
-              <a:t>Decisions from the </a:t>
+              <a:t>/</a:t>
+            </a:r>
+            <a:r>
+              <a:rPr lang="bg-BG" sz="3600" dirty="0" smtClean="0"/>
+              <a:t>2</a:t>
             </a:r>
             <a:r>
               <a:rPr lang="en-GB" sz="3600" dirty="0" smtClean="0"/>
-              <a:t>Boston Interim (3/3)</a:t>
+              <a:t>)</a:t>
             </a:r>
             <a:endParaRPr lang="en-GB" sz="3600" dirty="0"/>
           </a:p>
@@ -13488,10 +10788,10 @@
         </p:nvGrpSpPr>
         <p:grpSpPr>
           <a:xfrm>
-            <a:off x="3145707" y="3363142"/>
-            <a:ext cx="4128308" cy="569387"/>
-            <a:chOff x="3145707" y="3896542"/>
-            <a:chExt cx="4128308" cy="569387"/>
+            <a:off x="3145707" y="3581400"/>
+            <a:ext cx="4128308" cy="348877"/>
+            <a:chOff x="3145707" y="4114800"/>
+            <a:chExt cx="4128308" cy="348877"/>
           </a:xfrm>
         </p:grpSpPr>
         <p:cxnSp>
@@ -13537,8 +10837,8 @@
           </p:nvSpPr>
           <p:spPr>
             <a:xfrm>
-              <a:off x="3145707" y="3896542"/>
-              <a:ext cx="4128308" cy="569387"/>
+              <a:off x="3145707" y="4114800"/>
+              <a:ext cx="4128308" cy="323165"/>
             </a:xfrm>
             <a:prstGeom prst="rect">
               <a:avLst/>
@@ -13564,27 +10864,6 @@
                 <a:rPr lang="en-US" sz="1500" i="0" dirty="0" err="1" smtClean="0"/>
                 <a:t>cands</a:t>
               </a:r>
-              <a:r>
-                <a:rPr lang="en-US" sz="1500" i="0" dirty="0" smtClean="0"/>
-                <a:t/>
-              </a:r>
-              <a:br>
-                <a:rPr lang="en-US" sz="1500" i="0" dirty="0" smtClean="0"/>
-              </a:br>
-              <a:r>
-                <a:rPr lang="fr-FR" sz="1600" b="1" dirty="0" smtClean="0">
-                  <a:latin typeface="Courier New"/>
-                  <a:cs typeface="Courier New"/>
-                </a:rPr>
-                <a:t>a=</a:t>
-              </a:r>
-              <a:r>
-                <a:rPr lang="fr-FR" sz="1600" b="1" dirty="0" err="1" smtClean="0">
-                  <a:latin typeface="Courier New"/>
-                  <a:cs typeface="Courier New"/>
-                </a:rPr>
-                <a:t>ice-lite</a:t>
-              </a:r>
               <a:endParaRPr lang="fr-FR" sz="1500" b="1" i="0" dirty="0">
                 <a:latin typeface="Courier New"/>
                 <a:cs typeface="Courier New"/>
@@ -13601,10 +10880,10 @@
         </p:nvGrpSpPr>
         <p:grpSpPr>
           <a:xfrm>
-            <a:off x="3159576" y="2996466"/>
-            <a:ext cx="4006182" cy="323165"/>
-            <a:chOff x="3159576" y="3529866"/>
-            <a:chExt cx="4006182" cy="323165"/>
+            <a:off x="3159576" y="2953435"/>
+            <a:ext cx="4006182" cy="366196"/>
+            <a:chOff x="3159576" y="3486835"/>
+            <a:chExt cx="4006182" cy="366196"/>
           </a:xfrm>
         </p:grpSpPr>
         <p:sp>
@@ -13615,7 +10894,7 @@
           </p:nvSpPr>
           <p:spPr>
             <a:xfrm>
-              <a:off x="4038600" y="3529866"/>
+              <a:off x="4038600" y="3486835"/>
               <a:ext cx="2408304" cy="323165"/>
             </a:xfrm>
             <a:prstGeom prst="rect">
@@ -13643,16 +10922,29 @@
                 <a:t>with</a:t>
               </a:r>
               <a:r>
-                <a:rPr lang="fr-FR" sz="1500" i="0" dirty="0" smtClean="0"/>
-                <a:t>  </a:t>
+                <a:rPr lang="fr-FR" sz="1500" dirty="0" smtClean="0"/>
+                <a:t> </a:t>
               </a:r>
               <a:r>
-                <a:rPr lang="fr-FR" sz="1500" b="1" i="0" dirty="0" smtClean="0"/>
-                <a:t>no </a:t>
+                <a:rPr lang="fr-FR" sz="1400" b="1" dirty="0" smtClean="0">
+                  <a:latin typeface="Courier New"/>
+                  <a:cs typeface="Courier New"/>
+                </a:rPr>
+                <a:t>a</a:t>
               </a:r>
               <a:r>
-                <a:rPr lang="fr-FR" sz="1500" i="0" dirty="0" err="1" smtClean="0"/>
-                <a:t>cands</a:t>
+                <a:rPr lang="fr-FR" sz="1400" b="1" dirty="0" smtClean="0">
+                  <a:latin typeface="Courier New"/>
+                  <a:cs typeface="Courier New"/>
+                </a:rPr>
+                <a:t>=</a:t>
+              </a:r>
+              <a:r>
+                <a:rPr lang="fr-FR" sz="1400" b="1" dirty="0" err="1" smtClean="0">
+                  <a:latin typeface="Courier New"/>
+                  <a:cs typeface="Courier New"/>
+                </a:rPr>
+                <a:t>ice-lite</a:t>
               </a:r>
               <a:endParaRPr lang="fr-FR" sz="1500" i="0" dirty="0"/>
             </a:p>
@@ -13842,148 +11134,6 @@
       </p:sp>
       <p:sp>
         <p:nvSpPr>
-          <p:cNvPr id="34" name="Espace réservé du contenu 2"/>
-          <p:cNvSpPr txBox="1">
-            <a:spLocks/>
-          </p:cNvSpPr>
-          <p:nvPr/>
-        </p:nvSpPr>
-        <p:spPr>
-          <a:xfrm>
-            <a:off x="457200" y="5410200"/>
-            <a:ext cx="8229600" cy="838200"/>
-          </a:xfrm>
-          <a:prstGeom prst="rect">
-            <a:avLst/>
-          </a:prstGeom>
-        </p:spPr>
-        <p:txBody>
-          <a:bodyPr vert="horz" lIns="91440" tIns="45720" rIns="91440" bIns="45720" rtlCol="0">
-            <a:normAutofit lnSpcReduction="10000"/>
-          </a:bodyPr>
-          <a:lstStyle/>
-          <a:p>
-            <a:pPr marL="342900" marR="0" lvl="0" indent="-342900" algn="l" defTabSz="914400" rtl="0" eaLnBrk="1" fontAlgn="auto" latinLnBrk="0" hangingPunct="1">
-              <a:lnSpc>
-                <a:spcPct val="100000"/>
-              </a:lnSpc>
-              <a:spcBef>
-                <a:spcPct val="20000"/>
-              </a:spcBef>
-              <a:spcAft>
-                <a:spcPts val="0"/>
-              </a:spcAft>
-              <a:buClrTx/>
-              <a:buSzTx/>
-              <a:buFont typeface="Arial" pitchFamily="34" charset="0"/>
-              <a:buChar char="•"/>
-              <a:tabLst/>
-              <a:defRPr/>
-            </a:pPr>
-            <a:r>
-              <a:rPr kumimoji="0" lang="en-GB" sz="2700" b="0" i="0" u="none" strike="noStrike" kern="1200" cap="none" spc="0" normalizeH="0" baseline="0" noProof="0" dirty="0" smtClean="0">
-                <a:ln>
-                  <a:noFill/>
-                </a:ln>
-                <a:solidFill>
-                  <a:schemeClr val="tx1"/>
-                </a:solidFill>
-                <a:effectLst/>
-                <a:uLnTx/>
-                <a:uFillTx/>
-                <a:latin typeface="+mn-lt"/>
-                <a:ea typeface="+mn-ea"/>
-                <a:cs typeface="+mn-cs"/>
-              </a:rPr>
-              <a:t>Open Issue: Does it make sense to point that disco here is only necessary for relayed</a:t>
-            </a:r>
-            <a:r>
-              <a:rPr kumimoji="0" lang="en-GB" sz="2700" b="0" i="0" u="none" strike="noStrike" kern="1200" cap="none" spc="0" normalizeH="0" noProof="0" dirty="0" smtClean="0">
-                <a:ln>
-                  <a:noFill/>
-                </a:ln>
-                <a:solidFill>
-                  <a:schemeClr val="tx1"/>
-                </a:solidFill>
-                <a:effectLst/>
-                <a:uLnTx/>
-                <a:uFillTx/>
-                <a:latin typeface="+mn-lt"/>
-                <a:ea typeface="+mn-ea"/>
-                <a:cs typeface="+mn-cs"/>
-              </a:rPr>
-              <a:t> </a:t>
-            </a:r>
-            <a:r>
-              <a:rPr kumimoji="0" lang="en-GB" sz="2700" b="0" i="0" u="none" strike="noStrike" kern="1200" cap="none" spc="0" normalizeH="0" noProof="0" dirty="0" err="1" smtClean="0">
-                <a:ln>
-                  <a:noFill/>
-                </a:ln>
-                <a:solidFill>
-                  <a:schemeClr val="tx1"/>
-                </a:solidFill>
-                <a:effectLst/>
-                <a:uLnTx/>
-                <a:uFillTx/>
-                <a:latin typeface="+mn-lt"/>
-                <a:ea typeface="+mn-ea"/>
-                <a:cs typeface="+mn-cs"/>
-              </a:rPr>
-              <a:t>cands</a:t>
-            </a:r>
-            <a:r>
-              <a:rPr kumimoji="0" lang="en-GB" sz="2700" b="0" i="0" u="none" strike="noStrike" kern="1200" cap="none" spc="0" normalizeH="0" noProof="0" dirty="0" smtClean="0">
-                <a:ln>
-                  <a:noFill/>
-                </a:ln>
-                <a:solidFill>
-                  <a:schemeClr val="tx1"/>
-                </a:solidFill>
-                <a:effectLst/>
-                <a:uLnTx/>
-                <a:uFillTx/>
-                <a:latin typeface="+mn-lt"/>
-                <a:ea typeface="+mn-ea"/>
-                <a:cs typeface="+mn-cs"/>
-              </a:rPr>
-              <a:t>?</a:t>
-            </a:r>
-          </a:p>
-          <a:p>
-            <a:pPr marL="342900" marR="0" lvl="0" indent="-342900" algn="l" defTabSz="914400" rtl="0" eaLnBrk="1" fontAlgn="auto" latinLnBrk="0" hangingPunct="1">
-              <a:lnSpc>
-                <a:spcPct val="100000"/>
-              </a:lnSpc>
-              <a:spcBef>
-                <a:spcPct val="20000"/>
-              </a:spcBef>
-              <a:spcAft>
-                <a:spcPts val="0"/>
-              </a:spcAft>
-              <a:buClrTx/>
-              <a:buSzTx/>
-              <a:tabLst/>
-              <a:defRPr/>
-            </a:pPr>
-            <a:endParaRPr kumimoji="0" lang="en-GB" sz="2700" b="0" i="0" u="none" strike="noStrike" kern="1200" cap="none" spc="0" normalizeH="0" baseline="0" noProof="0" dirty="0" smtClean="0">
-              <a:ln>
-                <a:noFill/>
-              </a:ln>
-              <a:solidFill>
-                <a:schemeClr val="tx1"/>
-              </a:solidFill>
-              <a:effectLst/>
-              <a:uLnTx/>
-              <a:uFillTx/>
-              <a:latin typeface="+mn-lt"/>
-              <a:ea typeface="+mn-ea"/>
-              <a:cs typeface="+mn-cs"/>
-            </a:endParaRPr>
-          </a:p>
-        </p:txBody>
-      </p:sp>
-      <p:sp>
-        <p:nvSpPr>
           <p:cNvPr id="36" name="Espace réservé du numéro de diapositive 35"/>
           <p:cNvSpPr>
             <a:spLocks noGrp="1"/>
@@ -14000,7 +11150,7 @@
             <a:fld id="{83363BB8-67C3-44C4-A9E3-5652E069104A}" type="slidenum">
               <a:rPr lang="en-US" smtClean="0"/>
               <a:pPr/>
-              <a:t>6</a:t>
+              <a:t>5</a:t>
             </a:fld>
             <a:r>
               <a:rPr lang="en-US" smtClean="0"/>
@@ -14022,6 +11172,522 @@
       </p:par>
     </p:tnLst>
   </p:timing>
+</p:sld>
+</file>
+
+<file path=ppt/slides/slide6.xml><?xml version="1.0" encoding="utf-8"?>
+<p:sld xmlns:a="http://schemas.openxmlformats.org/drawingml/2006/main" xmlns:r="http://schemas.openxmlformats.org/officeDocument/2006/relationships" xmlns:mc="http://schemas.openxmlformats.org/markup-compatibility/2006" xmlns:mv="urn:schemas-microsoft-com:mac:vml" xmlns:p="http://schemas.openxmlformats.org/presentationml/2006/main" mc:Ignorable="mv" mc:PreserveAttributes="mv:*">
+  <p:cSld>
+    <p:spTree>
+      <p:nvGrpSpPr>
+        <p:cNvPr id="1" name=""/>
+        <p:cNvGrpSpPr/>
+        <p:nvPr/>
+      </p:nvGrpSpPr>
+      <p:grpSpPr>
+        <a:xfrm>
+          <a:off x="0" y="0"/>
+          <a:ext cx="0" cy="0"/>
+          <a:chOff x="0" y="0"/>
+          <a:chExt cx="0" cy="0"/>
+        </a:xfrm>
+      </p:grpSpPr>
+      <p:sp>
+        <p:nvSpPr>
+          <p:cNvPr id="2" name="Titre 1"/>
+          <p:cNvSpPr>
+            <a:spLocks noGrp="1"/>
+          </p:cNvSpPr>
+          <p:nvPr>
+            <p:ph type="title"/>
+          </p:nvPr>
+        </p:nvSpPr>
+        <p:spPr>
+          <a:xfrm>
+            <a:off x="457200" y="0"/>
+            <a:ext cx="8229600" cy="1143000"/>
+          </a:xfrm>
+        </p:spPr>
+        <p:txBody>
+          <a:bodyPr>
+            <a:normAutofit fontScale="90000"/>
+          </a:bodyPr>
+          <a:lstStyle/>
+          <a:p>
+            <a:r>
+              <a:rPr lang="en-GB" sz="3600" dirty="0" smtClean="0"/>
+              <a:t>Comments </a:t>
+            </a:r>
+            <a:r>
+              <a:rPr lang="en-US" sz="3600" dirty="0" smtClean="0"/>
+              <a:t>and Open Issues </a:t>
+            </a:r>
+            <a:br>
+              <a:rPr lang="en-US" sz="3600" dirty="0" smtClean="0"/>
+            </a:br>
+            <a:r>
+              <a:rPr lang="en-GB" sz="3600" dirty="0" smtClean="0"/>
+              <a:t>from the </a:t>
+            </a:r>
+            <a:r>
+              <a:rPr lang="en-GB" sz="3600" dirty="0" smtClean="0"/>
+              <a:t>Boston Interim</a:t>
+            </a:r>
+            <a:endParaRPr lang="en-GB" sz="3600" dirty="0"/>
+          </a:p>
+        </p:txBody>
+      </p:sp>
+      <p:sp>
+        <p:nvSpPr>
+          <p:cNvPr id="3" name="Espace réservé du contenu 2"/>
+          <p:cNvSpPr>
+            <a:spLocks noGrp="1"/>
+          </p:cNvSpPr>
+          <p:nvPr>
+            <p:ph idx="1"/>
+          </p:nvPr>
+        </p:nvSpPr>
+        <p:spPr>
+          <a:xfrm>
+            <a:off x="457200" y="1143000"/>
+            <a:ext cx="8229600" cy="4983163"/>
+          </a:xfrm>
+        </p:spPr>
+        <p:txBody>
+          <a:bodyPr>
+            <a:normAutofit/>
+          </a:bodyPr>
+          <a:lstStyle/>
+          <a:p>
+            <a:r>
+              <a:rPr lang="en-GB" sz="2400" dirty="0" smtClean="0"/>
+              <a:t>Advertising support for trickle ICE:</a:t>
+            </a:r>
+          </a:p>
+          <a:p>
+            <a:pPr lvl="1">
+              <a:buNone/>
+            </a:pPr>
+            <a:r>
+              <a:rPr lang="en-GB" sz="2000" b="1" dirty="0" smtClean="0">
+                <a:latin typeface="Courier New"/>
+                <a:cs typeface="Courier New"/>
+              </a:rPr>
+              <a:t>a=ice-</a:t>
+            </a:r>
+            <a:r>
+              <a:rPr lang="en-GB" sz="2000" b="1" dirty="0" err="1" smtClean="0">
+                <a:latin typeface="Courier New"/>
+                <a:cs typeface="Courier New"/>
+              </a:rPr>
+              <a:t>options:trickle</a:t>
+            </a:r>
+            <a:endParaRPr lang="en-GB" sz="2000" b="1" dirty="0" smtClean="0">
+              <a:latin typeface="Courier New"/>
+              <a:cs typeface="Courier New"/>
+            </a:endParaRPr>
+          </a:p>
+          <a:p>
+            <a:pPr lvl="1">
+              <a:buNone/>
+            </a:pPr>
+            <a:r>
+              <a:rPr lang="fr-FR" sz="2000" i="1" dirty="0" err="1" smtClean="0"/>
+              <a:t>maybe</a:t>
+            </a:r>
+            <a:r>
+              <a:rPr lang="fr-FR" sz="2000" i="1" dirty="0" smtClean="0"/>
+              <a:t> </a:t>
+            </a:r>
+            <a:r>
+              <a:rPr lang="fr-FR" sz="2000" i="1" dirty="0" err="1" smtClean="0"/>
+              <a:t>also</a:t>
+            </a:r>
+            <a:r>
+              <a:rPr lang="fr-FR" sz="2000" i="1" dirty="0" smtClean="0"/>
+              <a:t> </a:t>
+            </a:r>
+            <a:r>
+              <a:rPr lang="fr-FR" sz="2000" i="1" dirty="0" err="1" smtClean="0"/>
+              <a:t>add</a:t>
+            </a:r>
+            <a:r>
+              <a:rPr lang="fr-FR" sz="2000" i="1" dirty="0" smtClean="0"/>
+              <a:t> an a=</a:t>
+            </a:r>
+            <a:r>
+              <a:rPr lang="fr-FR" sz="2000" i="1" dirty="0" err="1" smtClean="0"/>
+              <a:t>ice-options:trickle</a:t>
+            </a:r>
+            <a:r>
+              <a:rPr lang="fr-FR" sz="2000" i="1" dirty="0" smtClean="0"/>
+              <a:t>-on … or </a:t>
+            </a:r>
+            <a:r>
+              <a:rPr lang="fr-FR" sz="2000" i="1" dirty="0" err="1" smtClean="0"/>
+              <a:t>maybe</a:t>
+            </a:r>
+            <a:r>
+              <a:rPr lang="fr-FR" sz="2000" i="1" dirty="0" smtClean="0"/>
+              <a:t> not </a:t>
+            </a:r>
+            <a:br>
+              <a:rPr lang="fr-FR" sz="2000" i="1" dirty="0" smtClean="0"/>
+            </a:br>
+            <a:r>
+              <a:rPr lang="en-US" sz="2000" dirty="0" smtClean="0"/>
+              <a:t>(list comment from Ari and example with:</a:t>
+            </a:r>
+            <a:br>
+              <a:rPr lang="en-US" sz="2000" dirty="0" smtClean="0"/>
+            </a:br>
+            <a:r>
+              <a:rPr lang="fr-FR" sz="2000" dirty="0" smtClean="0">
+                <a:hlinkClick r:id="rId2"/>
+              </a:rPr>
+              <a:t>http://tools.ietf.org/html/rfc6679#section-</a:t>
+            </a:r>
+            <a:r>
+              <a:rPr lang="fr-FR" sz="2000" dirty="0" smtClean="0">
+                <a:hlinkClick r:id="rId2"/>
+              </a:rPr>
+              <a:t>6.4</a:t>
+            </a:r>
+            <a:r>
+              <a:rPr lang="fr-FR" sz="2000" dirty="0" smtClean="0"/>
+              <a:t> )</a:t>
+            </a:r>
+            <a:r>
+              <a:rPr lang="en-GB" sz="2000" b="1" dirty="0" smtClean="0">
+                <a:latin typeface="Courier New"/>
+                <a:cs typeface="Courier New"/>
+              </a:rPr>
+              <a:t/>
+            </a:r>
+            <a:br>
+              <a:rPr lang="en-GB" sz="2000" b="1" dirty="0" smtClean="0">
+                <a:latin typeface="Courier New"/>
+                <a:cs typeface="Courier New"/>
+              </a:rPr>
+            </a:br>
+            <a:endParaRPr lang="en-GB" sz="2000" b="1" dirty="0" smtClean="0">
+              <a:latin typeface="Courier New"/>
+              <a:cs typeface="Courier New"/>
+            </a:endParaRPr>
+          </a:p>
+          <a:p>
+            <a:r>
+              <a:rPr lang="en-GB" sz="2400" dirty="0" smtClean="0"/>
+              <a:t>Offers and answers with no candidates:</a:t>
+            </a:r>
+          </a:p>
+          <a:p>
+            <a:pPr lvl="1" defTabSz="809625">
+              <a:buNone/>
+              <a:tabLst>
+                <a:tab pos="895350" algn="l"/>
+              </a:tabLst>
+            </a:pPr>
+            <a:r>
+              <a:rPr lang="en-GB" sz="2000" b="1" dirty="0" smtClean="0">
+                <a:solidFill>
+                  <a:schemeClr val="bg1">
+                    <a:lumMod val="50000"/>
+                  </a:schemeClr>
+                </a:solidFill>
+                <a:latin typeface="Courier New"/>
+                <a:cs typeface="Courier New"/>
+              </a:rPr>
+              <a:t>- </a:t>
+            </a:r>
+            <a:r>
+              <a:rPr lang="en-GB" sz="2000" b="1" dirty="0" err="1" smtClean="0">
+                <a:solidFill>
+                  <a:schemeClr val="bg1">
+                    <a:lumMod val="50000"/>
+                  </a:schemeClr>
+                </a:solidFill>
+                <a:latin typeface="Courier New"/>
+                <a:cs typeface="Courier New"/>
+              </a:rPr>
+              <a:t>c</a:t>
+            </a:r>
+            <a:r>
+              <a:rPr lang="en-GB" sz="2000" b="1" dirty="0" smtClean="0">
+                <a:solidFill>
+                  <a:schemeClr val="bg1">
+                    <a:lumMod val="50000"/>
+                  </a:schemeClr>
+                </a:solidFill>
+                <a:latin typeface="Courier New"/>
+                <a:cs typeface="Courier New"/>
+              </a:rPr>
+              <a:t>=IN </a:t>
+            </a:r>
+            <a:r>
+              <a:rPr lang="en-GB" sz="2000" b="1" dirty="0" smtClean="0">
+                <a:latin typeface="Courier New"/>
+                <a:cs typeface="Courier New"/>
+              </a:rPr>
+              <a:t>IP4 0.0.0.0</a:t>
+            </a:r>
+          </a:p>
+          <a:p>
+            <a:pPr lvl="1" defTabSz="809625">
+              <a:buNone/>
+              <a:tabLst>
+                <a:tab pos="895350" algn="l"/>
+              </a:tabLst>
+            </a:pPr>
+            <a:r>
+              <a:rPr lang="en-GB" sz="2000" b="1" dirty="0" smtClean="0">
+                <a:solidFill>
+                  <a:schemeClr val="bg1">
+                    <a:lumMod val="50000"/>
+                  </a:schemeClr>
+                </a:solidFill>
+                <a:latin typeface="Courier New"/>
+                <a:cs typeface="Courier New"/>
+              </a:rPr>
+              <a:t>- </a:t>
+            </a:r>
+            <a:r>
+              <a:rPr lang="en-GB" sz="2000" b="1" dirty="0" err="1" smtClean="0">
+                <a:solidFill>
+                  <a:schemeClr val="bg1">
+                    <a:lumMod val="50000"/>
+                  </a:schemeClr>
+                </a:solidFill>
+                <a:latin typeface="Courier New"/>
+                <a:cs typeface="Courier New"/>
+              </a:rPr>
+              <a:t>m</a:t>
+            </a:r>
+            <a:r>
+              <a:rPr lang="en-GB" sz="2000" b="1" dirty="0" smtClean="0">
+                <a:solidFill>
+                  <a:schemeClr val="bg1">
+                    <a:lumMod val="50000"/>
+                  </a:schemeClr>
+                </a:solidFill>
+                <a:latin typeface="Courier New"/>
+                <a:cs typeface="Courier New"/>
+              </a:rPr>
+              <a:t>=audio </a:t>
+            </a:r>
+            <a:r>
+              <a:rPr lang="en-GB" sz="2000" b="1" dirty="0" smtClean="0">
+                <a:solidFill>
+                  <a:srgbClr val="000000"/>
+                </a:solidFill>
+                <a:latin typeface="Courier New"/>
+                <a:cs typeface="Courier New"/>
+              </a:rPr>
+              <a:t>1</a:t>
+            </a:r>
+            <a:r>
+              <a:rPr lang="en-GB" sz="2000" b="1" dirty="0" smtClean="0">
+                <a:solidFill>
+                  <a:schemeClr val="bg1">
+                    <a:lumMod val="50000"/>
+                  </a:schemeClr>
+                </a:solidFill>
+                <a:latin typeface="Courier New"/>
+                <a:cs typeface="Courier New"/>
+              </a:rPr>
+              <a:t> RTP/AVP 0 96</a:t>
+            </a:r>
+          </a:p>
+          <a:p>
+            <a:pPr lvl="1" defTabSz="809625">
+              <a:buNone/>
+              <a:tabLst>
+                <a:tab pos="895350" algn="l"/>
+              </a:tabLst>
+            </a:pPr>
+            <a:r>
+              <a:rPr lang="en-GB" sz="2000" b="1" dirty="0" smtClean="0">
+                <a:solidFill>
+                  <a:schemeClr val="bg1">
+                    <a:lumMod val="50000"/>
+                  </a:schemeClr>
+                </a:solidFill>
+                <a:latin typeface="Courier New"/>
+                <a:cs typeface="Courier New"/>
+              </a:rPr>
+              <a:t>+ </a:t>
+            </a:r>
+            <a:r>
+              <a:rPr lang="en-GB" sz="2000" b="1" dirty="0" err="1" smtClean="0">
+                <a:solidFill>
+                  <a:schemeClr val="bg1">
+                    <a:lumMod val="50000"/>
+                  </a:schemeClr>
+                </a:solidFill>
+                <a:latin typeface="Courier New"/>
+                <a:cs typeface="Courier New"/>
+              </a:rPr>
+              <a:t>c</a:t>
+            </a:r>
+            <a:r>
+              <a:rPr lang="en-GB" sz="2000" b="1" dirty="0" smtClean="0">
+                <a:solidFill>
+                  <a:schemeClr val="bg1">
+                    <a:lumMod val="50000"/>
+                  </a:schemeClr>
+                </a:solidFill>
+                <a:latin typeface="Courier New"/>
+                <a:cs typeface="Courier New"/>
+              </a:rPr>
+              <a:t>=IN </a:t>
+            </a:r>
+            <a:r>
+              <a:rPr lang="en-GB" sz="2000" b="1" dirty="0" smtClean="0">
+                <a:solidFill>
+                  <a:srgbClr val="000000"/>
+                </a:solidFill>
+                <a:latin typeface="Courier New"/>
+                <a:cs typeface="Courier New"/>
+              </a:rPr>
+              <a:t>IP6 ::</a:t>
+            </a:r>
+          </a:p>
+          <a:p>
+            <a:pPr lvl="1" defTabSz="809625">
+              <a:buNone/>
+              <a:tabLst>
+                <a:tab pos="895350" algn="l"/>
+              </a:tabLst>
+            </a:pPr>
+            <a:r>
+              <a:rPr lang="en-GB" sz="2000" b="1" dirty="0" smtClean="0">
+                <a:solidFill>
+                  <a:schemeClr val="bg1">
+                    <a:lumMod val="50000"/>
+                  </a:schemeClr>
+                </a:solidFill>
+                <a:latin typeface="Courier New"/>
+                <a:cs typeface="Courier New"/>
+              </a:rPr>
+              <a:t>+ </a:t>
+            </a:r>
+            <a:r>
+              <a:rPr lang="en-GB" sz="2000" b="1" dirty="0" err="1" smtClean="0">
+                <a:solidFill>
+                  <a:schemeClr val="bg1">
+                    <a:lumMod val="50000"/>
+                  </a:schemeClr>
+                </a:solidFill>
+                <a:latin typeface="Courier New"/>
+                <a:cs typeface="Courier New"/>
+              </a:rPr>
+              <a:t>m</a:t>
+            </a:r>
+            <a:r>
+              <a:rPr lang="en-GB" sz="2000" b="1" dirty="0" smtClean="0">
+                <a:solidFill>
+                  <a:schemeClr val="bg1">
+                    <a:lumMod val="50000"/>
+                  </a:schemeClr>
+                </a:solidFill>
+                <a:latin typeface="Courier New"/>
+                <a:cs typeface="Courier New"/>
+              </a:rPr>
+              <a:t>=audio </a:t>
+            </a:r>
+            <a:r>
+              <a:rPr lang="en-GB" sz="2000" b="1" dirty="0" smtClean="0">
+                <a:solidFill>
+                  <a:srgbClr val="000000"/>
+                </a:solidFill>
+                <a:latin typeface="Courier New"/>
+                <a:cs typeface="Courier New"/>
+              </a:rPr>
+              <a:t>9</a:t>
+            </a:r>
+            <a:r>
+              <a:rPr lang="en-GB" sz="2000" b="1" dirty="0" smtClean="0">
+                <a:solidFill>
+                  <a:schemeClr val="bg1">
+                    <a:lumMod val="50000"/>
+                  </a:schemeClr>
+                </a:solidFill>
+                <a:latin typeface="Courier New"/>
+                <a:cs typeface="Courier New"/>
+              </a:rPr>
+              <a:t> RTP/AVP 0 96</a:t>
+            </a:r>
+          </a:p>
+          <a:p>
+            <a:pPr lvl="1" defTabSz="809625">
+              <a:buNone/>
+              <a:tabLst>
+                <a:tab pos="895350" algn="l"/>
+              </a:tabLst>
+            </a:pPr>
+            <a:endParaRPr lang="en-GB" sz="2000" dirty="0" smtClean="0"/>
+          </a:p>
+          <a:p>
+            <a:endParaRPr lang="en-GB" sz="2400" dirty="0" smtClean="0"/>
+          </a:p>
+        </p:txBody>
+      </p:sp>
+      <p:sp>
+        <p:nvSpPr>
+          <p:cNvPr id="4" name="Espace réservé du pied de page 3"/>
+          <p:cNvSpPr>
+            <a:spLocks noGrp="1"/>
+          </p:cNvSpPr>
+          <p:nvPr>
+            <p:ph type="ftr" sz="quarter" idx="11"/>
+          </p:nvPr>
+        </p:nvSpPr>
+        <p:spPr/>
+        <p:txBody>
+          <a:bodyPr/>
+          <a:lstStyle/>
+          <a:p>
+            <a:r>
+              <a:rPr lang="fr-FR" smtClean="0"/>
+              <a:t>draft-ivov-mmusic-trickle-ice E. Rescorla, J. Uberti, E. Ivov</a:t>
+            </a:r>
+            <a:endParaRPr lang="en-GB" smtClean="0"/>
+          </a:p>
+        </p:txBody>
+      </p:sp>
+      <p:sp>
+        <p:nvSpPr>
+          <p:cNvPr id="6" name="Espace réservé du numéro de diapositive 5"/>
+          <p:cNvSpPr>
+            <a:spLocks noGrp="1"/>
+          </p:cNvSpPr>
+          <p:nvPr>
+            <p:ph type="sldNum" sz="quarter" idx="4"/>
+          </p:nvPr>
+        </p:nvSpPr>
+        <p:spPr/>
+        <p:txBody>
+          <a:bodyPr/>
+          <a:lstStyle/>
+          <a:p>
+            <a:fld id="{83363BB8-67C3-44C4-A9E3-5652E069104A}" type="slidenum">
+              <a:rPr lang="en-US" smtClean="0"/>
+              <a:pPr/>
+              <a:t>6</a:t>
+            </a:fld>
+            <a:r>
+              <a:rPr lang="en-US" smtClean="0"/>
+              <a:t>/18</a:t>
+            </a:r>
+            <a:endParaRPr lang="en-US" dirty="0"/>
+          </a:p>
+        </p:txBody>
+      </p:sp>
+    </p:spTree>
+  </p:cSld>
+  <p:clrMapOvr>
+    <a:masterClrMapping/>
+  </p:clrMapOvr>
 </p:sld>
 </file>
 

</xml_diff>